<commit_message>
Finalizing write-up and poster.
</commit_message>
<xml_diff>
--- a/results/Poster_Jesse_Robles.pptx
+++ b/results/Poster_Jesse_Robles.pptx
@@ -126,7 +126,7 @@
 <file path=ppt/revisionInfo.xml><?xml version="1.0" encoding="utf-8"?>
 <p1510:revInfo xmlns:a="http://schemas.openxmlformats.org/drawingml/2006/main" xmlns:r="http://schemas.openxmlformats.org/officeDocument/2006/relationships" xmlns:p1510="http://schemas.microsoft.com/office/powerpoint/2015/10/main">
   <p1510:revLst>
-    <p1510:client id="{D24BB185-FD59-4052-83DA-89C2B3528CA0}" v="7" dt="2022-04-24T22:38:43.277"/>
+    <p1510:client id="{D24BB185-FD59-4052-83DA-89C2B3528CA0}" v="46" dt="2022-04-25T23:44:17.742"/>
   </p1510:revLst>
 </p1510:revInfo>
 </file>
@@ -135,17 +135,57 @@
 <pc:chgInfo xmlns:a="http://schemas.openxmlformats.org/drawingml/2006/main" xmlns:r="http://schemas.openxmlformats.org/officeDocument/2006/relationships" xmlns:ac="http://schemas.microsoft.com/office/drawing/2013/main/command" xmlns:pc="http://schemas.microsoft.com/office/powerpoint/2013/main/command">
   <pc:docChgLst>
     <pc:chgData name="Jesse Robles" userId="c21645ff62eb64b3" providerId="LiveId" clId="{D24BB185-FD59-4052-83DA-89C2B3528CA0}"/>
-    <pc:docChg chg="custSel modSld">
-      <pc:chgData name="Jesse Robles" userId="c21645ff62eb64b3" providerId="LiveId" clId="{D24BB185-FD59-4052-83DA-89C2B3528CA0}" dt="2022-04-24T23:15:23.789" v="141"/>
+    <pc:docChg chg="undo custSel modSld">
+      <pc:chgData name="Jesse Robles" userId="c21645ff62eb64b3" providerId="LiveId" clId="{D24BB185-FD59-4052-83DA-89C2B3528CA0}" dt="2022-04-25T23:58:45.840" v="630" actId="20577"/>
       <pc:docMkLst>
         <pc:docMk/>
       </pc:docMkLst>
       <pc:sldChg chg="addSp delSp modSp mod">
-        <pc:chgData name="Jesse Robles" userId="c21645ff62eb64b3" providerId="LiveId" clId="{D24BB185-FD59-4052-83DA-89C2B3528CA0}" dt="2022-04-24T23:15:23.789" v="141"/>
+        <pc:chgData name="Jesse Robles" userId="c21645ff62eb64b3" providerId="LiveId" clId="{D24BB185-FD59-4052-83DA-89C2B3528CA0}" dt="2022-04-25T23:58:45.840" v="630" actId="20577"/>
         <pc:sldMkLst>
           <pc:docMk/>
           <pc:sldMk cId="404040298" sldId="261"/>
         </pc:sldMkLst>
+        <pc:spChg chg="add del mod">
+          <ac:chgData name="Jesse Robles" userId="c21645ff62eb64b3" providerId="LiveId" clId="{D24BB185-FD59-4052-83DA-89C2B3528CA0}" dt="2022-04-25T23:09:01.584" v="146"/>
+          <ac:spMkLst>
+            <pc:docMk/>
+            <pc:sldMk cId="404040298" sldId="261"/>
+            <ac:spMk id="3" creationId="{01C41ED4-351C-47E1-8A07-20480D953169}"/>
+          </ac:spMkLst>
+        </pc:spChg>
+        <pc:spChg chg="add del">
+          <ac:chgData name="Jesse Robles" userId="c21645ff62eb64b3" providerId="LiveId" clId="{D24BB185-FD59-4052-83DA-89C2B3528CA0}" dt="2022-04-25T23:09:11.144" v="148" actId="478"/>
+          <ac:spMkLst>
+            <pc:docMk/>
+            <pc:sldMk cId="404040298" sldId="261"/>
+            <ac:spMk id="4" creationId="{8292D209-C447-4D26-A1A1-80F0A4F3FABA}"/>
+          </ac:spMkLst>
+        </pc:spChg>
+        <pc:spChg chg="mod">
+          <ac:chgData name="Jesse Robles" userId="c21645ff62eb64b3" providerId="LiveId" clId="{D24BB185-FD59-4052-83DA-89C2B3528CA0}" dt="2022-04-25T23:18:38.528" v="253"/>
+          <ac:spMkLst>
+            <pc:docMk/>
+            <pc:sldMk cId="404040298" sldId="261"/>
+            <ac:spMk id="17" creationId="{8AE8A03B-3762-4AF2-A9FC-B088E0736F3A}"/>
+          </ac:spMkLst>
+        </pc:spChg>
+        <pc:spChg chg="add del mod">
+          <ac:chgData name="Jesse Robles" userId="c21645ff62eb64b3" providerId="LiveId" clId="{D24BB185-FD59-4052-83DA-89C2B3528CA0}" dt="2022-04-25T23:35:03.690" v="291" actId="478"/>
+          <ac:spMkLst>
+            <pc:docMk/>
+            <pc:sldMk cId="404040298" sldId="261"/>
+            <ac:spMk id="28" creationId="{ABD4802E-FA7B-4980-8FC5-8EBF317695CF}"/>
+          </ac:spMkLst>
+        </pc:spChg>
+        <pc:spChg chg="add del mod">
+          <ac:chgData name="Jesse Robles" userId="c21645ff62eb64b3" providerId="LiveId" clId="{D24BB185-FD59-4052-83DA-89C2B3528CA0}" dt="2022-04-25T23:41:23.543" v="427" actId="478"/>
+          <ac:spMkLst>
+            <pc:docMk/>
+            <pc:sldMk cId="404040298" sldId="261"/>
+            <ac:spMk id="30" creationId="{FE594934-F3BF-4C44-A885-B442DCCD8B34}"/>
+          </ac:spMkLst>
+        </pc:spChg>
         <pc:spChg chg="mod">
           <ac:chgData name="Jesse Robles" userId="c21645ff62eb64b3" providerId="LiveId" clId="{D24BB185-FD59-4052-83DA-89C2B3528CA0}" dt="2022-04-24T22:29:14.474" v="128" actId="20577"/>
           <ac:spMkLst>
@@ -155,7 +195,7 @@
           </ac:spMkLst>
         </pc:spChg>
         <pc:spChg chg="mod">
-          <ac:chgData name="Jesse Robles" userId="c21645ff62eb64b3" providerId="LiveId" clId="{D24BB185-FD59-4052-83DA-89C2B3528CA0}" dt="2022-04-24T22:28:50.444" v="57" actId="20577"/>
+          <ac:chgData name="Jesse Robles" userId="c21645ff62eb64b3" providerId="LiveId" clId="{D24BB185-FD59-4052-83DA-89C2B3528CA0}" dt="2022-04-25T23:23:45.974" v="279" actId="207"/>
           <ac:spMkLst>
             <pc:docMk/>
             <pc:sldMk cId="404040298" sldId="261"/>
@@ -163,13 +203,53 @@
           </ac:spMkLst>
         </pc:spChg>
         <pc:spChg chg="mod">
-          <ac:chgData name="Jesse Robles" userId="c21645ff62eb64b3" providerId="LiveId" clId="{D24BB185-FD59-4052-83DA-89C2B3528CA0}" dt="2022-04-24T23:15:23.789" v="141"/>
+          <ac:chgData name="Jesse Robles" userId="c21645ff62eb64b3" providerId="LiveId" clId="{D24BB185-FD59-4052-83DA-89C2B3528CA0}" dt="2022-04-25T23:58:45.840" v="630" actId="20577"/>
+          <ac:spMkLst>
+            <pc:docMk/>
+            <pc:sldMk cId="404040298" sldId="261"/>
+            <ac:spMk id="37" creationId="{BAB40251-2E35-4623-A6BE-28130F737F03}"/>
+          </ac:spMkLst>
+        </pc:spChg>
+        <pc:spChg chg="mod">
+          <ac:chgData name="Jesse Robles" userId="c21645ff62eb64b3" providerId="LiveId" clId="{D24BB185-FD59-4052-83DA-89C2B3528CA0}" dt="2022-04-25T23:26:30.528" v="284"/>
+          <ac:spMkLst>
+            <pc:docMk/>
+            <pc:sldMk cId="404040298" sldId="261"/>
+            <ac:spMk id="39" creationId="{62D65E41-7BC1-4B4D-9C1B-6ED3152D12D0}"/>
+          </ac:spMkLst>
+        </pc:spChg>
+        <pc:spChg chg="mod">
+          <ac:chgData name="Jesse Robles" userId="c21645ff62eb64b3" providerId="LiveId" clId="{D24BB185-FD59-4052-83DA-89C2B3528CA0}" dt="2022-04-25T23:57:17.275" v="597" actId="20577"/>
+          <ac:spMkLst>
+            <pc:docMk/>
+            <pc:sldMk cId="404040298" sldId="261"/>
+            <ac:spMk id="230" creationId="{AD2E301E-E7B3-4BB5-B48D-F76D6F65BBE3}"/>
+          </ac:spMkLst>
+        </pc:spChg>
+        <pc:spChg chg="mod">
+          <ac:chgData name="Jesse Robles" userId="c21645ff62eb64b3" providerId="LiveId" clId="{D24BB185-FD59-4052-83DA-89C2B3528CA0}" dt="2022-04-25T23:20:25.868" v="268" actId="12"/>
           <ac:spMkLst>
             <pc:docMk/>
             <pc:sldMk cId="404040298" sldId="261"/>
             <ac:spMk id="287" creationId="{2C6E9F3E-3183-4639-8BD4-4D30DDD1A58D}"/>
           </ac:spMkLst>
         </pc:spChg>
+        <pc:spChg chg="mod">
+          <ac:chgData name="Jesse Robles" userId="c21645ff62eb64b3" providerId="LiveId" clId="{D24BB185-FD59-4052-83DA-89C2B3528CA0}" dt="2022-04-25T23:08:25.362" v="142"/>
+          <ac:spMkLst>
+            <pc:docMk/>
+            <pc:sldMk cId="404040298" sldId="261"/>
+            <ac:spMk id="2053" creationId="{00000000-0000-0000-0000-000000000000}"/>
+          </ac:spMkLst>
+        </pc:spChg>
+        <pc:graphicFrameChg chg="add mod modGraphic">
+          <ac:chgData name="Jesse Robles" userId="c21645ff62eb64b3" providerId="LiveId" clId="{D24BB185-FD59-4052-83DA-89C2B3528CA0}" dt="2022-04-25T23:45:20.990" v="455" actId="20577"/>
+          <ac:graphicFrameMkLst>
+            <pc:docMk/>
+            <pc:sldMk cId="404040298" sldId="261"/>
+            <ac:graphicFrameMk id="9" creationId="{EC4C7FF2-80D3-4BDF-84FD-6C30D46E414B}"/>
+          </ac:graphicFrameMkLst>
+        </pc:graphicFrameChg>
         <pc:graphicFrameChg chg="add del mod">
           <ac:chgData name="Jesse Robles" userId="c21645ff62eb64b3" providerId="LiveId" clId="{D24BB185-FD59-4052-83DA-89C2B3528CA0}" dt="2022-04-24T22:34:13.341" v="132" actId="478"/>
           <ac:graphicFrameMkLst>
@@ -179,7 +259,7 @@
           </ac:graphicFrameMkLst>
         </pc:graphicFrameChg>
         <pc:graphicFrameChg chg="add mod">
-          <ac:chgData name="Jesse Robles" userId="c21645ff62eb64b3" providerId="LiveId" clId="{D24BB185-FD59-4052-83DA-89C2B3528CA0}" dt="2022-04-24T22:34:40.637" v="136" actId="14100"/>
+          <ac:chgData name="Jesse Robles" userId="c21645ff62eb64b3" providerId="LiveId" clId="{D24BB185-FD59-4052-83DA-89C2B3528CA0}" dt="2022-04-25T23:44:17.741" v="450" actId="255"/>
           <ac:graphicFrameMkLst>
             <pc:docMk/>
             <pc:sldMk cId="404040298" sldId="261"/>
@@ -187,13 +267,29 @@
           </ac:graphicFrameMkLst>
         </pc:graphicFrameChg>
         <pc:graphicFrameChg chg="add mod">
-          <ac:chgData name="Jesse Robles" userId="c21645ff62eb64b3" providerId="LiveId" clId="{D24BB185-FD59-4052-83DA-89C2B3528CA0}" dt="2022-04-24T22:38:52.289" v="140" actId="14100"/>
+          <ac:chgData name="Jesse Robles" userId="c21645ff62eb64b3" providerId="LiveId" clId="{D24BB185-FD59-4052-83DA-89C2B3528CA0}" dt="2022-04-25T23:43:45.402" v="446" actId="255"/>
           <ac:graphicFrameMkLst>
             <pc:docMk/>
             <pc:sldMk cId="404040298" sldId="261"/>
             <ac:graphicFrameMk id="22" creationId="{EEBFFAE6-04B3-4985-A3E4-0872ECDE3771}"/>
           </ac:graphicFrameMkLst>
         </pc:graphicFrameChg>
+        <pc:picChg chg="add mod">
+          <ac:chgData name="Jesse Robles" userId="c21645ff62eb64b3" providerId="LiveId" clId="{D24BB185-FD59-4052-83DA-89C2B3528CA0}" dt="2022-04-25T23:45:48.402" v="476" actId="1037"/>
+          <ac:picMkLst>
+            <pc:docMk/>
+            <pc:sldMk cId="404040298" sldId="261"/>
+            <ac:picMk id="6" creationId="{BFA1EEE7-3650-4D5D-8B3E-3F21BB2B4C06}"/>
+          </ac:picMkLst>
+        </pc:picChg>
+        <pc:picChg chg="add mod">
+          <ac:chgData name="Jesse Robles" userId="c21645ff62eb64b3" providerId="LiveId" clId="{D24BB185-FD59-4052-83DA-89C2B3528CA0}" dt="2022-04-25T23:45:48.402" v="476" actId="1037"/>
+          <ac:picMkLst>
+            <pc:docMk/>
+            <pc:sldMk cId="404040298" sldId="261"/>
+            <ac:picMk id="8" creationId="{D302815F-4812-4E94-9C2F-A19422DFB384}"/>
+          </ac:picMkLst>
+        </pc:picChg>
       </pc:sldChg>
     </pc:docChg>
   </pc:docChgLst>
@@ -221,7 +317,7 @@
           <a:lstStyle/>
           <a:p>
             <a:pPr>
-              <a:defRPr sz="1600" b="1" i="0" u="none" strike="noStrike" kern="1200" baseline="0">
+              <a:defRPr sz="2400" b="1" i="0" u="none" strike="noStrike" kern="1200" baseline="0">
                 <a:solidFill>
                   <a:schemeClr val="tx1">
                     <a:lumMod val="65000"/>
@@ -234,7 +330,7 @@
               </a:defRPr>
             </a:pPr>
             <a:r>
-              <a:rPr lang="en-US"/>
+              <a:rPr lang="en-US" sz="2400"/>
               <a:t>Query Intent Classification Metrics (Overall Average)</a:t>
             </a:r>
           </a:p>
@@ -253,7 +349,7 @@
         <a:lstStyle/>
         <a:p>
           <a:pPr>
-            <a:defRPr sz="1600" b="1" i="0" u="none" strike="noStrike" kern="1200" baseline="0">
+            <a:defRPr sz="2400" b="1" i="0" u="none" strike="noStrike" kern="1200" baseline="0">
               <a:solidFill>
                 <a:schemeClr val="tx1">
                   <a:lumMod val="65000"/>
@@ -540,7 +636,7 @@
           <a:lstStyle/>
           <a:p>
             <a:pPr>
-              <a:defRPr sz="900" b="0" i="0" u="none" strike="noStrike" kern="1200" baseline="0">
+              <a:defRPr sz="1800" b="0" i="0" u="none" strike="noStrike" kern="1200" baseline="0">
                 <a:solidFill>
                   <a:schemeClr val="tx1">
                     <a:lumMod val="65000"/>
@@ -601,7 +697,7 @@
           <a:lstStyle/>
           <a:p>
             <a:pPr>
-              <a:defRPr sz="900" b="0" i="0" u="none" strike="noStrike" kern="1200" baseline="0">
+              <a:defRPr sz="1800" b="0" i="0" u="none" strike="noStrike" kern="1200" baseline="0">
                 <a:solidFill>
                   <a:schemeClr val="tx1">
                     <a:lumMod val="65000"/>
@@ -643,7 +739,7 @@
         <a:lstStyle/>
         <a:p>
           <a:pPr>
-            <a:defRPr sz="900" b="0" i="0" u="none" strike="noStrike" kern="1200" baseline="0">
+            <a:defRPr sz="1800" b="0" i="0" u="none" strike="noStrike" kern="1200" baseline="0">
               <a:solidFill>
                 <a:schemeClr val="tx1">
                   <a:lumMod val="65000"/>
@@ -714,7 +810,7 @@
           <a:lstStyle/>
           <a:p>
             <a:pPr>
-              <a:defRPr sz="1600" b="1" i="0" u="none" strike="noStrike" kern="1200" baseline="0">
+              <a:defRPr sz="2400" b="1" i="0" u="none" strike="noStrike" kern="1200" baseline="0">
                 <a:solidFill>
                   <a:schemeClr val="tx1">
                     <a:lumMod val="65000"/>
@@ -727,7 +823,7 @@
               </a:defRPr>
             </a:pPr>
             <a:r>
-              <a:rPr lang="en-US"/>
+              <a:rPr lang="en-US" sz="2400"/>
               <a:t>NER Metrics (Overall Average)</a:t>
             </a:r>
           </a:p>
@@ -746,7 +842,7 @@
         <a:lstStyle/>
         <a:p>
           <a:pPr>
-            <a:defRPr sz="1600" b="1" i="0" u="none" strike="noStrike" kern="1200" baseline="0">
+            <a:defRPr sz="2400" b="1" i="0" u="none" strike="noStrike" kern="1200" baseline="0">
               <a:solidFill>
                 <a:schemeClr val="tx1">
                   <a:lumMod val="65000"/>
@@ -774,7 +870,7 @@
           <c:order val="0"/>
           <c:tx>
             <c:strRef>
-              <c:f>'[Comparison Summary.xlsx]Overall Results'!$A$8</c:f>
+              <c:f>'Overall Results'!$A$8</c:f>
               <c:strCache>
                 <c:ptCount val="1"/>
                 <c:pt idx="0">
@@ -835,7 +931,7 @@
           <c:invertIfNegative val="0"/>
           <c:cat>
             <c:strRef>
-              <c:f>'[Comparison Summary.xlsx]Overall Results'!$B$7:$E$7</c:f>
+              <c:f>'Overall Results'!$B$7:$E$7</c:f>
               <c:strCache>
                 <c:ptCount val="4"/>
                 <c:pt idx="0">
@@ -855,7 +951,7 @@
           </c:cat>
           <c:val>
             <c:numRef>
-              <c:f>'[Comparison Summary.xlsx]Overall Results'!$B$8:$E$8</c:f>
+              <c:f>'Overall Results'!$B$8:$E$8</c:f>
               <c:numCache>
                 <c:formatCode>General</c:formatCode>
                 <c:ptCount val="4"/>
@@ -885,11 +981,11 @@
           <c:order val="1"/>
           <c:tx>
             <c:strRef>
-              <c:f>'[Comparison Summary.xlsx]Overall Results'!$A$9</c:f>
+              <c:f>'Overall Results'!$A$9</c:f>
               <c:strCache>
                 <c:ptCount val="1"/>
                 <c:pt idx="0">
-                  <c:v>RASA</c:v>
+                  <c:v>DIET</c:v>
                 </c:pt>
               </c:strCache>
             </c:strRef>
@@ -946,7 +1042,7 @@
           <c:invertIfNegative val="0"/>
           <c:cat>
             <c:strRef>
-              <c:f>'[Comparison Summary.xlsx]Overall Results'!$B$7:$E$7</c:f>
+              <c:f>'Overall Results'!$B$7:$E$7</c:f>
               <c:strCache>
                 <c:ptCount val="4"/>
                 <c:pt idx="0">
@@ -966,7 +1062,7 @@
           </c:cat>
           <c:val>
             <c:numRef>
-              <c:f>'[Comparison Summary.xlsx]Overall Results'!$B$9:$E$9</c:f>
+              <c:f>'Overall Results'!$B$9:$E$9</c:f>
               <c:numCache>
                 <c:formatCode>General</c:formatCode>
                 <c:ptCount val="4"/>
@@ -1033,7 +1129,7 @@
           <a:lstStyle/>
           <a:p>
             <a:pPr>
-              <a:defRPr sz="900" b="0" i="0" u="none" strike="noStrike" kern="1200" baseline="0">
+              <a:defRPr sz="1800" b="0" i="0" u="none" strike="noStrike" kern="1200" baseline="0">
                 <a:solidFill>
                   <a:schemeClr val="tx1">
                     <a:lumMod val="65000"/>
@@ -1093,7 +1189,7 @@
           <a:lstStyle/>
           <a:p>
             <a:pPr>
-              <a:defRPr sz="900" b="0" i="0" u="none" strike="noStrike" kern="1200" baseline="0">
+              <a:defRPr sz="1800" b="0" i="0" u="none" strike="noStrike" kern="1200" baseline="0">
                 <a:solidFill>
                   <a:schemeClr val="tx1">
                     <a:lumMod val="65000"/>
@@ -1135,7 +1231,7 @@
         <a:lstStyle/>
         <a:p>
           <a:pPr>
-            <a:defRPr sz="900" b="0" i="0" u="none" strike="noStrike" kern="1200" baseline="0">
+            <a:defRPr sz="2000" b="0" i="0" u="none" strike="noStrike" kern="1200" baseline="0">
               <a:solidFill>
                 <a:schemeClr val="tx1">
                   <a:lumMod val="65000"/>
@@ -2448,7 +2544,7 @@
           <a:p>
             <a:fld id="{2280919C-9BF4-2E48-B1DA-A899560EBF1A}" type="datetimeFigureOut">
               <a:rPr lang="en-US" smtClean="0"/>
-              <a:t>4/24/2022</a:t>
+              <a:t>4/25/2022</a:t>
             </a:fld>
             <a:endParaRPr lang="en-US"/>
           </a:p>
@@ -2686,7 +2782,7 @@
           <a:p>
             <a:fld id="{2280919C-9BF4-2E48-B1DA-A899560EBF1A}" type="datetimeFigureOut">
               <a:rPr lang="en-US" smtClean="0"/>
-              <a:t>4/24/2022</a:t>
+              <a:t>4/25/2022</a:t>
             </a:fld>
             <a:endParaRPr lang="en-US"/>
           </a:p>
@@ -2864,7 +2960,7 @@
           <a:p>
             <a:fld id="{2280919C-9BF4-2E48-B1DA-A899560EBF1A}" type="datetimeFigureOut">
               <a:rPr lang="en-US" smtClean="0"/>
-              <a:t>4/24/2022</a:t>
+              <a:t>4/25/2022</a:t>
             </a:fld>
             <a:endParaRPr lang="en-US"/>
           </a:p>
@@ -3032,7 +3128,7 @@
           <a:p>
             <a:fld id="{2280919C-9BF4-2E48-B1DA-A899560EBF1A}" type="datetimeFigureOut">
               <a:rPr lang="en-US" smtClean="0"/>
-              <a:t>4/24/2022</a:t>
+              <a:t>4/25/2022</a:t>
             </a:fld>
             <a:endParaRPr lang="en-US"/>
           </a:p>
@@ -3277,7 +3373,7 @@
           <a:p>
             <a:fld id="{2280919C-9BF4-2E48-B1DA-A899560EBF1A}" type="datetimeFigureOut">
               <a:rPr lang="en-US" smtClean="0"/>
-              <a:t>4/24/2022</a:t>
+              <a:t>4/25/2022</a:t>
             </a:fld>
             <a:endParaRPr lang="en-US"/>
           </a:p>
@@ -3562,7 +3658,7 @@
           <a:p>
             <a:fld id="{2280919C-9BF4-2E48-B1DA-A899560EBF1A}" type="datetimeFigureOut">
               <a:rPr lang="en-US" smtClean="0"/>
-              <a:t>4/24/2022</a:t>
+              <a:t>4/25/2022</a:t>
             </a:fld>
             <a:endParaRPr lang="en-US"/>
           </a:p>
@@ -3986,7 +4082,7 @@
           <a:p>
             <a:fld id="{2280919C-9BF4-2E48-B1DA-A899560EBF1A}" type="datetimeFigureOut">
               <a:rPr lang="en-US" smtClean="0"/>
-              <a:t>4/24/2022</a:t>
+              <a:t>4/25/2022</a:t>
             </a:fld>
             <a:endParaRPr lang="en-US"/>
           </a:p>
@@ -4103,7 +4199,7 @@
           <a:p>
             <a:fld id="{2280919C-9BF4-2E48-B1DA-A899560EBF1A}" type="datetimeFigureOut">
               <a:rPr lang="en-US" smtClean="0"/>
-              <a:t>4/24/2022</a:t>
+              <a:t>4/25/2022</a:t>
             </a:fld>
             <a:endParaRPr lang="en-US"/>
           </a:p>
@@ -4198,7 +4294,7 @@
           <a:p>
             <a:fld id="{2280919C-9BF4-2E48-B1DA-A899560EBF1A}" type="datetimeFigureOut">
               <a:rPr lang="en-US" smtClean="0"/>
-              <a:t>4/24/2022</a:t>
+              <a:t>4/25/2022</a:t>
             </a:fld>
             <a:endParaRPr lang="en-US"/>
           </a:p>
@@ -4473,7 +4569,7 @@
           <a:p>
             <a:fld id="{2280919C-9BF4-2E48-B1DA-A899560EBF1A}" type="datetimeFigureOut">
               <a:rPr lang="en-US" smtClean="0"/>
-              <a:t>4/24/2022</a:t>
+              <a:t>4/25/2022</a:t>
             </a:fld>
             <a:endParaRPr lang="en-US"/>
           </a:p>
@@ -4725,7 +4821,7 @@
           <a:p>
             <a:fld id="{2280919C-9BF4-2E48-B1DA-A899560EBF1A}" type="datetimeFigureOut">
               <a:rPr lang="en-US" smtClean="0"/>
-              <a:t>4/24/2022</a:t>
+              <a:t>4/25/2022</a:t>
             </a:fld>
             <a:endParaRPr lang="en-US"/>
           </a:p>
@@ -4936,7 +5032,7 @@
           <a:p>
             <a:fld id="{2280919C-9BF4-2E48-B1DA-A899560EBF1A}" type="datetimeFigureOut">
               <a:rPr lang="en-US" smtClean="0"/>
-              <a:t>4/24/2022</a:t>
+              <a:t>4/25/2022</a:t>
             </a:fld>
             <a:endParaRPr lang="en-US"/>
           </a:p>
@@ -5509,7 +5605,7 @@
         <p:spPr bwMode="auto">
           <a:xfrm>
             <a:off x="1062257" y="8265705"/>
-            <a:ext cx="9144000" cy="507831"/>
+            <a:ext cx="9144000" cy="8633133"/>
           </a:xfrm>
           <a:prstGeom prst="rect">
             <a:avLst/>
@@ -5654,12 +5750,12 @@
           </a:lstStyle>
           <a:p>
             <a:r>
-              <a:rPr lang="en-US" sz="2400">
+              <a:rPr lang="en-US" sz="2400" dirty="0">
                 <a:latin typeface="Titillium Web" panose="00000500000000000000" pitchFamily="2" charset="0"/>
                 <a:ea typeface="Open Sans" panose="020B0606030504020204" pitchFamily="34" charset="0"/>
                 <a:cs typeface="Open Sans" panose="020B0606030504020204" pitchFamily="34" charset="0"/>
               </a:rPr>
-              <a:t>Add your information, graphs, and images to this section.</a:t>
+              <a:t>User expectations regarding their interactions with search systems and dialog systems (e.g., chatbots, Siri, Cortana) have significantly increased in the last decades beyond simple keyword matching and rule-based responses. A main driver for this has been large corporations such as Google, Amazon, and Microsoft’s significant investment in research and development of machine learning algorithms and hardware. This has led to the development of embedding techniques and language models, followed by the development of the Transformer architecture which further pushed the state of the art in natural language understanding. Notable among these is the Bidirectional Encoder Representations from Transformers (BERT) model. These models are trained on general corpora of text data (e.g., new articles, Wikipedia) and can be fine-tuned to specific use cases to achieve better performance. This architecture has also been adapted to more domain specific applications such as search and conversational AI, such as the Rasa Dual Intent and Entity Transformer (DIET). This project compares the out-of-the-box performance of BERT and DIET for both query intent classification and Named Entity Recognition tasks on six datasets. The results on these datasets show that model performance is comparable, although BERT slightly outperformed DIET. However, the DIET architecture provides the added benefit of a single model for both tasks and a significantly smaller resulting model size..</a:t>
             </a:r>
           </a:p>
         </p:txBody>
@@ -5796,7 +5892,7 @@
         <p:spPr>
           <a:xfrm>
             <a:off x="1005840" y="3778048"/>
-            <a:ext cx="41148000" cy="2025170"/>
+            <a:ext cx="41148000" cy="2689967"/>
           </a:xfrm>
           <a:prstGeom prst="rect">
             <a:avLst/>
@@ -5967,6 +6063,30 @@
               </a:rPr>
               <a:t>Department of Computer Science</a:t>
             </a:r>
+          </a:p>
+          <a:p>
+            <a:r>
+              <a:rPr lang="en-US" sz="3600" dirty="0">
+                <a:solidFill>
+                  <a:schemeClr val="bg1"/>
+                </a:solidFill>
+                <a:latin typeface="Titillium Web" panose="00000500000000000000" pitchFamily="2" charset="0"/>
+                <a:hlinkClick r:id="rId2">
+                  <a:extLst>
+                    <a:ext uri="{A12FA001-AC4F-418D-AE19-62706E023703}">
+                      <ahyp:hlinkClr xmlns:ahyp="http://schemas.microsoft.com/office/drawing/2018/hyperlinkcolor" val="tx"/>
+                    </a:ext>
+                  </a:extLst>
+                </a:hlinkClick>
+              </a:rPr>
+              <a:t>https://github.com/jesserobles/query-intent-classifier</a:t>
+            </a:r>
+            <a:endParaRPr lang="en-US" sz="3600" dirty="0">
+              <a:solidFill>
+                <a:schemeClr val="bg1"/>
+              </a:solidFill>
+              <a:latin typeface="Titillium Web" panose="00000500000000000000" pitchFamily="2" charset="0"/>
+            </a:endParaRPr>
           </a:p>
         </p:txBody>
       </p:sp>
@@ -6038,7 +6158,7 @@
         <p:spPr bwMode="auto">
           <a:xfrm>
             <a:off x="11521440" y="8000232"/>
-            <a:ext cx="10058400" cy="507831"/>
+            <a:ext cx="10058400" cy="22298412"/>
           </a:xfrm>
           <a:prstGeom prst="rect">
             <a:avLst/>
@@ -6183,13 +6303,225 @@
           </a:lstStyle>
           <a:p>
             <a:r>
+              <a:rPr lang="en-US" sz="3600" b="1" dirty="0">
+                <a:latin typeface="Titillium Web" panose="00000500000000000000" pitchFamily="2" charset="0"/>
+                <a:ea typeface="Open Sans" panose="020B0606030504020204" pitchFamily="34" charset="0"/>
+                <a:cs typeface="Open Sans" panose="020B0606030504020204" pitchFamily="34" charset="0"/>
+              </a:rPr>
+              <a:t>Dataset Preparation:</a:t>
+            </a:r>
+          </a:p>
+          <a:p>
+            <a:r>
+              <a:rPr lang="en-US" sz="2400" dirty="0">
+                <a:latin typeface="Titillium Web" panose="00000500000000000000" pitchFamily="2" charset="0"/>
+                <a:ea typeface="Open Sans" panose="020B0606030504020204" pitchFamily="34" charset="0"/>
+                <a:cs typeface="Open Sans" panose="020B0606030504020204" pitchFamily="34" charset="0"/>
+              </a:rPr>
+              <a:t>The datasets were sourced from the GitHub repository at https://github.com/jianguoz/Few-Shot-Intent-Detection and from Kaggle at https://www.kaggle.com/datasets/joydeb28/nlp-benchmarking-data-for-intent-and-entity. These datasets are somewhat similar in that they are intended to be used in a conversational assistant or search setting. The ATIS and SNIPS datasets were used in (Bunk, et al. 2020), and although the NLU-Benchmarking dataset from that paper was not used in this project, the other datasets (CLINC150, HWU64) contain examples from that dataset. Table 1 shows a brief description of each dataset.</a:t>
+            </a:r>
+          </a:p>
+          <a:p>
+            <a:endParaRPr lang="en-US" sz="2400" dirty="0">
+              <a:latin typeface="Titillium Web" panose="00000500000000000000" pitchFamily="2" charset="0"/>
+              <a:ea typeface="Open Sans" panose="020B0606030504020204" pitchFamily="34" charset="0"/>
+              <a:cs typeface="Open Sans" panose="020B0606030504020204" pitchFamily="34" charset="0"/>
+            </a:endParaRPr>
+          </a:p>
+          <a:p>
+            <a:r>
+              <a:rPr lang="en-US" sz="2400" dirty="0">
+                <a:latin typeface="Titillium Web" panose="00000500000000000000" pitchFamily="2" charset="0"/>
+                <a:ea typeface="Open Sans" panose="020B0606030504020204" pitchFamily="34" charset="0"/>
+                <a:cs typeface="Open Sans" panose="020B0606030504020204" pitchFamily="34" charset="0"/>
+              </a:rPr>
+              <a:t>Most of the NER datasets were in IOB format, and one (BENCHMARKING_DATA) was in JSON format. The first challenge was to preprocess the datasets so that each model type can accept the data. It made more sense to handle a single format, so the JSON parser processes the JSON files and outputs in the same IOB format as the other datasets. Additionally, all but the BENCHMARKING_DATA dataset were split into train, test, validate datasets. That dataset was split into the same format as it was processed into IOB format.</a:t>
+            </a:r>
+          </a:p>
+          <a:p>
+            <a:endParaRPr lang="en-US" sz="2400" dirty="0">
+              <a:latin typeface="Titillium Web" panose="00000500000000000000" pitchFamily="2" charset="0"/>
+              <a:ea typeface="Open Sans" panose="020B0606030504020204" pitchFamily="34" charset="0"/>
+              <a:cs typeface="Open Sans" panose="020B0606030504020204" pitchFamily="34" charset="0"/>
+            </a:endParaRPr>
+          </a:p>
+          <a:p>
+            <a:r>
+              <a:rPr lang="en-US" sz="2400" dirty="0">
+                <a:latin typeface="Titillium Web" panose="00000500000000000000" pitchFamily="2" charset="0"/>
+                <a:ea typeface="Open Sans" panose="020B0606030504020204" pitchFamily="34" charset="0"/>
+                <a:cs typeface="Open Sans" panose="020B0606030504020204" pitchFamily="34" charset="0"/>
+              </a:rPr>
+              <a:t>The </a:t>
+            </a:r>
+            <a:r>
+              <a:rPr lang="en-US" sz="2400" dirty="0" err="1">
+                <a:latin typeface="Titillium Web" panose="00000500000000000000" pitchFamily="2" charset="0"/>
+                <a:ea typeface="Open Sans" panose="020B0606030504020204" pitchFamily="34" charset="0"/>
+                <a:cs typeface="Open Sans" panose="020B0606030504020204" pitchFamily="34" charset="0"/>
+              </a:rPr>
+              <a:t>Huggingface</a:t>
+            </a:r>
+            <a:r>
+              <a:rPr lang="en-US" sz="2400" dirty="0">
+                <a:latin typeface="Titillium Web" panose="00000500000000000000" pitchFamily="2" charset="0"/>
+                <a:ea typeface="Open Sans" panose="020B0606030504020204" pitchFamily="34" charset="0"/>
+                <a:cs typeface="Open Sans" panose="020B0606030504020204" pitchFamily="34" charset="0"/>
+              </a:rPr>
+              <a:t> library data input format for Named Entity Recognition is like the IOB format in that it takes in tokenized text and the NER label for each token. The main preprocessing step is to encode the IOB format into numeric values. The input format for the Rasa DIET model is a YAML file that contains examples grouped by intent and with entities annotated in the text example. The </a:t>
+            </a:r>
+            <a:r>
+              <a:rPr lang="en-US" sz="2400" dirty="0" err="1">
+                <a:latin typeface="Titillium Web" panose="00000500000000000000" pitchFamily="2" charset="0"/>
+                <a:ea typeface="Open Sans" panose="020B0606030504020204" pitchFamily="34" charset="0"/>
+                <a:cs typeface="Open Sans" panose="020B0606030504020204" pitchFamily="34" charset="0"/>
+              </a:rPr>
+              <a:t>CoNLL</a:t>
+            </a:r>
+            <a:r>
+              <a:rPr lang="en-US" sz="2400" dirty="0">
+                <a:latin typeface="Titillium Web" panose="00000500000000000000" pitchFamily="2" charset="0"/>
+                <a:ea typeface="Open Sans" panose="020B0606030504020204" pitchFamily="34" charset="0"/>
+                <a:cs typeface="Open Sans" panose="020B0606030504020204" pitchFamily="34" charset="0"/>
+              </a:rPr>
+              <a:t>/IOB parser in the code base handles preprocessing the input files and outputting the proper format for each model type. For DIET, new YAML files are created.</a:t>
+            </a:r>
+          </a:p>
+          <a:p>
+            <a:endParaRPr lang="en-US" sz="2400" dirty="0">
+              <a:latin typeface="Titillium Web" panose="00000500000000000000" pitchFamily="2" charset="0"/>
+              <a:ea typeface="Open Sans" panose="020B0606030504020204" pitchFamily="34" charset="0"/>
+              <a:cs typeface="Open Sans" panose="020B0606030504020204" pitchFamily="34" charset="0"/>
+            </a:endParaRPr>
+          </a:p>
+          <a:p>
+            <a:r>
+              <a:rPr lang="en-US" sz="3600" b="1" dirty="0">
+                <a:latin typeface="Titillium Web" panose="00000500000000000000" pitchFamily="2" charset="0"/>
+                <a:ea typeface="Open Sans" panose="020B0606030504020204" pitchFamily="34" charset="0"/>
+                <a:cs typeface="Open Sans" panose="020B0606030504020204" pitchFamily="34" charset="0"/>
+              </a:rPr>
+              <a:t>Model Training:</a:t>
+            </a:r>
+          </a:p>
+          <a:p>
+            <a:r>
+              <a:rPr lang="en-US" sz="2400" dirty="0">
+                <a:latin typeface="Titillium Web" panose="00000500000000000000" pitchFamily="2" charset="0"/>
+                <a:ea typeface="Open Sans" panose="020B0606030504020204" pitchFamily="34" charset="0"/>
+                <a:cs typeface="Open Sans" panose="020B0606030504020204" pitchFamily="34" charset="0"/>
+              </a:rPr>
+              <a:t>Since the Rasa DIET model performs both query intent classification and named entity recognition, two BERT models were trained on each of the datasets that contained both intents and entities. Although there </a:t>
+            </a:r>
+            <a:r>
               <a:rPr lang="en-US" sz="2400">
                 <a:latin typeface="Titillium Web" panose="00000500000000000000" pitchFamily="2" charset="0"/>
                 <a:ea typeface="Open Sans" panose="020B0606030504020204" pitchFamily="34" charset="0"/>
                 <a:cs typeface="Open Sans" panose="020B0606030504020204" pitchFamily="34" charset="0"/>
               </a:rPr>
-              <a:t>Add your information, graphs, and images to this section.</a:t>
-            </a:r>
+              <a:t>are ways </a:t>
+            </a:r>
+            <a:r>
+              <a:rPr lang="en-US" sz="2400" dirty="0">
+                <a:latin typeface="Titillium Web" panose="00000500000000000000" pitchFamily="2" charset="0"/>
+                <a:ea typeface="Open Sans" panose="020B0606030504020204" pitchFamily="34" charset="0"/>
+                <a:cs typeface="Open Sans" panose="020B0606030504020204" pitchFamily="34" charset="0"/>
+              </a:rPr>
+              <a:t>to use the </a:t>
+            </a:r>
+            <a:r>
+              <a:rPr lang="en-US" sz="2400" dirty="0" err="1">
+                <a:latin typeface="Titillium Web" panose="00000500000000000000" pitchFamily="2" charset="0"/>
+                <a:ea typeface="Open Sans" panose="020B0606030504020204" pitchFamily="34" charset="0"/>
+                <a:cs typeface="Open Sans" panose="020B0606030504020204" pitchFamily="34" charset="0"/>
+              </a:rPr>
+              <a:t>Huggingface</a:t>
+            </a:r>
+            <a:r>
+              <a:rPr lang="en-US" sz="2400" dirty="0">
+                <a:latin typeface="Titillium Web" panose="00000500000000000000" pitchFamily="2" charset="0"/>
+                <a:ea typeface="Open Sans" panose="020B0606030504020204" pitchFamily="34" charset="0"/>
+                <a:cs typeface="Open Sans" panose="020B0606030504020204" pitchFamily="34" charset="0"/>
+              </a:rPr>
+              <a:t> library to build a multi-task model, it is not supported out of the box and building that architecture is outside the scope of this project.</a:t>
+            </a:r>
+          </a:p>
+          <a:p>
+            <a:endParaRPr lang="en-US" sz="2400" dirty="0">
+              <a:latin typeface="Titillium Web" panose="00000500000000000000" pitchFamily="2" charset="0"/>
+              <a:ea typeface="Open Sans" panose="020B0606030504020204" pitchFamily="34" charset="0"/>
+              <a:cs typeface="Open Sans" panose="020B0606030504020204" pitchFamily="34" charset="0"/>
+            </a:endParaRPr>
+          </a:p>
+          <a:p>
+            <a:r>
+              <a:rPr lang="en-US" sz="2400" dirty="0">
+                <a:latin typeface="Titillium Web" panose="00000500000000000000" pitchFamily="2" charset="0"/>
+                <a:ea typeface="Open Sans" panose="020B0606030504020204" pitchFamily="34" charset="0"/>
+                <a:cs typeface="Open Sans" panose="020B0606030504020204" pitchFamily="34" charset="0"/>
+              </a:rPr>
+              <a:t>In order to reduce model size and training time, the </a:t>
+            </a:r>
+            <a:r>
+              <a:rPr lang="en-US" sz="2400" dirty="0" err="1">
+                <a:latin typeface="Titillium Web" panose="00000500000000000000" pitchFamily="2" charset="0"/>
+                <a:ea typeface="Open Sans" panose="020B0606030504020204" pitchFamily="34" charset="0"/>
+                <a:cs typeface="Open Sans" panose="020B0606030504020204" pitchFamily="34" charset="0"/>
+              </a:rPr>
+              <a:t>distilbert</a:t>
+            </a:r>
+            <a:r>
+              <a:rPr lang="en-US" sz="2400" dirty="0">
+                <a:latin typeface="Titillium Web" panose="00000500000000000000" pitchFamily="2" charset="0"/>
+                <a:ea typeface="Open Sans" panose="020B0606030504020204" pitchFamily="34" charset="0"/>
+                <a:cs typeface="Open Sans" panose="020B0606030504020204" pitchFamily="34" charset="0"/>
+              </a:rPr>
+              <a:t>-base-uncased model was used as the base model for fine tuning, which is a smaller and faster version of BERT. The BERT models were trained for 5 epochs with a learning rate of 2e-5 and weight decay of 0.01, which is a form of regularization. These parameters were selected based on the </a:t>
+            </a:r>
+            <a:r>
+              <a:rPr lang="en-US" sz="2400" dirty="0" err="1">
+                <a:latin typeface="Titillium Web" panose="00000500000000000000" pitchFamily="2" charset="0"/>
+                <a:ea typeface="Open Sans" panose="020B0606030504020204" pitchFamily="34" charset="0"/>
+                <a:cs typeface="Open Sans" panose="020B0606030504020204" pitchFamily="34" charset="0"/>
+              </a:rPr>
+              <a:t>Huggingface</a:t>
+            </a:r>
+            <a:r>
+              <a:rPr lang="en-US" sz="2400" dirty="0">
+                <a:latin typeface="Titillium Web" panose="00000500000000000000" pitchFamily="2" charset="0"/>
+                <a:ea typeface="Open Sans" panose="020B0606030504020204" pitchFamily="34" charset="0"/>
+                <a:cs typeface="Open Sans" panose="020B0606030504020204" pitchFamily="34" charset="0"/>
+              </a:rPr>
+              <a:t> documentation. Training time on the BERT model ranged from 1-5 minutes on a 1080TI GPU. For the DIET models, the model was trained on 100 epochs with the other parameters set with default values. In terms of training time, the DIET models take longer because of the larger number of epochs. These epochs are necessary because the models are trained from scratch. The training times for DIET ranged from 2 to 15 minutes when trained on a 1080TI GPU. The ATIS dataset had to be trained on CPU for the DIET model because it caused the GPU to run out of memory. This is likely the result of the number of entity types and amount of entities present in that dataset. The difference in model sizes is also notable. The average size of the DIET models is approximately 86MB, while the BERT models are all approximately 235MB each. This might be an important consideration for limited resource environments such as mobile or edge devices.</a:t>
+            </a:r>
+          </a:p>
+          <a:p>
+            <a:endParaRPr lang="en-US" sz="2400" dirty="0">
+              <a:latin typeface="Titillium Web" panose="00000500000000000000" pitchFamily="2" charset="0"/>
+              <a:ea typeface="Open Sans" panose="020B0606030504020204" pitchFamily="34" charset="0"/>
+              <a:cs typeface="Open Sans" panose="020B0606030504020204" pitchFamily="34" charset="0"/>
+            </a:endParaRPr>
+          </a:p>
+          <a:p>
+            <a:endParaRPr lang="en-US" sz="2400" dirty="0">
+              <a:latin typeface="Titillium Web" panose="00000500000000000000" pitchFamily="2" charset="0"/>
+              <a:ea typeface="Open Sans" panose="020B0606030504020204" pitchFamily="34" charset="0"/>
+              <a:cs typeface="Open Sans" panose="020B0606030504020204" pitchFamily="34" charset="0"/>
+            </a:endParaRPr>
+          </a:p>
+          <a:p>
+            <a:endParaRPr lang="en-US" sz="2400" dirty="0">
+              <a:latin typeface="Titillium Web" panose="00000500000000000000" pitchFamily="2" charset="0"/>
+              <a:ea typeface="Open Sans" panose="020B0606030504020204" pitchFamily="34" charset="0"/>
+              <a:cs typeface="Open Sans" panose="020B0606030504020204" pitchFamily="34" charset="0"/>
+            </a:endParaRPr>
+          </a:p>
+          <a:p>
+            <a:endParaRPr lang="en-US" sz="2400" dirty="0">
+              <a:latin typeface="Titillium Web" panose="00000500000000000000" pitchFamily="2" charset="0"/>
+              <a:ea typeface="Open Sans" panose="020B0606030504020204" pitchFamily="34" charset="0"/>
+              <a:cs typeface="Open Sans" panose="020B0606030504020204" pitchFamily="34" charset="0"/>
+            </a:endParaRPr>
           </a:p>
         </p:txBody>
       </p:sp>
@@ -6261,7 +6593,7 @@
         <p:spPr bwMode="auto">
           <a:xfrm>
             <a:off x="22311361" y="8000232"/>
-            <a:ext cx="10058400" cy="507831"/>
+            <a:ext cx="10058400" cy="4570482"/>
           </a:xfrm>
           <a:prstGeom prst="rect">
             <a:avLst/>
@@ -6406,12 +6738,60 @@
           </a:lstStyle>
           <a:p>
             <a:r>
-              <a:rPr lang="en-US" sz="2400">
+              <a:rPr lang="en-US" sz="2400" dirty="0">
                 <a:latin typeface="Titillium Web" panose="00000500000000000000" pitchFamily="2" charset="0"/>
                 <a:ea typeface="Open Sans" panose="020B0606030504020204" pitchFamily="34" charset="0"/>
                 <a:cs typeface="Open Sans" panose="020B0606030504020204" pitchFamily="34" charset="0"/>
               </a:rPr>
-              <a:t>Add your information, graphs, and images to this section.</a:t>
+              <a:t>Below are two charts showing the precision, recall, F1 score and accuracy of each model in intent classification and named entity recognition. The </a:t>
+            </a:r>
+            <a:r>
+              <a:rPr lang="en-US" sz="2400" dirty="0" err="1">
+                <a:latin typeface="Titillium Web" panose="00000500000000000000" pitchFamily="2" charset="0"/>
+                <a:ea typeface="Open Sans" panose="020B0606030504020204" pitchFamily="34" charset="0"/>
+                <a:cs typeface="Open Sans" panose="020B0606030504020204" pitchFamily="34" charset="0"/>
+              </a:rPr>
+              <a:t>seqeval</a:t>
+            </a:r>
+            <a:r>
+              <a:rPr lang="en-US" sz="2400" dirty="0">
+                <a:latin typeface="Titillium Web" panose="00000500000000000000" pitchFamily="2" charset="0"/>
+                <a:ea typeface="Open Sans" panose="020B0606030504020204" pitchFamily="34" charset="0"/>
+                <a:cs typeface="Open Sans" panose="020B0606030504020204" pitchFamily="34" charset="0"/>
+              </a:rPr>
+              <a:t> python library was used on the NER evaluation and the </a:t>
+            </a:r>
+            <a:r>
+              <a:rPr lang="en-US" sz="2400" dirty="0" err="1">
+                <a:latin typeface="Titillium Web" panose="00000500000000000000" pitchFamily="2" charset="0"/>
+                <a:ea typeface="Open Sans" panose="020B0606030504020204" pitchFamily="34" charset="0"/>
+                <a:cs typeface="Open Sans" panose="020B0606030504020204" pitchFamily="34" charset="0"/>
+              </a:rPr>
+              <a:t>sklearn</a:t>
+            </a:r>
+            <a:r>
+              <a:rPr lang="en-US" sz="2400" dirty="0">
+                <a:latin typeface="Titillium Web" panose="00000500000000000000" pitchFamily="2" charset="0"/>
+                <a:ea typeface="Open Sans" panose="020B0606030504020204" pitchFamily="34" charset="0"/>
+                <a:cs typeface="Open Sans" panose="020B0606030504020204" pitchFamily="34" charset="0"/>
+              </a:rPr>
+              <a:t> classification report was used on the query intent evaluation. On these datasets, the models were generally comparable to each other. For query intent classification, the BERT model slightly outperformed the DIET model on 5 of the 6 datasets on all metrics but F1 score. The HWU64 dataset was also used to train the DIET model for 200 epochs to see if it improved model performance, but no notable improvement was observed. Further fine-tuning of the rasa model might close the gap between the models, but it is notable that the model performs almost as well as BERT with a significantly smaller dataset than even what </a:t>
+            </a:r>
+            <a:r>
+              <a:rPr lang="en-US" sz="2400" dirty="0" err="1">
+                <a:latin typeface="Titillium Web" panose="00000500000000000000" pitchFamily="2" charset="0"/>
+                <a:ea typeface="Open Sans" panose="020B0606030504020204" pitchFamily="34" charset="0"/>
+                <a:cs typeface="Open Sans" panose="020B0606030504020204" pitchFamily="34" charset="0"/>
+              </a:rPr>
+              <a:t>distilbert</a:t>
+            </a:r>
+            <a:r>
+              <a:rPr lang="en-US" sz="2400" dirty="0">
+                <a:latin typeface="Titillium Web" panose="00000500000000000000" pitchFamily="2" charset="0"/>
+                <a:ea typeface="Open Sans" panose="020B0606030504020204" pitchFamily="34" charset="0"/>
+                <a:cs typeface="Open Sans" panose="020B0606030504020204" pitchFamily="34" charset="0"/>
+              </a:rPr>
+              <a:t> is trained on.</a:t>
             </a:r>
           </a:p>
         </p:txBody>
@@ -6586,7 +6966,7 @@
         <p:spPr bwMode="auto">
           <a:xfrm>
             <a:off x="731520" y="19541556"/>
-            <a:ext cx="10058400" cy="507831"/>
+            <a:ext cx="10058400" cy="5678478"/>
           </a:xfrm>
           <a:prstGeom prst="rect">
             <a:avLst/>
@@ -6731,12 +7111,46 @@
           </a:lstStyle>
           <a:p>
             <a:r>
-              <a:rPr lang="en-US" sz="2400">
+              <a:rPr lang="en-US" sz="2400" dirty="0">
                 <a:latin typeface="Titillium Web" panose="00000500000000000000" pitchFamily="2" charset="0"/>
                 <a:ea typeface="Open Sans" panose="020B0606030504020204" pitchFamily="34" charset="0"/>
                 <a:cs typeface="Open Sans" panose="020B0606030504020204" pitchFamily="34" charset="0"/>
               </a:rPr>
-              <a:t>Add your information, graphs, and images to this section.</a:t>
+              <a:t>Some recent research indicates that for specific domains where the language style differs from the data used to train BERT, training a transformer architecture from scratch can approach the performance of these larger architectures, some instances outperforming them. This project is based on one of the papers (Bunk, et al. 2020) reviewed, which showed that training a custom model, named the Dual Intent and Entity Transformer (DIET) from scratch outperforms BERT with fine tuning on intent classification and entity recognition. However, this was after what appears to be some fine tuning on the DIET model. The goal of this project is to compare the out-of-the box performance of each of these models from a practitioner’s perspective. Thus, part of this project was to identify some of the datasets that were used in that paper (SNIPS, ATIS) to train and compare these two models. The BERT model used was trained using the </a:t>
+            </a:r>
+            <a:r>
+              <a:rPr lang="en-US" sz="2400" dirty="0" err="1">
+                <a:latin typeface="Titillium Web" panose="00000500000000000000" pitchFamily="2" charset="0"/>
+                <a:ea typeface="Open Sans" panose="020B0606030504020204" pitchFamily="34" charset="0"/>
+                <a:cs typeface="Open Sans" panose="020B0606030504020204" pitchFamily="34" charset="0"/>
+                <a:hlinkClick r:id="rId3"/>
+              </a:rPr>
+              <a:t>Huggingface</a:t>
+            </a:r>
+            <a:r>
+              <a:rPr lang="en-US" sz="2400" dirty="0">
+                <a:latin typeface="Titillium Web" panose="00000500000000000000" pitchFamily="2" charset="0"/>
+                <a:ea typeface="Open Sans" panose="020B0606030504020204" pitchFamily="34" charset="0"/>
+                <a:cs typeface="Open Sans" panose="020B0606030504020204" pitchFamily="34" charset="0"/>
+              </a:rPr>
+              <a:t> library, and the DIET model was trained using the </a:t>
+            </a:r>
+            <a:r>
+              <a:rPr lang="en-US" sz="2400" dirty="0">
+                <a:latin typeface="Titillium Web" panose="00000500000000000000" pitchFamily="2" charset="0"/>
+                <a:ea typeface="Open Sans" panose="020B0606030504020204" pitchFamily="34" charset="0"/>
+                <a:cs typeface="Open Sans" panose="020B0606030504020204" pitchFamily="34" charset="0"/>
+                <a:hlinkClick r:id="rId4"/>
+              </a:rPr>
+              <a:t>Rasa</a:t>
+            </a:r>
+            <a:r>
+              <a:rPr lang="en-US" sz="2400" dirty="0">
+                <a:latin typeface="Titillium Web" panose="00000500000000000000" pitchFamily="2" charset="0"/>
+                <a:ea typeface="Open Sans" panose="020B0606030504020204" pitchFamily="34" charset="0"/>
+                <a:cs typeface="Open Sans" panose="020B0606030504020204" pitchFamily="34" charset="0"/>
+              </a:rPr>
+              <a:t> python conversational AI library.</a:t>
             </a:r>
           </a:p>
         </p:txBody>
@@ -6805,7 +7219,7 @@
         <p:spPr>
           <a:xfrm>
             <a:off x="33157855" y="8073317"/>
-            <a:ext cx="9857035" cy="461665"/>
+            <a:ext cx="9857035" cy="6740307"/>
           </a:xfrm>
           <a:prstGeom prst="rect">
             <a:avLst/>
@@ -6823,12 +7237,45 @@
           </a:lstStyle>
           <a:p>
             <a:r>
-              <a:rPr lang="en-US" sz="2400">
+              <a:rPr lang="en-US" sz="2400" dirty="0">
                 <a:latin typeface="Titillium Web" panose="00000500000000000000" pitchFamily="2" charset="0"/>
                 <a:ea typeface="Open Sans" panose="020B0606030504020204" pitchFamily="34" charset="0"/>
                 <a:cs typeface="Open Sans" panose="020B0606030504020204" pitchFamily="34" charset="0"/>
               </a:rPr>
-              <a:t>Add your information, graphs, and images to this section.</a:t>
+              <a:t>This project demonstrated that the BERT and DIET models provide comparable results out-of-the-box on the six datasets reviewed. BERT tends to outperform DIET, which might be the result of more semantic information being available within the model itself that can help with understanding unseen examples. However, it should be noted that these models were trained with mostly default hyperparameters and minimal tuning. The DIET performance is quite admirable given the fact that it is trained on a relatively small dataset compared to BERT. It is also important to note that the authors of (Bunk, et al. 2020) are Rasa employees, and the results of that work might be biased towards that company’s product. </a:t>
+            </a:r>
+          </a:p>
+          <a:p>
+            <a:endParaRPr lang="en-US" sz="2400" dirty="0">
+              <a:latin typeface="Titillium Web" panose="00000500000000000000" pitchFamily="2" charset="0"/>
+              <a:ea typeface="Open Sans" panose="020B0606030504020204" pitchFamily="34" charset="0"/>
+              <a:cs typeface="Open Sans" panose="020B0606030504020204" pitchFamily="34" charset="0"/>
+            </a:endParaRPr>
+          </a:p>
+          <a:p>
+            <a:r>
+              <a:rPr lang="en-US" sz="2400" dirty="0">
+                <a:latin typeface="Titillium Web" panose="00000500000000000000" pitchFamily="2" charset="0"/>
+                <a:ea typeface="Open Sans" panose="020B0606030504020204" pitchFamily="34" charset="0"/>
+                <a:cs typeface="Open Sans" panose="020B0606030504020204" pitchFamily="34" charset="0"/>
+              </a:rPr>
+              <a:t>For future work, it would be interesting to build a multi-task </a:t>
+            </a:r>
+            <a:r>
+              <a:rPr lang="en-US" sz="2400" dirty="0" err="1">
+                <a:latin typeface="Titillium Web" panose="00000500000000000000" pitchFamily="2" charset="0"/>
+                <a:ea typeface="Open Sans" panose="020B0606030504020204" pitchFamily="34" charset="0"/>
+                <a:cs typeface="Open Sans" panose="020B0606030504020204" pitchFamily="34" charset="0"/>
+              </a:rPr>
+              <a:t>Huggingface</a:t>
+            </a:r>
+            <a:r>
+              <a:rPr lang="en-US" sz="2400" dirty="0">
+                <a:latin typeface="Titillium Web" panose="00000500000000000000" pitchFamily="2" charset="0"/>
+                <a:ea typeface="Open Sans" panose="020B0606030504020204" pitchFamily="34" charset="0"/>
+                <a:cs typeface="Open Sans" panose="020B0606030504020204" pitchFamily="34" charset="0"/>
+              </a:rPr>
+              <a:t> model to perform sequence and token classification (i.e., NER), train the model on this dataset and compare the performance of the models. Furthermore, additional fine tuning of the DIET model would be interesting to see whether it can close the gap with BERT. Furthermore, training the models on additional datasets and comparing the results would also be enlightening.</a:t>
             </a:r>
           </a:p>
         </p:txBody>
@@ -6848,7 +7295,7 @@
         <p:spPr>
           <a:xfrm>
             <a:off x="33101279" y="26096643"/>
-            <a:ext cx="9857035" cy="3231654"/>
+            <a:ext cx="9857035" cy="5262979"/>
           </a:xfrm>
           <a:prstGeom prst="rect">
             <a:avLst/>
@@ -6865,315 +7312,283 @@
             </a:defPPr>
           </a:lstStyle>
           <a:p>
-            <a:pPr marL="457200" marR="0" indent="-457200">
-              <a:spcBef>
-                <a:spcPts val="0"/>
-              </a:spcBef>
-              <a:spcAft>
-                <a:spcPts val="0"/>
-              </a:spcAft>
+            <a:pPr marL="342900" indent="-342900">
+              <a:buFont typeface="Arial" panose="020B0604020202020204" pitchFamily="34" charset="0"/>
+              <a:buChar char="•"/>
             </a:pPr>
-            <a:r>
-              <a:rPr lang="en-US" sz="1800" dirty="0">
-                <a:effectLst/>
-                <a:latin typeface="Calibri" panose="020F0502020204030204" pitchFamily="34" charset="0"/>
-                <a:ea typeface="Calibri" panose="020F0502020204030204" pitchFamily="34" charset="0"/>
-                <a:cs typeface="Times New Roman" panose="02020603050405020304" pitchFamily="18" charset="0"/>
-              </a:rPr>
-              <a:t>Language Understanding for Dialogue Systems."</a:t>
-            </a:r>
-          </a:p>
-          <a:p>
-            <a:pPr marL="457200" marR="0" indent="-457200">
-              <a:spcBef>
-                <a:spcPts val="0"/>
-              </a:spcBef>
-              <a:spcAft>
-                <a:spcPts val="0"/>
-              </a:spcAft>
-            </a:pPr>
-            <a:r>
-              <a:rPr lang="en-US" sz="1800" dirty="0">
-                <a:effectLst/>
-                <a:latin typeface="Calibri" panose="020F0502020204030204" pitchFamily="34" charset="0"/>
-                <a:ea typeface="Calibri" panose="020F0502020204030204" pitchFamily="34" charset="0"/>
-                <a:cs typeface="Times New Roman" panose="02020603050405020304" pitchFamily="18" charset="0"/>
-              </a:rPr>
-              <a:t>Guo, Weiwei, </a:t>
-            </a:r>
-            <a:r>
-              <a:rPr lang="en-US" sz="1800" dirty="0" err="1">
-                <a:effectLst/>
-                <a:latin typeface="Calibri" panose="020F0502020204030204" pitchFamily="34" charset="0"/>
-                <a:ea typeface="Calibri" panose="020F0502020204030204" pitchFamily="34" charset="0"/>
-                <a:cs typeface="Times New Roman" panose="02020603050405020304" pitchFamily="18" charset="0"/>
-              </a:rPr>
-              <a:t>Xiaowei</a:t>
-            </a:r>
-            <a:r>
-              <a:rPr lang="en-US" sz="1800" dirty="0">
-                <a:effectLst/>
-                <a:latin typeface="Calibri" panose="020F0502020204030204" pitchFamily="34" charset="0"/>
-                <a:ea typeface="Calibri" panose="020F0502020204030204" pitchFamily="34" charset="0"/>
-                <a:cs typeface="Times New Roman" panose="02020603050405020304" pitchFamily="18" charset="0"/>
-              </a:rPr>
-              <a:t> Liu, </a:t>
-            </a:r>
-            <a:r>
-              <a:rPr lang="en-US" sz="1800" dirty="0" err="1">
-                <a:effectLst/>
-                <a:latin typeface="Calibri" panose="020F0502020204030204" pitchFamily="34" charset="0"/>
-                <a:ea typeface="Calibri" panose="020F0502020204030204" pitchFamily="34" charset="0"/>
-                <a:cs typeface="Times New Roman" panose="02020603050405020304" pitchFamily="18" charset="0"/>
-              </a:rPr>
-              <a:t>Sida</a:t>
-            </a:r>
-            <a:r>
-              <a:rPr lang="en-US" sz="1800" dirty="0">
-                <a:effectLst/>
-                <a:latin typeface="Calibri" panose="020F0502020204030204" pitchFamily="34" charset="0"/>
-                <a:ea typeface="Calibri" panose="020F0502020204030204" pitchFamily="34" charset="0"/>
-                <a:cs typeface="Times New Roman" panose="02020603050405020304" pitchFamily="18" charset="0"/>
-              </a:rPr>
-              <a:t> Wang, </a:t>
-            </a:r>
-            <a:r>
-              <a:rPr lang="en-US" sz="1800" dirty="0" err="1">
-                <a:effectLst/>
-                <a:latin typeface="Calibri" panose="020F0502020204030204" pitchFamily="34" charset="0"/>
-                <a:ea typeface="Calibri" panose="020F0502020204030204" pitchFamily="34" charset="0"/>
-                <a:cs typeface="Times New Roman" panose="02020603050405020304" pitchFamily="18" charset="0"/>
-              </a:rPr>
-              <a:t>Huiji</a:t>
-            </a:r>
-            <a:r>
-              <a:rPr lang="en-US" sz="1800" dirty="0">
-                <a:effectLst/>
-                <a:latin typeface="Calibri" panose="020F0502020204030204" pitchFamily="34" charset="0"/>
-                <a:ea typeface="Calibri" panose="020F0502020204030204" pitchFamily="34" charset="0"/>
-                <a:cs typeface="Times New Roman" panose="02020603050405020304" pitchFamily="18" charset="0"/>
-              </a:rPr>
-              <a:t> Gao, Ananth Sankar, </a:t>
-            </a:r>
-            <a:r>
-              <a:rPr lang="en-US" sz="1800" dirty="0" err="1">
-                <a:effectLst/>
-                <a:latin typeface="Calibri" panose="020F0502020204030204" pitchFamily="34" charset="0"/>
-                <a:ea typeface="Calibri" panose="020F0502020204030204" pitchFamily="34" charset="0"/>
-                <a:cs typeface="Times New Roman" panose="02020603050405020304" pitchFamily="18" charset="0"/>
-              </a:rPr>
-              <a:t>Zimeng</a:t>
-            </a:r>
-            <a:r>
-              <a:rPr lang="en-US" sz="1800" dirty="0">
-                <a:effectLst/>
-                <a:latin typeface="Calibri" panose="020F0502020204030204" pitchFamily="34" charset="0"/>
-                <a:ea typeface="Calibri" panose="020F0502020204030204" pitchFamily="34" charset="0"/>
-                <a:cs typeface="Times New Roman" panose="02020603050405020304" pitchFamily="18" charset="0"/>
-              </a:rPr>
-              <a:t> Yang, Qi Guo, et al. 2020. "</a:t>
-            </a:r>
-            <a:r>
-              <a:rPr lang="en-US" sz="1800" dirty="0" err="1">
-                <a:effectLst/>
-                <a:latin typeface="Calibri" panose="020F0502020204030204" pitchFamily="34" charset="0"/>
-                <a:ea typeface="Calibri" panose="020F0502020204030204" pitchFamily="34" charset="0"/>
-                <a:cs typeface="Times New Roman" panose="02020603050405020304" pitchFamily="18" charset="0"/>
-              </a:rPr>
-              <a:t>DeText</a:t>
-            </a:r>
-            <a:r>
-              <a:rPr lang="en-US" sz="1800" dirty="0">
-                <a:effectLst/>
-                <a:latin typeface="Calibri" panose="020F0502020204030204" pitchFamily="34" charset="0"/>
-                <a:ea typeface="Calibri" panose="020F0502020204030204" pitchFamily="34" charset="0"/>
-                <a:cs typeface="Times New Roman" panose="02020603050405020304" pitchFamily="18" charset="0"/>
-              </a:rPr>
-              <a:t>: A Deep Text Ranking Framework with BERT." </a:t>
-            </a:r>
-            <a:r>
-              <a:rPr lang="en-US" sz="1800" i="1" dirty="0" err="1">
-                <a:effectLst/>
-                <a:latin typeface="Calibri" panose="020F0502020204030204" pitchFamily="34" charset="0"/>
-                <a:ea typeface="Calibri" panose="020F0502020204030204" pitchFamily="34" charset="0"/>
-                <a:cs typeface="Times New Roman" panose="02020603050405020304" pitchFamily="18" charset="0"/>
-              </a:rPr>
-              <a:t>CoRR</a:t>
-            </a:r>
-            <a:r>
-              <a:rPr lang="en-US" sz="1800" dirty="0">
-                <a:effectLst/>
-                <a:latin typeface="Calibri" panose="020F0502020204030204" pitchFamily="34" charset="0"/>
-                <a:ea typeface="Calibri" panose="020F0502020204030204" pitchFamily="34" charset="0"/>
-                <a:cs typeface="Times New Roman" panose="02020603050405020304" pitchFamily="18" charset="0"/>
-              </a:rPr>
-              <a:t> abs/2008.02460. https://arxiv.org/abs/2008.02460.</a:t>
-            </a:r>
-          </a:p>
-          <a:p>
-            <a:pPr marL="457200" marR="0" indent="-457200">
-              <a:spcBef>
-                <a:spcPts val="0"/>
-              </a:spcBef>
-              <a:spcAft>
-                <a:spcPts val="0"/>
-              </a:spcAft>
-            </a:pPr>
-            <a:r>
-              <a:rPr lang="en-US" sz="1800" dirty="0">
-                <a:effectLst/>
-                <a:latin typeface="Calibri" panose="020F0502020204030204" pitchFamily="34" charset="0"/>
-                <a:ea typeface="Calibri" panose="020F0502020204030204" pitchFamily="34" charset="0"/>
-                <a:cs typeface="Times New Roman" panose="02020603050405020304" pitchFamily="18" charset="0"/>
-              </a:rPr>
-              <a:t>Larson, Stefan, Anish Mahendran, Joseph J. </a:t>
-            </a:r>
-            <a:r>
-              <a:rPr lang="en-US" sz="1800" dirty="0" err="1">
-                <a:effectLst/>
-                <a:latin typeface="Calibri" panose="020F0502020204030204" pitchFamily="34" charset="0"/>
-                <a:ea typeface="Calibri" panose="020F0502020204030204" pitchFamily="34" charset="0"/>
-                <a:cs typeface="Times New Roman" panose="02020603050405020304" pitchFamily="18" charset="0"/>
-              </a:rPr>
-              <a:t>Peper</a:t>
-            </a:r>
-            <a:r>
-              <a:rPr lang="en-US" sz="1800" dirty="0">
-                <a:effectLst/>
-                <a:latin typeface="Calibri" panose="020F0502020204030204" pitchFamily="34" charset="0"/>
-                <a:ea typeface="Calibri" panose="020F0502020204030204" pitchFamily="34" charset="0"/>
-                <a:cs typeface="Times New Roman" panose="02020603050405020304" pitchFamily="18" charset="0"/>
-              </a:rPr>
-              <a:t>, Christopher Clarke, Andrew Lee, Parker Hill, Jonathan K. Kummerfeld, et al. 2019. "An Evaluation Dataset for Intent Classification and Out-of-Scope Prediction."</a:t>
-            </a:r>
-          </a:p>
-          <a:p>
-            <a:pPr marL="457200" marR="0" indent="-457200">
-              <a:spcBef>
-                <a:spcPts val="0"/>
-              </a:spcBef>
-              <a:spcAft>
-                <a:spcPts val="0"/>
-              </a:spcAft>
-            </a:pPr>
-            <a:r>
-              <a:rPr lang="en-US" sz="1800" dirty="0" err="1">
-                <a:effectLst/>
-                <a:latin typeface="Calibri" panose="020F0502020204030204" pitchFamily="34" charset="0"/>
-                <a:ea typeface="Calibri" panose="020F0502020204030204" pitchFamily="34" charset="0"/>
-                <a:cs typeface="Times New Roman" panose="02020603050405020304" pitchFamily="18" charset="0"/>
-              </a:rPr>
-              <a:t>Tejaswini</a:t>
-            </a:r>
-            <a:r>
-              <a:rPr lang="en-US" sz="1800" dirty="0">
-                <a:effectLst/>
-                <a:latin typeface="Calibri" panose="020F0502020204030204" pitchFamily="34" charset="0"/>
-                <a:ea typeface="Calibri" panose="020F0502020204030204" pitchFamily="34" charset="0"/>
-                <a:cs typeface="Times New Roman" panose="02020603050405020304" pitchFamily="18" charset="0"/>
-              </a:rPr>
-              <a:t> </a:t>
-            </a:r>
-            <a:r>
-              <a:rPr lang="en-US" sz="1800" dirty="0" err="1">
-                <a:effectLst/>
-                <a:latin typeface="Calibri" panose="020F0502020204030204" pitchFamily="34" charset="0"/>
-                <a:ea typeface="Calibri" panose="020F0502020204030204" pitchFamily="34" charset="0"/>
-                <a:cs typeface="Times New Roman" panose="02020603050405020304" pitchFamily="18" charset="0"/>
-              </a:rPr>
-              <a:t>Mallavarapu</a:t>
-            </a:r>
-            <a:r>
-              <a:rPr lang="en-US" sz="1800" dirty="0">
-                <a:effectLst/>
-                <a:latin typeface="Calibri" panose="020F0502020204030204" pitchFamily="34" charset="0"/>
-                <a:ea typeface="Calibri" panose="020F0502020204030204" pitchFamily="34" charset="0"/>
-                <a:cs typeface="Times New Roman" panose="02020603050405020304" pitchFamily="18" charset="0"/>
-              </a:rPr>
-              <a:t>, Ying </a:t>
-            </a:r>
-            <a:r>
-              <a:rPr lang="en-US" sz="1800" dirty="0" err="1">
-                <a:effectLst/>
-                <a:latin typeface="Calibri" panose="020F0502020204030204" pitchFamily="34" charset="0"/>
-                <a:ea typeface="Calibri" panose="020F0502020204030204" pitchFamily="34" charset="0"/>
-                <a:cs typeface="Times New Roman" panose="02020603050405020304" pitchFamily="18" charset="0"/>
-              </a:rPr>
-              <a:t>Xie</a:t>
-            </a:r>
-            <a:r>
-              <a:rPr lang="en-US" sz="1800" dirty="0">
-                <a:effectLst/>
-                <a:latin typeface="Calibri" panose="020F0502020204030204" pitchFamily="34" charset="0"/>
-                <a:ea typeface="Calibri" panose="020F0502020204030204" pitchFamily="34" charset="0"/>
-                <a:cs typeface="Times New Roman" panose="02020603050405020304" pitchFamily="18" charset="0"/>
-              </a:rPr>
-              <a:t>, and Simon Hughes. 2022. "</a:t>
-            </a:r>
-            <a:r>
-              <a:rPr lang="en-US" sz="1800" dirty="0" err="1">
-                <a:effectLst/>
-                <a:latin typeface="Calibri" panose="020F0502020204030204" pitchFamily="34" charset="0"/>
-                <a:ea typeface="Calibri" panose="020F0502020204030204" pitchFamily="34" charset="0"/>
-                <a:cs typeface="Times New Roman" panose="02020603050405020304" pitchFamily="18" charset="0"/>
-              </a:rPr>
-              <a:t>CatBERT</a:t>
-            </a:r>
-            <a:r>
-              <a:rPr lang="en-US" sz="1800" dirty="0">
-                <a:effectLst/>
-                <a:latin typeface="Calibri" panose="020F0502020204030204" pitchFamily="34" charset="0"/>
-                <a:ea typeface="Calibri" panose="020F0502020204030204" pitchFamily="34" charset="0"/>
-                <a:cs typeface="Times New Roman" panose="02020603050405020304" pitchFamily="18" charset="0"/>
-              </a:rPr>
-              <a:t>: An Incrementally Trained Language Representation Model for E-Commerce Applications." </a:t>
-            </a:r>
-            <a:r>
-              <a:rPr lang="en-US" sz="1800" i="1" dirty="0">
-                <a:effectLst/>
-                <a:latin typeface="Calibri" panose="020F0502020204030204" pitchFamily="34" charset="0"/>
-                <a:ea typeface="Calibri" panose="020F0502020204030204" pitchFamily="34" charset="0"/>
-                <a:cs typeface="Times New Roman" panose="02020603050405020304" pitchFamily="18" charset="0"/>
-              </a:rPr>
-              <a:t>Proceedings of the International Workshop on Interactive and Scalable Information Retrieval methods for eCommerce (ISIR-</a:t>
-            </a:r>
-            <a:r>
-              <a:rPr lang="en-US" sz="1800" i="1" dirty="0" err="1">
-                <a:effectLst/>
-                <a:latin typeface="Calibri" panose="020F0502020204030204" pitchFamily="34" charset="0"/>
-                <a:ea typeface="Calibri" panose="020F0502020204030204" pitchFamily="34" charset="0"/>
-                <a:cs typeface="Times New Roman" panose="02020603050405020304" pitchFamily="18" charset="0"/>
-              </a:rPr>
-              <a:t>eCom</a:t>
-            </a:r>
-            <a:r>
-              <a:rPr lang="en-US" sz="1800" i="1" dirty="0">
-                <a:effectLst/>
-                <a:latin typeface="Calibri" panose="020F0502020204030204" pitchFamily="34" charset="0"/>
-                <a:ea typeface="Calibri" panose="020F0502020204030204" pitchFamily="34" charset="0"/>
-                <a:cs typeface="Times New Roman" panose="02020603050405020304" pitchFamily="18" charset="0"/>
-              </a:rPr>
-              <a:t>).</a:t>
-            </a:r>
-            <a:r>
-              <a:rPr lang="en-US" sz="1800" dirty="0">
-                <a:effectLst/>
-                <a:latin typeface="Calibri" panose="020F0502020204030204" pitchFamily="34" charset="0"/>
-                <a:ea typeface="Calibri" panose="020F0502020204030204" pitchFamily="34" charset="0"/>
-                <a:cs typeface="Times New Roman" panose="02020603050405020304" pitchFamily="18" charset="0"/>
-              </a:rPr>
-              <a:t> </a:t>
-            </a:r>
-          </a:p>
-          <a:p>
             <a:r>
               <a:rPr lang="en-US" sz="2400" dirty="0">
                 <a:latin typeface="Titillium Web" panose="00000500000000000000" pitchFamily="2" charset="0"/>
                 <a:ea typeface="Open Sans" panose="020B0606030504020204" pitchFamily="34" charset="0"/>
                 <a:cs typeface="Open Sans" panose="020B0606030504020204" pitchFamily="34" charset="0"/>
               </a:rPr>
-              <a:t>.</a:t>
-            </a:r>
+              <a:t>Bunk, Tanja, Daksh </a:t>
+            </a:r>
+            <a:r>
+              <a:rPr lang="en-US" sz="2400" dirty="0" err="1">
+                <a:latin typeface="Titillium Web" panose="00000500000000000000" pitchFamily="2" charset="0"/>
+                <a:ea typeface="Open Sans" panose="020B0606030504020204" pitchFamily="34" charset="0"/>
+                <a:cs typeface="Open Sans" panose="020B0606030504020204" pitchFamily="34" charset="0"/>
+              </a:rPr>
+              <a:t>Varshneya</a:t>
+            </a:r>
+            <a:r>
+              <a:rPr lang="en-US" sz="2400" dirty="0">
+                <a:latin typeface="Titillium Web" panose="00000500000000000000" pitchFamily="2" charset="0"/>
+                <a:ea typeface="Open Sans" panose="020B0606030504020204" pitchFamily="34" charset="0"/>
+                <a:cs typeface="Open Sans" panose="020B0606030504020204" pitchFamily="34" charset="0"/>
+              </a:rPr>
+              <a:t>, Vladimir </a:t>
+            </a:r>
+            <a:r>
+              <a:rPr lang="en-US" sz="2400" dirty="0" err="1">
+                <a:latin typeface="Titillium Web" panose="00000500000000000000" pitchFamily="2" charset="0"/>
+                <a:ea typeface="Open Sans" panose="020B0606030504020204" pitchFamily="34" charset="0"/>
+                <a:cs typeface="Open Sans" panose="020B0606030504020204" pitchFamily="34" charset="0"/>
+              </a:rPr>
+              <a:t>Vlasov</a:t>
+            </a:r>
+            <a:r>
+              <a:rPr lang="en-US" sz="2400" dirty="0">
+                <a:latin typeface="Titillium Web" panose="00000500000000000000" pitchFamily="2" charset="0"/>
+                <a:ea typeface="Open Sans" panose="020B0606030504020204" pitchFamily="34" charset="0"/>
+                <a:cs typeface="Open Sans" panose="020B0606030504020204" pitchFamily="34" charset="0"/>
+              </a:rPr>
+              <a:t>, and Alan Nichol. 2020. "DIET: Lightweight Language Understanding for Dialogue Systems."</a:t>
+            </a:r>
+          </a:p>
+          <a:p>
+            <a:pPr marL="342900" indent="-342900">
+              <a:buFont typeface="Arial" panose="020B0604020202020204" pitchFamily="34" charset="0"/>
+              <a:buChar char="•"/>
+            </a:pPr>
+            <a:r>
+              <a:rPr lang="en-US" sz="2400" dirty="0">
+                <a:latin typeface="Titillium Web" panose="00000500000000000000" pitchFamily="2" charset="0"/>
+                <a:ea typeface="Open Sans" panose="020B0606030504020204" pitchFamily="34" charset="0"/>
+                <a:cs typeface="Open Sans" panose="020B0606030504020204" pitchFamily="34" charset="0"/>
+              </a:rPr>
+              <a:t>Guo, Weiwei, </a:t>
+            </a:r>
+            <a:r>
+              <a:rPr lang="en-US" sz="2400" dirty="0" err="1">
+                <a:latin typeface="Titillium Web" panose="00000500000000000000" pitchFamily="2" charset="0"/>
+                <a:ea typeface="Open Sans" panose="020B0606030504020204" pitchFamily="34" charset="0"/>
+                <a:cs typeface="Open Sans" panose="020B0606030504020204" pitchFamily="34" charset="0"/>
+              </a:rPr>
+              <a:t>Xiaowei</a:t>
+            </a:r>
+            <a:r>
+              <a:rPr lang="en-US" sz="2400" dirty="0">
+                <a:latin typeface="Titillium Web" panose="00000500000000000000" pitchFamily="2" charset="0"/>
+                <a:ea typeface="Open Sans" panose="020B0606030504020204" pitchFamily="34" charset="0"/>
+                <a:cs typeface="Open Sans" panose="020B0606030504020204" pitchFamily="34" charset="0"/>
+              </a:rPr>
+              <a:t> Liu, </a:t>
+            </a:r>
+            <a:r>
+              <a:rPr lang="en-US" sz="2400" dirty="0" err="1">
+                <a:latin typeface="Titillium Web" panose="00000500000000000000" pitchFamily="2" charset="0"/>
+                <a:ea typeface="Open Sans" panose="020B0606030504020204" pitchFamily="34" charset="0"/>
+                <a:cs typeface="Open Sans" panose="020B0606030504020204" pitchFamily="34" charset="0"/>
+              </a:rPr>
+              <a:t>Sida</a:t>
+            </a:r>
+            <a:r>
+              <a:rPr lang="en-US" sz="2400" dirty="0">
+                <a:latin typeface="Titillium Web" panose="00000500000000000000" pitchFamily="2" charset="0"/>
+                <a:ea typeface="Open Sans" panose="020B0606030504020204" pitchFamily="34" charset="0"/>
+                <a:cs typeface="Open Sans" panose="020B0606030504020204" pitchFamily="34" charset="0"/>
+              </a:rPr>
+              <a:t> Wang, </a:t>
+            </a:r>
+            <a:r>
+              <a:rPr lang="en-US" sz="2400" dirty="0" err="1">
+                <a:latin typeface="Titillium Web" panose="00000500000000000000" pitchFamily="2" charset="0"/>
+                <a:ea typeface="Open Sans" panose="020B0606030504020204" pitchFamily="34" charset="0"/>
+                <a:cs typeface="Open Sans" panose="020B0606030504020204" pitchFamily="34" charset="0"/>
+              </a:rPr>
+              <a:t>Huiji</a:t>
+            </a:r>
+            <a:r>
+              <a:rPr lang="en-US" sz="2400" dirty="0">
+                <a:latin typeface="Titillium Web" panose="00000500000000000000" pitchFamily="2" charset="0"/>
+                <a:ea typeface="Open Sans" panose="020B0606030504020204" pitchFamily="34" charset="0"/>
+                <a:cs typeface="Open Sans" panose="020B0606030504020204" pitchFamily="34" charset="0"/>
+              </a:rPr>
+              <a:t> Gao, Ananth Sankar, </a:t>
+            </a:r>
+            <a:r>
+              <a:rPr lang="en-US" sz="2400" dirty="0" err="1">
+                <a:latin typeface="Titillium Web" panose="00000500000000000000" pitchFamily="2" charset="0"/>
+                <a:ea typeface="Open Sans" panose="020B0606030504020204" pitchFamily="34" charset="0"/>
+                <a:cs typeface="Open Sans" panose="020B0606030504020204" pitchFamily="34" charset="0"/>
+              </a:rPr>
+              <a:t>Zimeng</a:t>
+            </a:r>
+            <a:r>
+              <a:rPr lang="en-US" sz="2400" dirty="0">
+                <a:latin typeface="Titillium Web" panose="00000500000000000000" pitchFamily="2" charset="0"/>
+                <a:ea typeface="Open Sans" panose="020B0606030504020204" pitchFamily="34" charset="0"/>
+                <a:cs typeface="Open Sans" panose="020B0606030504020204" pitchFamily="34" charset="0"/>
+              </a:rPr>
+              <a:t> Yang, Qi Guo, et al. 2020. "</a:t>
+            </a:r>
+            <a:r>
+              <a:rPr lang="en-US" sz="2400" dirty="0" err="1">
+                <a:latin typeface="Titillium Web" panose="00000500000000000000" pitchFamily="2" charset="0"/>
+                <a:ea typeface="Open Sans" panose="020B0606030504020204" pitchFamily="34" charset="0"/>
+                <a:cs typeface="Open Sans" panose="020B0606030504020204" pitchFamily="34" charset="0"/>
+              </a:rPr>
+              <a:t>DeText</a:t>
+            </a:r>
+            <a:r>
+              <a:rPr lang="en-US" sz="2400" dirty="0">
+                <a:latin typeface="Titillium Web" panose="00000500000000000000" pitchFamily="2" charset="0"/>
+                <a:ea typeface="Open Sans" panose="020B0606030504020204" pitchFamily="34" charset="0"/>
+                <a:cs typeface="Open Sans" panose="020B0606030504020204" pitchFamily="34" charset="0"/>
+              </a:rPr>
+              <a:t>: A Deep Text Ranking Framework with BERT." </a:t>
+            </a:r>
+            <a:r>
+              <a:rPr lang="en-US" sz="2400" dirty="0" err="1">
+                <a:latin typeface="Titillium Web" panose="00000500000000000000" pitchFamily="2" charset="0"/>
+                <a:ea typeface="Open Sans" panose="020B0606030504020204" pitchFamily="34" charset="0"/>
+                <a:cs typeface="Open Sans" panose="020B0606030504020204" pitchFamily="34" charset="0"/>
+              </a:rPr>
+              <a:t>CoRR</a:t>
+            </a:r>
+            <a:r>
+              <a:rPr lang="en-US" sz="2400" dirty="0">
+                <a:latin typeface="Titillium Web" panose="00000500000000000000" pitchFamily="2" charset="0"/>
+                <a:ea typeface="Open Sans" panose="020B0606030504020204" pitchFamily="34" charset="0"/>
+                <a:cs typeface="Open Sans" panose="020B0606030504020204" pitchFamily="34" charset="0"/>
+              </a:rPr>
+              <a:t> abs/2008.02460. https://arxiv.org/abs/2008.02460.</a:t>
+            </a:r>
+          </a:p>
+          <a:p>
+            <a:pPr marL="342900" indent="-342900">
+              <a:buFont typeface="Arial" panose="020B0604020202020204" pitchFamily="34" charset="0"/>
+              <a:buChar char="•"/>
+            </a:pPr>
+            <a:r>
+              <a:rPr lang="en-US" sz="2400" dirty="0">
+                <a:latin typeface="Titillium Web" panose="00000500000000000000" pitchFamily="2" charset="0"/>
+                <a:ea typeface="Open Sans" panose="020B0606030504020204" pitchFamily="34" charset="0"/>
+                <a:cs typeface="Open Sans" panose="020B0606030504020204" pitchFamily="34" charset="0"/>
+              </a:rPr>
+              <a:t>Larson, Stefan, Anish Mahendran, Joseph J. </a:t>
+            </a:r>
+            <a:r>
+              <a:rPr lang="en-US" sz="2400" dirty="0" err="1">
+                <a:latin typeface="Titillium Web" panose="00000500000000000000" pitchFamily="2" charset="0"/>
+                <a:ea typeface="Open Sans" panose="020B0606030504020204" pitchFamily="34" charset="0"/>
+                <a:cs typeface="Open Sans" panose="020B0606030504020204" pitchFamily="34" charset="0"/>
+              </a:rPr>
+              <a:t>Peper</a:t>
+            </a:r>
+            <a:r>
+              <a:rPr lang="en-US" sz="2400" dirty="0">
+                <a:latin typeface="Titillium Web" panose="00000500000000000000" pitchFamily="2" charset="0"/>
+                <a:ea typeface="Open Sans" panose="020B0606030504020204" pitchFamily="34" charset="0"/>
+                <a:cs typeface="Open Sans" panose="020B0606030504020204" pitchFamily="34" charset="0"/>
+              </a:rPr>
+              <a:t>, Christopher Clarke, Andrew Lee, Parker Hill, Jonathan K. Kummerfeld, et al. 2019. "An Evaluation Dataset for Intent Classification and Out-of-Scope Prediction."</a:t>
+            </a:r>
+          </a:p>
+          <a:p>
+            <a:pPr marL="342900" indent="-342900">
+              <a:buFont typeface="Arial" panose="020B0604020202020204" pitchFamily="34" charset="0"/>
+              <a:buChar char="•"/>
+            </a:pPr>
+            <a:r>
+              <a:rPr lang="en-US" sz="2400" dirty="0" err="1">
+                <a:latin typeface="Titillium Web" panose="00000500000000000000" pitchFamily="2" charset="0"/>
+                <a:ea typeface="Open Sans" panose="020B0606030504020204" pitchFamily="34" charset="0"/>
+                <a:cs typeface="Open Sans" panose="020B0606030504020204" pitchFamily="34" charset="0"/>
+              </a:rPr>
+              <a:t>Tejaswini</a:t>
+            </a:r>
+            <a:r>
+              <a:rPr lang="en-US" sz="2400" dirty="0">
+                <a:latin typeface="Titillium Web" panose="00000500000000000000" pitchFamily="2" charset="0"/>
+                <a:ea typeface="Open Sans" panose="020B0606030504020204" pitchFamily="34" charset="0"/>
+                <a:cs typeface="Open Sans" panose="020B0606030504020204" pitchFamily="34" charset="0"/>
+              </a:rPr>
+              <a:t> </a:t>
+            </a:r>
+            <a:r>
+              <a:rPr lang="en-US" sz="2400" dirty="0" err="1">
+                <a:latin typeface="Titillium Web" panose="00000500000000000000" pitchFamily="2" charset="0"/>
+                <a:ea typeface="Open Sans" panose="020B0606030504020204" pitchFamily="34" charset="0"/>
+                <a:cs typeface="Open Sans" panose="020B0606030504020204" pitchFamily="34" charset="0"/>
+              </a:rPr>
+              <a:t>Mallavarapu</a:t>
+            </a:r>
+            <a:r>
+              <a:rPr lang="en-US" sz="2400" dirty="0">
+                <a:latin typeface="Titillium Web" panose="00000500000000000000" pitchFamily="2" charset="0"/>
+                <a:ea typeface="Open Sans" panose="020B0606030504020204" pitchFamily="34" charset="0"/>
+                <a:cs typeface="Open Sans" panose="020B0606030504020204" pitchFamily="34" charset="0"/>
+              </a:rPr>
+              <a:t>, Ying </a:t>
+            </a:r>
+            <a:r>
+              <a:rPr lang="en-US" sz="2400" dirty="0" err="1">
+                <a:latin typeface="Titillium Web" panose="00000500000000000000" pitchFamily="2" charset="0"/>
+                <a:ea typeface="Open Sans" panose="020B0606030504020204" pitchFamily="34" charset="0"/>
+                <a:cs typeface="Open Sans" panose="020B0606030504020204" pitchFamily="34" charset="0"/>
+              </a:rPr>
+              <a:t>Xie</a:t>
+            </a:r>
+            <a:r>
+              <a:rPr lang="en-US" sz="2400" dirty="0">
+                <a:latin typeface="Titillium Web" panose="00000500000000000000" pitchFamily="2" charset="0"/>
+                <a:ea typeface="Open Sans" panose="020B0606030504020204" pitchFamily="34" charset="0"/>
+                <a:cs typeface="Open Sans" panose="020B0606030504020204" pitchFamily="34" charset="0"/>
+              </a:rPr>
+              <a:t>, and Simon Hughes. 2022. "</a:t>
+            </a:r>
+            <a:r>
+              <a:rPr lang="en-US" sz="2400" dirty="0" err="1">
+                <a:latin typeface="Titillium Web" panose="00000500000000000000" pitchFamily="2" charset="0"/>
+                <a:ea typeface="Open Sans" panose="020B0606030504020204" pitchFamily="34" charset="0"/>
+                <a:cs typeface="Open Sans" panose="020B0606030504020204" pitchFamily="34" charset="0"/>
+              </a:rPr>
+              <a:t>CatBERT</a:t>
+            </a:r>
+            <a:r>
+              <a:rPr lang="en-US" sz="2400" dirty="0">
+                <a:latin typeface="Titillium Web" panose="00000500000000000000" pitchFamily="2" charset="0"/>
+                <a:ea typeface="Open Sans" panose="020B0606030504020204" pitchFamily="34" charset="0"/>
+                <a:cs typeface="Open Sans" panose="020B0606030504020204" pitchFamily="34" charset="0"/>
+              </a:rPr>
+              <a:t>: An Incrementally Trained Language Representation Model for E-Commerce Applications." Proceedings of the International Workshop on Interactive and Scalable Information Retrieval methods for eCommerce (ISIR-</a:t>
+            </a:r>
+            <a:r>
+              <a:rPr lang="en-US" sz="2400" dirty="0" err="1">
+                <a:latin typeface="Titillium Web" panose="00000500000000000000" pitchFamily="2" charset="0"/>
+                <a:ea typeface="Open Sans" panose="020B0606030504020204" pitchFamily="34" charset="0"/>
+                <a:cs typeface="Open Sans" panose="020B0606030504020204" pitchFamily="34" charset="0"/>
+              </a:rPr>
+              <a:t>eCom</a:t>
+            </a:r>
+            <a:r>
+              <a:rPr lang="en-US" sz="2400" dirty="0">
+                <a:latin typeface="Titillium Web" panose="00000500000000000000" pitchFamily="2" charset="0"/>
+                <a:ea typeface="Open Sans" panose="020B0606030504020204" pitchFamily="34" charset="0"/>
+                <a:cs typeface="Open Sans" panose="020B0606030504020204" pitchFamily="34" charset="0"/>
+              </a:rPr>
+              <a:t>). </a:t>
+            </a:r>
+          </a:p>
+          <a:p>
+            <a:endParaRPr lang="en-US" sz="2400" dirty="0">
+              <a:latin typeface="Titillium Web" panose="00000500000000000000" pitchFamily="2" charset="0"/>
+              <a:ea typeface="Open Sans" panose="020B0606030504020204" pitchFamily="34" charset="0"/>
+              <a:cs typeface="Open Sans" panose="020B0606030504020204" pitchFamily="34" charset="0"/>
+            </a:endParaRPr>
           </a:p>
         </p:txBody>
       </p:sp>
@@ -7186,7 +7601,7 @@
           <p:nvPr/>
         </p:nvPicPr>
         <p:blipFill>
-          <a:blip r:embed="rId2">
+          <a:blip r:embed="rId5">
             <a:extLst>
               <a:ext uri="{28A0092B-C50C-407E-A947-70E740481C1C}">
                 <a14:useLocalDpi xmlns:a14="http://schemas.microsoft.com/office/drawing/2010/main" val="0"/>
@@ -7233,18 +7648,18 @@
           <p:nvPr>
             <p:extLst>
               <p:ext uri="{D42A27DB-BD31-4B8C-83A1-F6EECF244321}">
-                <p14:modId xmlns:p14="http://schemas.microsoft.com/office/powerpoint/2010/main" val="2133729326"/>
+                <p14:modId xmlns:p14="http://schemas.microsoft.com/office/powerpoint/2010/main" val="352741185"/>
               </p:ext>
             </p:extLst>
           </p:nvPr>
         </p:nvGraphicFramePr>
         <p:xfrm>
-          <a:off x="22642830" y="8953798"/>
-          <a:ext cx="9323070" cy="4562385"/>
+          <a:off x="22311361" y="12925047"/>
+          <a:ext cx="10789918" cy="5604469"/>
         </p:xfrm>
         <a:graphic>
           <a:graphicData uri="http://schemas.openxmlformats.org/drawingml/2006/chart">
-            <c:chart xmlns:c="http://schemas.openxmlformats.org/drawingml/2006/chart" xmlns:r="http://schemas.openxmlformats.org/officeDocument/2006/relationships" r:id="rId3"/>
+            <c:chart xmlns:c="http://schemas.openxmlformats.org/drawingml/2006/chart" xmlns:r="http://schemas.openxmlformats.org/officeDocument/2006/relationships" r:id="rId6"/>
           </a:graphicData>
         </a:graphic>
       </p:graphicFrame>
@@ -7261,18 +7676,1119 @@
           <p:nvPr>
             <p:extLst>
               <p:ext uri="{D42A27DB-BD31-4B8C-83A1-F6EECF244321}">
-                <p14:modId xmlns:p14="http://schemas.microsoft.com/office/powerpoint/2010/main" val="2218630746"/>
+                <p14:modId xmlns:p14="http://schemas.microsoft.com/office/powerpoint/2010/main" val="3152420045"/>
               </p:ext>
             </p:extLst>
           </p:nvPr>
         </p:nvGraphicFramePr>
         <p:xfrm>
-          <a:off x="22642830" y="13516183"/>
-          <a:ext cx="9323070" cy="4888960"/>
+          <a:off x="22311360" y="18673072"/>
+          <a:ext cx="10789917" cy="6127181"/>
         </p:xfrm>
         <a:graphic>
           <a:graphicData uri="http://schemas.openxmlformats.org/drawingml/2006/chart">
-            <c:chart xmlns:c="http://schemas.openxmlformats.org/drawingml/2006/chart" xmlns:r="http://schemas.openxmlformats.org/officeDocument/2006/relationships" r:id="rId4"/>
+            <c:chart xmlns:c="http://schemas.openxmlformats.org/drawingml/2006/chart" xmlns:r="http://schemas.openxmlformats.org/officeDocument/2006/relationships" r:id="rId7"/>
+          </a:graphicData>
+        </a:graphic>
+      </p:graphicFrame>
+      <p:pic>
+        <p:nvPicPr>
+          <p:cNvPr id="6" name="Graphic 5">
+            <a:extLst>
+              <a:ext uri="{FF2B5EF4-FFF2-40B4-BE49-F238E27FC236}">
+                <a16:creationId xmlns:a16="http://schemas.microsoft.com/office/drawing/2014/main" id="{BFA1EEE7-3650-4D5D-8B3E-3F21BB2B4C06}"/>
+              </a:ext>
+            </a:extLst>
+          </p:cNvPr>
+          <p:cNvPicPr>
+            <a:picLocks noChangeAspect="1"/>
+          </p:cNvPicPr>
+          <p:nvPr/>
+        </p:nvPicPr>
+        <p:blipFill>
+          <a:blip r:embed="rId8">
+            <a:extLst>
+              <a:ext uri="{96DAC541-7B7A-43D3-8B79-37D633B846F1}">
+                <asvg:svgBlip xmlns:asvg="http://schemas.microsoft.com/office/drawing/2016/SVG/main" r:embed="rId9"/>
+              </a:ext>
+            </a:extLst>
+          </a:blip>
+          <a:stretch>
+            <a:fillRect/>
+          </a:stretch>
+        </p:blipFill>
+        <p:spPr>
+          <a:xfrm>
+            <a:off x="1388973" y="26673730"/>
+            <a:ext cx="1588152" cy="1471130"/>
+          </a:xfrm>
+          <a:prstGeom prst="rect">
+            <a:avLst/>
+          </a:prstGeom>
+        </p:spPr>
+      </p:pic>
+      <p:pic>
+        <p:nvPicPr>
+          <p:cNvPr id="8" name="Picture 7" descr="Icon&#10;&#10;Description automatically generated">
+            <a:extLst>
+              <a:ext uri="{FF2B5EF4-FFF2-40B4-BE49-F238E27FC236}">
+                <a16:creationId xmlns:a16="http://schemas.microsoft.com/office/drawing/2014/main" id="{D302815F-4812-4E94-9C2F-A19422DFB384}"/>
+              </a:ext>
+            </a:extLst>
+          </p:cNvPr>
+          <p:cNvPicPr>
+            <a:picLocks noChangeAspect="1"/>
+          </p:cNvPicPr>
+          <p:nvPr/>
+        </p:nvPicPr>
+        <p:blipFill>
+          <a:blip r:embed="rId10"/>
+          <a:stretch>
+            <a:fillRect/>
+          </a:stretch>
+        </p:blipFill>
+        <p:spPr>
+          <a:xfrm>
+            <a:off x="5582920" y="26736043"/>
+            <a:ext cx="3981450" cy="1945951"/>
+          </a:xfrm>
+          <a:prstGeom prst="rect">
+            <a:avLst/>
+          </a:prstGeom>
+        </p:spPr>
+      </p:pic>
+      <p:graphicFrame>
+        <p:nvGraphicFramePr>
+          <p:cNvPr id="9" name="Table 8">
+            <a:extLst>
+              <a:ext uri="{FF2B5EF4-FFF2-40B4-BE49-F238E27FC236}">
+                <a16:creationId xmlns:a16="http://schemas.microsoft.com/office/drawing/2014/main" id="{EC4C7FF2-80D3-4BDF-84FD-6C30D46E414B}"/>
+              </a:ext>
+            </a:extLst>
+          </p:cNvPr>
+          <p:cNvGraphicFramePr>
+            <a:graphicFrameLocks noGrp="1"/>
+          </p:cNvGraphicFramePr>
+          <p:nvPr>
+            <p:extLst>
+              <p:ext uri="{D42A27DB-BD31-4B8C-83A1-F6EECF244321}">
+                <p14:modId xmlns:p14="http://schemas.microsoft.com/office/powerpoint/2010/main" val="2703947763"/>
+              </p:ext>
+            </p:extLst>
+          </p:nvPr>
+        </p:nvGraphicFramePr>
+        <p:xfrm>
+          <a:off x="22311361" y="25642131"/>
+          <a:ext cx="9323070" cy="4457700"/>
+        </p:xfrm>
+        <a:graphic>
+          <a:graphicData uri="http://schemas.openxmlformats.org/drawingml/2006/table">
+            <a:tbl>
+              <a:tblPr>
+                <a:tableStyleId>{5C22544A-7EE6-4342-B048-85BDC9FD1C3A}</a:tableStyleId>
+              </a:tblPr>
+              <a:tblGrid>
+                <a:gridCol w="1864614">
+                  <a:extLst>
+                    <a:ext uri="{9D8B030D-6E8A-4147-A177-3AD203B41FA5}">
+                      <a16:colId xmlns:a16="http://schemas.microsoft.com/office/drawing/2014/main" val="3726431048"/>
+                    </a:ext>
+                  </a:extLst>
+                </a:gridCol>
+                <a:gridCol w="1864614">
+                  <a:extLst>
+                    <a:ext uri="{9D8B030D-6E8A-4147-A177-3AD203B41FA5}">
+                      <a16:colId xmlns:a16="http://schemas.microsoft.com/office/drawing/2014/main" val="3586047524"/>
+                    </a:ext>
+                  </a:extLst>
+                </a:gridCol>
+                <a:gridCol w="1864614">
+                  <a:extLst>
+                    <a:ext uri="{9D8B030D-6E8A-4147-A177-3AD203B41FA5}">
+                      <a16:colId xmlns:a16="http://schemas.microsoft.com/office/drawing/2014/main" val="3329891462"/>
+                    </a:ext>
+                  </a:extLst>
+                </a:gridCol>
+                <a:gridCol w="1864614">
+                  <a:extLst>
+                    <a:ext uri="{9D8B030D-6E8A-4147-A177-3AD203B41FA5}">
+                      <a16:colId xmlns:a16="http://schemas.microsoft.com/office/drawing/2014/main" val="3983423330"/>
+                    </a:ext>
+                  </a:extLst>
+                </a:gridCol>
+                <a:gridCol w="1864614">
+                  <a:extLst>
+                    <a:ext uri="{9D8B030D-6E8A-4147-A177-3AD203B41FA5}">
+                      <a16:colId xmlns:a16="http://schemas.microsoft.com/office/drawing/2014/main" val="4020348358"/>
+                    </a:ext>
+                  </a:extLst>
+                </a:gridCol>
+              </a:tblGrid>
+              <a:tr h="429300">
+                <a:tc gridSpan="5">
+                  <a:txBody>
+                    <a:bodyPr/>
+                    <a:lstStyle/>
+                    <a:p>
+                      <a:pPr algn="ctr" fontAlgn="b"/>
+                      <a:r>
+                        <a:rPr lang="en-US" sz="3200" b="1" u="none" strike="noStrike" dirty="0">
+                          <a:effectLst/>
+                        </a:rPr>
+                        <a:t>Task: Intent Classification</a:t>
+                      </a:r>
+                      <a:endParaRPr lang="en-US" sz="3200" b="1" i="0" u="none" strike="noStrike" dirty="0">
+                        <a:solidFill>
+                          <a:srgbClr val="000000"/>
+                        </a:solidFill>
+                        <a:effectLst/>
+                        <a:latin typeface="Calibri" panose="020F0502020204030204" pitchFamily="34" charset="0"/>
+                      </a:endParaRPr>
+                    </a:p>
+                  </a:txBody>
+                  <a:tcPr marL="7620" marR="7620" marT="7620" marB="0" anchor="b"/>
+                </a:tc>
+                <a:tc hMerge="1">
+                  <a:txBody>
+                    <a:bodyPr/>
+                    <a:lstStyle/>
+                    <a:p>
+                      <a:endParaRPr lang="en-US"/>
+                    </a:p>
+                  </a:txBody>
+                  <a:tcPr/>
+                </a:tc>
+                <a:tc hMerge="1">
+                  <a:txBody>
+                    <a:bodyPr/>
+                    <a:lstStyle/>
+                    <a:p>
+                      <a:endParaRPr lang="en-US"/>
+                    </a:p>
+                  </a:txBody>
+                  <a:tcPr/>
+                </a:tc>
+                <a:tc hMerge="1">
+                  <a:txBody>
+                    <a:bodyPr/>
+                    <a:lstStyle/>
+                    <a:p>
+                      <a:endParaRPr lang="en-US"/>
+                    </a:p>
+                  </a:txBody>
+                  <a:tcPr/>
+                </a:tc>
+                <a:tc hMerge="1">
+                  <a:txBody>
+                    <a:bodyPr/>
+                    <a:lstStyle/>
+                    <a:p>
+                      <a:endParaRPr lang="en-US"/>
+                    </a:p>
+                  </a:txBody>
+                  <a:tcPr/>
+                </a:tc>
+                <a:extLst>
+                  <a:ext uri="{0D108BD9-81ED-4DB2-BD59-A6C34878D82A}">
+                    <a16:rowId xmlns:a16="http://schemas.microsoft.com/office/drawing/2014/main" val="3063117759"/>
+                  </a:ext>
+                </a:extLst>
+              </a:tr>
+              <a:tr h="429300">
+                <a:tc>
+                  <a:txBody>
+                    <a:bodyPr/>
+                    <a:lstStyle/>
+                    <a:p>
+                      <a:pPr algn="ctr" fontAlgn="b"/>
+                      <a:r>
+                        <a:rPr lang="en-US" sz="3200" u="none" strike="noStrike" dirty="0">
+                          <a:effectLst/>
+                        </a:rPr>
+                        <a:t>Model</a:t>
+                      </a:r>
+                      <a:endParaRPr lang="en-US" sz="3200" b="1" i="0" u="none" strike="noStrike" dirty="0">
+                        <a:solidFill>
+                          <a:srgbClr val="000000"/>
+                        </a:solidFill>
+                        <a:effectLst/>
+                        <a:latin typeface="Calibri" panose="020F0502020204030204" pitchFamily="34" charset="0"/>
+                      </a:endParaRPr>
+                    </a:p>
+                  </a:txBody>
+                  <a:tcPr marL="7620" marR="7620" marT="7620" marB="0" anchor="b"/>
+                </a:tc>
+                <a:tc>
+                  <a:txBody>
+                    <a:bodyPr/>
+                    <a:lstStyle/>
+                    <a:p>
+                      <a:pPr algn="ctr" fontAlgn="b"/>
+                      <a:r>
+                        <a:rPr lang="en-US" sz="3200" u="none" strike="noStrike" dirty="0">
+                          <a:effectLst/>
+                        </a:rPr>
+                        <a:t>Precision</a:t>
+                      </a:r>
+                      <a:endParaRPr lang="en-US" sz="3200" b="1" i="0" u="none" strike="noStrike" dirty="0">
+                        <a:solidFill>
+                          <a:srgbClr val="000000"/>
+                        </a:solidFill>
+                        <a:effectLst/>
+                        <a:latin typeface="Calibri" panose="020F0502020204030204" pitchFamily="34" charset="0"/>
+                      </a:endParaRPr>
+                    </a:p>
+                  </a:txBody>
+                  <a:tcPr marL="7620" marR="7620" marT="7620" marB="0" anchor="b"/>
+                </a:tc>
+                <a:tc>
+                  <a:txBody>
+                    <a:bodyPr/>
+                    <a:lstStyle/>
+                    <a:p>
+                      <a:pPr algn="ctr" fontAlgn="b"/>
+                      <a:r>
+                        <a:rPr lang="en-US" sz="3200" u="none" strike="noStrike" dirty="0">
+                          <a:effectLst/>
+                        </a:rPr>
+                        <a:t>Recall</a:t>
+                      </a:r>
+                      <a:endParaRPr lang="en-US" sz="3200" b="1" i="0" u="none" strike="noStrike" dirty="0">
+                        <a:solidFill>
+                          <a:srgbClr val="000000"/>
+                        </a:solidFill>
+                        <a:effectLst/>
+                        <a:latin typeface="Calibri" panose="020F0502020204030204" pitchFamily="34" charset="0"/>
+                      </a:endParaRPr>
+                    </a:p>
+                  </a:txBody>
+                  <a:tcPr marL="7620" marR="7620" marT="7620" marB="0" anchor="b"/>
+                </a:tc>
+                <a:tc>
+                  <a:txBody>
+                    <a:bodyPr/>
+                    <a:lstStyle/>
+                    <a:p>
+                      <a:pPr algn="ctr" fontAlgn="b"/>
+                      <a:r>
+                        <a:rPr lang="en-US" sz="3200" u="none" strike="noStrike" dirty="0">
+                          <a:effectLst/>
+                        </a:rPr>
+                        <a:t>F1-Score</a:t>
+                      </a:r>
+                      <a:endParaRPr lang="en-US" sz="3200" b="1" i="0" u="none" strike="noStrike" dirty="0">
+                        <a:solidFill>
+                          <a:srgbClr val="000000"/>
+                        </a:solidFill>
+                        <a:effectLst/>
+                        <a:latin typeface="Calibri" panose="020F0502020204030204" pitchFamily="34" charset="0"/>
+                      </a:endParaRPr>
+                    </a:p>
+                  </a:txBody>
+                  <a:tcPr marL="7620" marR="7620" marT="7620" marB="0" anchor="b"/>
+                </a:tc>
+                <a:tc>
+                  <a:txBody>
+                    <a:bodyPr/>
+                    <a:lstStyle/>
+                    <a:p>
+                      <a:pPr algn="ctr" fontAlgn="b"/>
+                      <a:r>
+                        <a:rPr lang="en-US" sz="3200" u="none" strike="noStrike" dirty="0">
+                          <a:effectLst/>
+                        </a:rPr>
+                        <a:t>Accuracy</a:t>
+                      </a:r>
+                      <a:endParaRPr lang="en-US" sz="3200" b="1" i="0" u="none" strike="noStrike" dirty="0">
+                        <a:solidFill>
+                          <a:srgbClr val="000000"/>
+                        </a:solidFill>
+                        <a:effectLst/>
+                        <a:latin typeface="Calibri" panose="020F0502020204030204" pitchFamily="34" charset="0"/>
+                      </a:endParaRPr>
+                    </a:p>
+                  </a:txBody>
+                  <a:tcPr marL="7620" marR="7620" marT="7620" marB="0" anchor="b"/>
+                </a:tc>
+                <a:extLst>
+                  <a:ext uri="{0D108BD9-81ED-4DB2-BD59-A6C34878D82A}">
+                    <a16:rowId xmlns:a16="http://schemas.microsoft.com/office/drawing/2014/main" val="3286189234"/>
+                  </a:ext>
+                </a:extLst>
+              </a:tr>
+              <a:tr h="429300">
+                <a:tc>
+                  <a:txBody>
+                    <a:bodyPr/>
+                    <a:lstStyle/>
+                    <a:p>
+                      <a:pPr algn="ctr" fontAlgn="b"/>
+                      <a:r>
+                        <a:rPr lang="en-US" sz="3200" u="none" strike="noStrike" dirty="0">
+                          <a:effectLst/>
+                        </a:rPr>
+                        <a:t>BERT</a:t>
+                      </a:r>
+                      <a:endParaRPr lang="en-US" sz="3200" b="0" i="0" u="none" strike="noStrike" dirty="0">
+                        <a:solidFill>
+                          <a:srgbClr val="000000"/>
+                        </a:solidFill>
+                        <a:effectLst/>
+                        <a:latin typeface="Calibri" panose="020F0502020204030204" pitchFamily="34" charset="0"/>
+                      </a:endParaRPr>
+                    </a:p>
+                  </a:txBody>
+                  <a:tcPr marL="7620" marR="7620" marT="7620" marB="0" anchor="b"/>
+                </a:tc>
+                <a:tc>
+                  <a:txBody>
+                    <a:bodyPr/>
+                    <a:lstStyle/>
+                    <a:p>
+                      <a:pPr algn="ctr" fontAlgn="b"/>
+                      <a:r>
+                        <a:rPr lang="en-US" sz="3200" u="none" strike="noStrike" dirty="0">
+                          <a:effectLst/>
+                        </a:rPr>
+                        <a:t>0.953135</a:t>
+                      </a:r>
+                      <a:endParaRPr lang="en-US" sz="3200" b="0" i="0" u="none" strike="noStrike" dirty="0">
+                        <a:solidFill>
+                          <a:srgbClr val="000000"/>
+                        </a:solidFill>
+                        <a:effectLst/>
+                        <a:latin typeface="Calibri" panose="020F0502020204030204" pitchFamily="34" charset="0"/>
+                      </a:endParaRPr>
+                    </a:p>
+                  </a:txBody>
+                  <a:tcPr marL="7620" marR="7620" marT="7620" marB="0" anchor="b"/>
+                </a:tc>
+                <a:tc>
+                  <a:txBody>
+                    <a:bodyPr/>
+                    <a:lstStyle/>
+                    <a:p>
+                      <a:pPr algn="ctr" fontAlgn="b"/>
+                      <a:r>
+                        <a:rPr lang="en-US" sz="3200" u="none" strike="noStrike" dirty="0">
+                          <a:effectLst/>
+                        </a:rPr>
+                        <a:t>0.952023</a:t>
+                      </a:r>
+                      <a:endParaRPr lang="en-US" sz="3200" b="0" i="0" u="none" strike="noStrike" dirty="0">
+                        <a:solidFill>
+                          <a:srgbClr val="000000"/>
+                        </a:solidFill>
+                        <a:effectLst/>
+                        <a:latin typeface="Calibri" panose="020F0502020204030204" pitchFamily="34" charset="0"/>
+                      </a:endParaRPr>
+                    </a:p>
+                  </a:txBody>
+                  <a:tcPr marL="7620" marR="7620" marT="7620" marB="0" anchor="b"/>
+                </a:tc>
+                <a:tc>
+                  <a:txBody>
+                    <a:bodyPr/>
+                    <a:lstStyle/>
+                    <a:p>
+                      <a:pPr algn="ctr" fontAlgn="b"/>
+                      <a:r>
+                        <a:rPr lang="en-US" sz="3200" u="none" strike="noStrike">
+                          <a:effectLst/>
+                        </a:rPr>
+                        <a:t>0.898755</a:t>
+                      </a:r>
+                      <a:endParaRPr lang="en-US" sz="3200" b="0" i="0" u="none" strike="noStrike">
+                        <a:solidFill>
+                          <a:srgbClr val="000000"/>
+                        </a:solidFill>
+                        <a:effectLst/>
+                        <a:latin typeface="Calibri" panose="020F0502020204030204" pitchFamily="34" charset="0"/>
+                      </a:endParaRPr>
+                    </a:p>
+                  </a:txBody>
+                  <a:tcPr marL="7620" marR="7620" marT="7620" marB="0" anchor="b"/>
+                </a:tc>
+                <a:tc>
+                  <a:txBody>
+                    <a:bodyPr/>
+                    <a:lstStyle/>
+                    <a:p>
+                      <a:pPr algn="ctr" fontAlgn="b"/>
+                      <a:r>
+                        <a:rPr lang="en-US" sz="3200" u="none" strike="noStrike">
+                          <a:effectLst/>
+                        </a:rPr>
+                        <a:t>0.952023</a:t>
+                      </a:r>
+                      <a:endParaRPr lang="en-US" sz="3200" b="0" i="0" u="none" strike="noStrike">
+                        <a:solidFill>
+                          <a:srgbClr val="000000"/>
+                        </a:solidFill>
+                        <a:effectLst/>
+                        <a:latin typeface="Calibri" panose="020F0502020204030204" pitchFamily="34" charset="0"/>
+                      </a:endParaRPr>
+                    </a:p>
+                  </a:txBody>
+                  <a:tcPr marL="7620" marR="7620" marT="7620" marB="0" anchor="b"/>
+                </a:tc>
+                <a:extLst>
+                  <a:ext uri="{0D108BD9-81ED-4DB2-BD59-A6C34878D82A}">
+                    <a16:rowId xmlns:a16="http://schemas.microsoft.com/office/drawing/2014/main" val="3482741982"/>
+                  </a:ext>
+                </a:extLst>
+              </a:tr>
+              <a:tr h="429300">
+                <a:tc>
+                  <a:txBody>
+                    <a:bodyPr/>
+                    <a:lstStyle/>
+                    <a:p>
+                      <a:pPr algn="ctr" fontAlgn="b"/>
+                      <a:r>
+                        <a:rPr lang="en-US" sz="3200" u="none" strike="noStrike">
+                          <a:effectLst/>
+                        </a:rPr>
+                        <a:t>DIET</a:t>
+                      </a:r>
+                      <a:endParaRPr lang="en-US" sz="3200" b="0" i="0" u="none" strike="noStrike">
+                        <a:solidFill>
+                          <a:srgbClr val="000000"/>
+                        </a:solidFill>
+                        <a:effectLst/>
+                        <a:latin typeface="Calibri" panose="020F0502020204030204" pitchFamily="34" charset="0"/>
+                      </a:endParaRPr>
+                    </a:p>
+                  </a:txBody>
+                  <a:tcPr marL="7620" marR="7620" marT="7620" marB="0" anchor="b"/>
+                </a:tc>
+                <a:tc>
+                  <a:txBody>
+                    <a:bodyPr/>
+                    <a:lstStyle/>
+                    <a:p>
+                      <a:pPr algn="ctr" fontAlgn="b"/>
+                      <a:r>
+                        <a:rPr lang="en-US" sz="3200" u="none" strike="noStrike">
+                          <a:effectLst/>
+                        </a:rPr>
+                        <a:t>0.941358</a:t>
+                      </a:r>
+                      <a:endParaRPr lang="en-US" sz="3200" b="0" i="0" u="none" strike="noStrike">
+                        <a:solidFill>
+                          <a:srgbClr val="000000"/>
+                        </a:solidFill>
+                        <a:effectLst/>
+                        <a:latin typeface="Calibri" panose="020F0502020204030204" pitchFamily="34" charset="0"/>
+                      </a:endParaRPr>
+                    </a:p>
+                  </a:txBody>
+                  <a:tcPr marL="7620" marR="7620" marT="7620" marB="0" anchor="b"/>
+                </a:tc>
+                <a:tc>
+                  <a:txBody>
+                    <a:bodyPr/>
+                    <a:lstStyle/>
+                    <a:p>
+                      <a:pPr algn="ctr" fontAlgn="b"/>
+                      <a:r>
+                        <a:rPr lang="en-US" sz="3200" u="none" strike="noStrike">
+                          <a:effectLst/>
+                        </a:rPr>
+                        <a:t>0.937397</a:t>
+                      </a:r>
+                      <a:endParaRPr lang="en-US" sz="3200" b="0" i="0" u="none" strike="noStrike">
+                        <a:solidFill>
+                          <a:srgbClr val="000000"/>
+                        </a:solidFill>
+                        <a:effectLst/>
+                        <a:latin typeface="Calibri" panose="020F0502020204030204" pitchFamily="34" charset="0"/>
+                      </a:endParaRPr>
+                    </a:p>
+                  </a:txBody>
+                  <a:tcPr marL="7620" marR="7620" marT="7620" marB="0" anchor="b"/>
+                </a:tc>
+                <a:tc>
+                  <a:txBody>
+                    <a:bodyPr/>
+                    <a:lstStyle/>
+                    <a:p>
+                      <a:pPr algn="ctr" fontAlgn="b"/>
+                      <a:r>
+                        <a:rPr lang="en-US" sz="3200" u="none" strike="noStrike">
+                          <a:effectLst/>
+                        </a:rPr>
+                        <a:t>0.936648</a:t>
+                      </a:r>
+                      <a:endParaRPr lang="en-US" sz="3200" b="0" i="0" u="none" strike="noStrike">
+                        <a:solidFill>
+                          <a:srgbClr val="000000"/>
+                        </a:solidFill>
+                        <a:effectLst/>
+                        <a:latin typeface="Calibri" panose="020F0502020204030204" pitchFamily="34" charset="0"/>
+                      </a:endParaRPr>
+                    </a:p>
+                  </a:txBody>
+                  <a:tcPr marL="7620" marR="7620" marT="7620" marB="0" anchor="b"/>
+                </a:tc>
+                <a:tc>
+                  <a:txBody>
+                    <a:bodyPr/>
+                    <a:lstStyle/>
+                    <a:p>
+                      <a:pPr algn="ctr" fontAlgn="b"/>
+                      <a:r>
+                        <a:rPr lang="en-US" sz="3200" u="none" strike="noStrike" dirty="0">
+                          <a:effectLst/>
+                        </a:rPr>
+                        <a:t>0.937397</a:t>
+                      </a:r>
+                      <a:endParaRPr lang="en-US" sz="3200" b="0" i="0" u="none" strike="noStrike" dirty="0">
+                        <a:solidFill>
+                          <a:srgbClr val="000000"/>
+                        </a:solidFill>
+                        <a:effectLst/>
+                        <a:latin typeface="Calibri" panose="020F0502020204030204" pitchFamily="34" charset="0"/>
+                      </a:endParaRPr>
+                    </a:p>
+                  </a:txBody>
+                  <a:tcPr marL="7620" marR="7620" marT="7620" marB="0" anchor="b"/>
+                </a:tc>
+                <a:extLst>
+                  <a:ext uri="{0D108BD9-81ED-4DB2-BD59-A6C34878D82A}">
+                    <a16:rowId xmlns:a16="http://schemas.microsoft.com/office/drawing/2014/main" val="1559199717"/>
+                  </a:ext>
+                </a:extLst>
+              </a:tr>
+              <a:tr h="429300">
+                <a:tc>
+                  <a:txBody>
+                    <a:bodyPr/>
+                    <a:lstStyle/>
+                    <a:p>
+                      <a:pPr algn="ctr" fontAlgn="b"/>
+                      <a:endParaRPr lang="en-US" sz="3200" b="0" i="0" u="none" strike="noStrike" dirty="0">
+                        <a:solidFill>
+                          <a:srgbClr val="000000"/>
+                        </a:solidFill>
+                        <a:effectLst/>
+                        <a:latin typeface="Calibri" panose="020F0502020204030204" pitchFamily="34" charset="0"/>
+                      </a:endParaRPr>
+                    </a:p>
+                  </a:txBody>
+                  <a:tcPr marL="7620" marR="7620" marT="7620" marB="0" anchor="b"/>
+                </a:tc>
+                <a:tc>
+                  <a:txBody>
+                    <a:bodyPr/>
+                    <a:lstStyle/>
+                    <a:p>
+                      <a:pPr algn="l" fontAlgn="b"/>
+                      <a:endParaRPr lang="en-US" sz="3200" b="0" i="0" u="none" strike="noStrike">
+                        <a:solidFill>
+                          <a:srgbClr val="000000"/>
+                        </a:solidFill>
+                        <a:effectLst/>
+                        <a:latin typeface="Calibri" panose="020F0502020204030204" pitchFamily="34" charset="0"/>
+                      </a:endParaRPr>
+                    </a:p>
+                  </a:txBody>
+                  <a:tcPr marL="7620" marR="7620" marT="7620" marB="0" anchor="b"/>
+                </a:tc>
+                <a:tc>
+                  <a:txBody>
+                    <a:bodyPr/>
+                    <a:lstStyle/>
+                    <a:p>
+                      <a:pPr algn="l" fontAlgn="b"/>
+                      <a:endParaRPr lang="en-US" sz="3200" b="0" i="0" u="none" strike="noStrike">
+                        <a:solidFill>
+                          <a:srgbClr val="000000"/>
+                        </a:solidFill>
+                        <a:effectLst/>
+                        <a:latin typeface="Calibri" panose="020F0502020204030204" pitchFamily="34" charset="0"/>
+                      </a:endParaRPr>
+                    </a:p>
+                  </a:txBody>
+                  <a:tcPr marL="7620" marR="7620" marT="7620" marB="0" anchor="b"/>
+                </a:tc>
+                <a:tc>
+                  <a:txBody>
+                    <a:bodyPr/>
+                    <a:lstStyle/>
+                    <a:p>
+                      <a:pPr algn="l" fontAlgn="b"/>
+                      <a:endParaRPr lang="en-US" sz="3200" b="0" i="0" u="none" strike="noStrike">
+                        <a:solidFill>
+                          <a:srgbClr val="000000"/>
+                        </a:solidFill>
+                        <a:effectLst/>
+                        <a:latin typeface="Calibri" panose="020F0502020204030204" pitchFamily="34" charset="0"/>
+                      </a:endParaRPr>
+                    </a:p>
+                  </a:txBody>
+                  <a:tcPr marL="7620" marR="7620" marT="7620" marB="0" anchor="b"/>
+                </a:tc>
+                <a:tc>
+                  <a:txBody>
+                    <a:bodyPr/>
+                    <a:lstStyle/>
+                    <a:p>
+                      <a:pPr algn="l" fontAlgn="b"/>
+                      <a:endParaRPr lang="en-US" sz="3200" b="0" i="0" u="none" strike="noStrike" dirty="0">
+                        <a:solidFill>
+                          <a:srgbClr val="000000"/>
+                        </a:solidFill>
+                        <a:effectLst/>
+                        <a:latin typeface="Calibri" panose="020F0502020204030204" pitchFamily="34" charset="0"/>
+                      </a:endParaRPr>
+                    </a:p>
+                  </a:txBody>
+                  <a:tcPr marL="7620" marR="7620" marT="7620" marB="0" anchor="b"/>
+                </a:tc>
+                <a:extLst>
+                  <a:ext uri="{0D108BD9-81ED-4DB2-BD59-A6C34878D82A}">
+                    <a16:rowId xmlns:a16="http://schemas.microsoft.com/office/drawing/2014/main" val="386324510"/>
+                  </a:ext>
+                </a:extLst>
+              </a:tr>
+              <a:tr h="429300">
+                <a:tc gridSpan="5">
+                  <a:txBody>
+                    <a:bodyPr/>
+                    <a:lstStyle/>
+                    <a:p>
+                      <a:pPr algn="ctr" fontAlgn="b"/>
+                      <a:r>
+                        <a:rPr lang="en-US" sz="3200" b="1" u="none" strike="noStrike" dirty="0">
+                          <a:effectLst/>
+                        </a:rPr>
+                        <a:t>Task: NER</a:t>
+                      </a:r>
+                      <a:endParaRPr lang="en-US" sz="3200" b="1" i="0" u="none" strike="noStrike" dirty="0">
+                        <a:solidFill>
+                          <a:srgbClr val="000000"/>
+                        </a:solidFill>
+                        <a:effectLst/>
+                        <a:latin typeface="Calibri" panose="020F0502020204030204" pitchFamily="34" charset="0"/>
+                      </a:endParaRPr>
+                    </a:p>
+                  </a:txBody>
+                  <a:tcPr marL="7620" marR="7620" marT="7620" marB="0" anchor="b"/>
+                </a:tc>
+                <a:tc hMerge="1">
+                  <a:txBody>
+                    <a:bodyPr/>
+                    <a:lstStyle/>
+                    <a:p>
+                      <a:endParaRPr lang="en-US"/>
+                    </a:p>
+                  </a:txBody>
+                  <a:tcPr/>
+                </a:tc>
+                <a:tc hMerge="1">
+                  <a:txBody>
+                    <a:bodyPr/>
+                    <a:lstStyle/>
+                    <a:p>
+                      <a:endParaRPr lang="en-US"/>
+                    </a:p>
+                  </a:txBody>
+                  <a:tcPr/>
+                </a:tc>
+                <a:tc hMerge="1">
+                  <a:txBody>
+                    <a:bodyPr/>
+                    <a:lstStyle/>
+                    <a:p>
+                      <a:endParaRPr lang="en-US"/>
+                    </a:p>
+                  </a:txBody>
+                  <a:tcPr/>
+                </a:tc>
+                <a:tc hMerge="1">
+                  <a:txBody>
+                    <a:bodyPr/>
+                    <a:lstStyle/>
+                    <a:p>
+                      <a:endParaRPr lang="en-US"/>
+                    </a:p>
+                  </a:txBody>
+                  <a:tcPr/>
+                </a:tc>
+                <a:extLst>
+                  <a:ext uri="{0D108BD9-81ED-4DB2-BD59-A6C34878D82A}">
+                    <a16:rowId xmlns:a16="http://schemas.microsoft.com/office/drawing/2014/main" val="1000205364"/>
+                  </a:ext>
+                </a:extLst>
+              </a:tr>
+              <a:tr h="429300">
+                <a:tc>
+                  <a:txBody>
+                    <a:bodyPr/>
+                    <a:lstStyle/>
+                    <a:p>
+                      <a:pPr algn="ctr" fontAlgn="b"/>
+                      <a:r>
+                        <a:rPr lang="en-US" sz="3200" u="none" strike="noStrike" dirty="0">
+                          <a:effectLst/>
+                        </a:rPr>
+                        <a:t>Model</a:t>
+                      </a:r>
+                      <a:endParaRPr lang="en-US" sz="3200" b="1" i="0" u="none" strike="noStrike" dirty="0">
+                        <a:solidFill>
+                          <a:srgbClr val="000000"/>
+                        </a:solidFill>
+                        <a:effectLst/>
+                        <a:latin typeface="Calibri" panose="020F0502020204030204" pitchFamily="34" charset="0"/>
+                      </a:endParaRPr>
+                    </a:p>
+                  </a:txBody>
+                  <a:tcPr marL="7620" marR="7620" marT="7620" marB="0" anchor="b"/>
+                </a:tc>
+                <a:tc>
+                  <a:txBody>
+                    <a:bodyPr/>
+                    <a:lstStyle/>
+                    <a:p>
+                      <a:pPr algn="ctr" fontAlgn="b"/>
+                      <a:r>
+                        <a:rPr lang="en-US" sz="3200" u="none" strike="noStrike" dirty="0">
+                          <a:effectLst/>
+                        </a:rPr>
+                        <a:t>Precision</a:t>
+                      </a:r>
+                      <a:endParaRPr lang="en-US" sz="3200" b="1" i="0" u="none" strike="noStrike" dirty="0">
+                        <a:solidFill>
+                          <a:srgbClr val="000000"/>
+                        </a:solidFill>
+                        <a:effectLst/>
+                        <a:latin typeface="Calibri" panose="020F0502020204030204" pitchFamily="34" charset="0"/>
+                      </a:endParaRPr>
+                    </a:p>
+                  </a:txBody>
+                  <a:tcPr marL="7620" marR="7620" marT="7620" marB="0" anchor="b"/>
+                </a:tc>
+                <a:tc>
+                  <a:txBody>
+                    <a:bodyPr/>
+                    <a:lstStyle/>
+                    <a:p>
+                      <a:pPr algn="ctr" fontAlgn="b"/>
+                      <a:r>
+                        <a:rPr lang="en-US" sz="3200" u="none" strike="noStrike" dirty="0">
+                          <a:effectLst/>
+                        </a:rPr>
+                        <a:t>Recall</a:t>
+                      </a:r>
+                      <a:endParaRPr lang="en-US" sz="3200" b="1" i="0" u="none" strike="noStrike" dirty="0">
+                        <a:solidFill>
+                          <a:srgbClr val="000000"/>
+                        </a:solidFill>
+                        <a:effectLst/>
+                        <a:latin typeface="Calibri" panose="020F0502020204030204" pitchFamily="34" charset="0"/>
+                      </a:endParaRPr>
+                    </a:p>
+                  </a:txBody>
+                  <a:tcPr marL="7620" marR="7620" marT="7620" marB="0" anchor="b"/>
+                </a:tc>
+                <a:tc>
+                  <a:txBody>
+                    <a:bodyPr/>
+                    <a:lstStyle/>
+                    <a:p>
+                      <a:pPr algn="ctr" fontAlgn="b"/>
+                      <a:r>
+                        <a:rPr lang="en-US" sz="3200" u="none" strike="noStrike" dirty="0">
+                          <a:effectLst/>
+                        </a:rPr>
+                        <a:t>F1-Score</a:t>
+                      </a:r>
+                      <a:endParaRPr lang="en-US" sz="3200" b="1" i="0" u="none" strike="noStrike" dirty="0">
+                        <a:solidFill>
+                          <a:srgbClr val="000000"/>
+                        </a:solidFill>
+                        <a:effectLst/>
+                        <a:latin typeface="Calibri" panose="020F0502020204030204" pitchFamily="34" charset="0"/>
+                      </a:endParaRPr>
+                    </a:p>
+                  </a:txBody>
+                  <a:tcPr marL="7620" marR="7620" marT="7620" marB="0" anchor="b"/>
+                </a:tc>
+                <a:tc>
+                  <a:txBody>
+                    <a:bodyPr/>
+                    <a:lstStyle/>
+                    <a:p>
+                      <a:pPr algn="ctr" fontAlgn="b"/>
+                      <a:r>
+                        <a:rPr lang="en-US" sz="3200" u="none" strike="noStrike" dirty="0">
+                          <a:effectLst/>
+                        </a:rPr>
+                        <a:t>Accuracy</a:t>
+                      </a:r>
+                      <a:endParaRPr lang="en-US" sz="3200" b="1" i="0" u="none" strike="noStrike" dirty="0">
+                        <a:solidFill>
+                          <a:srgbClr val="000000"/>
+                        </a:solidFill>
+                        <a:effectLst/>
+                        <a:latin typeface="Calibri" panose="020F0502020204030204" pitchFamily="34" charset="0"/>
+                      </a:endParaRPr>
+                    </a:p>
+                  </a:txBody>
+                  <a:tcPr marL="7620" marR="7620" marT="7620" marB="0" anchor="b"/>
+                </a:tc>
+                <a:extLst>
+                  <a:ext uri="{0D108BD9-81ED-4DB2-BD59-A6C34878D82A}">
+                    <a16:rowId xmlns:a16="http://schemas.microsoft.com/office/drawing/2014/main" val="2581081850"/>
+                  </a:ext>
+                </a:extLst>
+              </a:tr>
+              <a:tr h="429300">
+                <a:tc>
+                  <a:txBody>
+                    <a:bodyPr/>
+                    <a:lstStyle/>
+                    <a:p>
+                      <a:pPr algn="ctr" fontAlgn="b"/>
+                      <a:r>
+                        <a:rPr lang="en-US" sz="3200" u="none" strike="noStrike" dirty="0">
+                          <a:effectLst/>
+                        </a:rPr>
+                        <a:t>BERT</a:t>
+                      </a:r>
+                      <a:endParaRPr lang="en-US" sz="3200" b="0" i="0" u="none" strike="noStrike" dirty="0">
+                        <a:solidFill>
+                          <a:srgbClr val="000000"/>
+                        </a:solidFill>
+                        <a:effectLst/>
+                        <a:latin typeface="Calibri" panose="020F0502020204030204" pitchFamily="34" charset="0"/>
+                      </a:endParaRPr>
+                    </a:p>
+                  </a:txBody>
+                  <a:tcPr marL="7620" marR="7620" marT="7620" marB="0" anchor="b"/>
+                </a:tc>
+                <a:tc>
+                  <a:txBody>
+                    <a:bodyPr/>
+                    <a:lstStyle/>
+                    <a:p>
+                      <a:pPr algn="ctr" fontAlgn="b"/>
+                      <a:r>
+                        <a:rPr lang="en-US" sz="3200" u="none" strike="noStrike" dirty="0">
+                          <a:effectLst/>
+                        </a:rPr>
+                        <a:t>0.947154</a:t>
+                      </a:r>
+                      <a:endParaRPr lang="en-US" sz="3200" b="0" i="0" u="none" strike="noStrike" dirty="0">
+                        <a:solidFill>
+                          <a:srgbClr val="000000"/>
+                        </a:solidFill>
+                        <a:effectLst/>
+                        <a:latin typeface="Calibri" panose="020F0502020204030204" pitchFamily="34" charset="0"/>
+                      </a:endParaRPr>
+                    </a:p>
+                  </a:txBody>
+                  <a:tcPr marL="7620" marR="7620" marT="7620" marB="0" anchor="b"/>
+                </a:tc>
+                <a:tc>
+                  <a:txBody>
+                    <a:bodyPr/>
+                    <a:lstStyle/>
+                    <a:p>
+                      <a:pPr algn="ctr" fontAlgn="b"/>
+                      <a:r>
+                        <a:rPr lang="en-US" sz="3200" u="none" strike="noStrike">
+                          <a:effectLst/>
+                        </a:rPr>
+                        <a:t>0.955963</a:t>
+                      </a:r>
+                      <a:endParaRPr lang="en-US" sz="3200" b="0" i="0" u="none" strike="noStrike">
+                        <a:solidFill>
+                          <a:srgbClr val="000000"/>
+                        </a:solidFill>
+                        <a:effectLst/>
+                        <a:latin typeface="Calibri" panose="020F0502020204030204" pitchFamily="34" charset="0"/>
+                      </a:endParaRPr>
+                    </a:p>
+                  </a:txBody>
+                  <a:tcPr marL="7620" marR="7620" marT="7620" marB="0" anchor="b"/>
+                </a:tc>
+                <a:tc>
+                  <a:txBody>
+                    <a:bodyPr/>
+                    <a:lstStyle/>
+                    <a:p>
+                      <a:pPr algn="ctr" fontAlgn="b"/>
+                      <a:r>
+                        <a:rPr lang="en-US" sz="3200" u="none" strike="noStrike">
+                          <a:effectLst/>
+                        </a:rPr>
+                        <a:t>0.951536</a:t>
+                      </a:r>
+                      <a:endParaRPr lang="en-US" sz="3200" b="0" i="0" u="none" strike="noStrike">
+                        <a:solidFill>
+                          <a:srgbClr val="000000"/>
+                        </a:solidFill>
+                        <a:effectLst/>
+                        <a:latin typeface="Calibri" panose="020F0502020204030204" pitchFamily="34" charset="0"/>
+                      </a:endParaRPr>
+                    </a:p>
+                  </a:txBody>
+                  <a:tcPr marL="7620" marR="7620" marT="7620" marB="0" anchor="b"/>
+                </a:tc>
+                <a:tc>
+                  <a:txBody>
+                    <a:bodyPr/>
+                    <a:lstStyle/>
+                    <a:p>
+                      <a:pPr algn="ctr" fontAlgn="b"/>
+                      <a:r>
+                        <a:rPr lang="en-US" sz="3200" u="none" strike="noStrike" dirty="0">
+                          <a:effectLst/>
+                        </a:rPr>
+                        <a:t>0.975778</a:t>
+                      </a:r>
+                      <a:endParaRPr lang="en-US" sz="3200" b="0" i="0" u="none" strike="noStrike" dirty="0">
+                        <a:solidFill>
+                          <a:srgbClr val="000000"/>
+                        </a:solidFill>
+                        <a:effectLst/>
+                        <a:latin typeface="Calibri" panose="020F0502020204030204" pitchFamily="34" charset="0"/>
+                      </a:endParaRPr>
+                    </a:p>
+                  </a:txBody>
+                  <a:tcPr marL="7620" marR="7620" marT="7620" marB="0" anchor="b"/>
+                </a:tc>
+                <a:extLst>
+                  <a:ext uri="{0D108BD9-81ED-4DB2-BD59-A6C34878D82A}">
+                    <a16:rowId xmlns:a16="http://schemas.microsoft.com/office/drawing/2014/main" val="375534283"/>
+                  </a:ext>
+                </a:extLst>
+              </a:tr>
+              <a:tr h="429300">
+                <a:tc>
+                  <a:txBody>
+                    <a:bodyPr/>
+                    <a:lstStyle/>
+                    <a:p>
+                      <a:pPr algn="ctr" fontAlgn="b"/>
+                      <a:r>
+                        <a:rPr lang="en-US" sz="3200" u="none" strike="noStrike" dirty="0">
+                          <a:effectLst/>
+                        </a:rPr>
+                        <a:t>DIET</a:t>
+                      </a:r>
+                      <a:endParaRPr lang="en-US" sz="3200" b="0" i="0" u="none" strike="noStrike" dirty="0">
+                        <a:solidFill>
+                          <a:srgbClr val="000000"/>
+                        </a:solidFill>
+                        <a:effectLst/>
+                        <a:latin typeface="Calibri" panose="020F0502020204030204" pitchFamily="34" charset="0"/>
+                      </a:endParaRPr>
+                    </a:p>
+                  </a:txBody>
+                  <a:tcPr marL="7620" marR="7620" marT="7620" marB="0" anchor="b"/>
+                </a:tc>
+                <a:tc>
+                  <a:txBody>
+                    <a:bodyPr/>
+                    <a:lstStyle/>
+                    <a:p>
+                      <a:pPr algn="ctr" fontAlgn="b"/>
+                      <a:r>
+                        <a:rPr lang="en-US" sz="3200" u="none" strike="noStrike">
+                          <a:effectLst/>
+                        </a:rPr>
+                        <a:t>0.741434</a:t>
+                      </a:r>
+                      <a:endParaRPr lang="en-US" sz="3200" b="0" i="0" u="none" strike="noStrike">
+                        <a:solidFill>
+                          <a:srgbClr val="000000"/>
+                        </a:solidFill>
+                        <a:effectLst/>
+                        <a:latin typeface="Calibri" panose="020F0502020204030204" pitchFamily="34" charset="0"/>
+                      </a:endParaRPr>
+                    </a:p>
+                  </a:txBody>
+                  <a:tcPr marL="7620" marR="7620" marT="7620" marB="0" anchor="b"/>
+                </a:tc>
+                <a:tc>
+                  <a:txBody>
+                    <a:bodyPr/>
+                    <a:lstStyle/>
+                    <a:p>
+                      <a:pPr algn="ctr" fontAlgn="b"/>
+                      <a:r>
+                        <a:rPr lang="en-US" sz="3200" u="none" strike="noStrike" dirty="0">
+                          <a:effectLst/>
+                        </a:rPr>
+                        <a:t>0.819272</a:t>
+                      </a:r>
+                      <a:endParaRPr lang="en-US" sz="3200" b="0" i="0" u="none" strike="noStrike" dirty="0">
+                        <a:solidFill>
+                          <a:srgbClr val="000000"/>
+                        </a:solidFill>
+                        <a:effectLst/>
+                        <a:latin typeface="Calibri" panose="020F0502020204030204" pitchFamily="34" charset="0"/>
+                      </a:endParaRPr>
+                    </a:p>
+                  </a:txBody>
+                  <a:tcPr marL="7620" marR="7620" marT="7620" marB="0" anchor="b"/>
+                </a:tc>
+                <a:tc>
+                  <a:txBody>
+                    <a:bodyPr/>
+                    <a:lstStyle/>
+                    <a:p>
+                      <a:pPr algn="ctr" fontAlgn="b"/>
+                      <a:r>
+                        <a:rPr lang="en-US" sz="3200" u="none" strike="noStrike" dirty="0">
+                          <a:effectLst/>
+                        </a:rPr>
+                        <a:t>0.777427</a:t>
+                      </a:r>
+                      <a:endParaRPr lang="en-US" sz="3200" b="0" i="0" u="none" strike="noStrike" dirty="0">
+                        <a:solidFill>
+                          <a:srgbClr val="000000"/>
+                        </a:solidFill>
+                        <a:effectLst/>
+                        <a:latin typeface="Calibri" panose="020F0502020204030204" pitchFamily="34" charset="0"/>
+                      </a:endParaRPr>
+                    </a:p>
+                  </a:txBody>
+                  <a:tcPr marL="7620" marR="7620" marT="7620" marB="0" anchor="b"/>
+                </a:tc>
+                <a:tc>
+                  <a:txBody>
+                    <a:bodyPr/>
+                    <a:lstStyle/>
+                    <a:p>
+                      <a:pPr algn="ctr" fontAlgn="b"/>
+                      <a:r>
+                        <a:rPr lang="en-US" sz="3200" u="none" strike="noStrike" dirty="0">
+                          <a:effectLst/>
+                        </a:rPr>
+                        <a:t>0.900818</a:t>
+                      </a:r>
+                      <a:endParaRPr lang="en-US" sz="3200" b="0" i="0" u="none" strike="noStrike" dirty="0">
+                        <a:solidFill>
+                          <a:srgbClr val="000000"/>
+                        </a:solidFill>
+                        <a:effectLst/>
+                        <a:latin typeface="Calibri" panose="020F0502020204030204" pitchFamily="34" charset="0"/>
+                      </a:endParaRPr>
+                    </a:p>
+                  </a:txBody>
+                  <a:tcPr marL="7620" marR="7620" marT="7620" marB="0" anchor="b"/>
+                </a:tc>
+                <a:extLst>
+                  <a:ext uri="{0D108BD9-81ED-4DB2-BD59-A6C34878D82A}">
+                    <a16:rowId xmlns:a16="http://schemas.microsoft.com/office/drawing/2014/main" val="548511896"/>
+                  </a:ext>
+                </a:extLst>
+              </a:tr>
+            </a:tbl>
           </a:graphicData>
         </a:graphic>
       </p:graphicFrame>

</xml_diff>

<commit_message>
Saving word, ppt and xlsx files.
</commit_message>
<xml_diff>
--- a/results/Poster_Jesse_Robles.pptx
+++ b/results/Poster_Jesse_Robles.pptx
@@ -126,7 +126,7 @@
 <file path=ppt/revisionInfo.xml><?xml version="1.0" encoding="utf-8"?>
 <p1510:revInfo xmlns:a="http://schemas.openxmlformats.org/drawingml/2006/main" xmlns:r="http://schemas.openxmlformats.org/officeDocument/2006/relationships" xmlns:p1510="http://schemas.microsoft.com/office/powerpoint/2015/10/main">
   <p1510:revLst>
-    <p1510:client id="{D24BB185-FD59-4052-83DA-89C2B3528CA0}" v="46" dt="2022-04-25T23:44:17.742"/>
+    <p1510:client id="{D24BB185-FD59-4052-83DA-89C2B3528CA0}" v="60" dt="2022-04-26T21:08:49.502"/>
   </p1510:revLst>
 </p1510:revInfo>
 </file>
@@ -136,16 +136,24 @@
   <pc:docChgLst>
     <pc:chgData name="Jesse Robles" userId="c21645ff62eb64b3" providerId="LiveId" clId="{D24BB185-FD59-4052-83DA-89C2B3528CA0}"/>
     <pc:docChg chg="undo custSel modSld">
-      <pc:chgData name="Jesse Robles" userId="c21645ff62eb64b3" providerId="LiveId" clId="{D24BB185-FD59-4052-83DA-89C2B3528CA0}" dt="2022-04-26T00:03:47.210" v="711" actId="20577"/>
+      <pc:chgData name="Jesse Robles" userId="c21645ff62eb64b3" providerId="LiveId" clId="{D24BB185-FD59-4052-83DA-89C2B3528CA0}" dt="2022-04-26T21:09:01.402" v="864"/>
       <pc:docMkLst>
         <pc:docMk/>
       </pc:docMkLst>
       <pc:sldChg chg="addSp delSp modSp mod">
-        <pc:chgData name="Jesse Robles" userId="c21645ff62eb64b3" providerId="LiveId" clId="{D24BB185-FD59-4052-83DA-89C2B3528CA0}" dt="2022-04-26T00:03:47.210" v="711" actId="20577"/>
+        <pc:chgData name="Jesse Robles" userId="c21645ff62eb64b3" providerId="LiveId" clId="{D24BB185-FD59-4052-83DA-89C2B3528CA0}" dt="2022-04-26T21:09:01.402" v="864"/>
         <pc:sldMkLst>
           <pc:docMk/>
           <pc:sldMk cId="404040298" sldId="261"/>
         </pc:sldMkLst>
+        <pc:spChg chg="mod">
+          <ac:chgData name="Jesse Robles" userId="c21645ff62eb64b3" providerId="LiveId" clId="{D24BB185-FD59-4052-83DA-89C2B3528CA0}" dt="2022-04-26T20:58:49.808" v="816" actId="14100"/>
+          <ac:spMkLst>
+            <pc:docMk/>
+            <pc:sldMk cId="404040298" sldId="261"/>
+            <ac:spMk id="2" creationId="{00000000-0000-0000-0000-000000000000}"/>
+          </ac:spMkLst>
+        </pc:spChg>
         <pc:spChg chg="add del mod">
           <ac:chgData name="Jesse Robles" userId="c21645ff62eb64b3" providerId="LiveId" clId="{D24BB185-FD59-4052-83DA-89C2B3528CA0}" dt="2022-04-25T23:09:01.584" v="146"/>
           <ac:spMkLst>
@@ -163,11 +171,19 @@
           </ac:spMkLst>
         </pc:spChg>
         <pc:spChg chg="mod">
-          <ac:chgData name="Jesse Robles" userId="c21645ff62eb64b3" providerId="LiveId" clId="{D24BB185-FD59-4052-83DA-89C2B3528CA0}" dt="2022-04-25T23:18:38.528" v="253"/>
+          <ac:chgData name="Jesse Robles" userId="c21645ff62eb64b3" providerId="LiveId" clId="{D24BB185-FD59-4052-83DA-89C2B3528CA0}" dt="2022-04-26T20:59:08.338" v="817" actId="20577"/>
           <ac:spMkLst>
             <pc:docMk/>
             <pc:sldMk cId="404040298" sldId="261"/>
             <ac:spMk id="17" creationId="{8AE8A03B-3762-4AF2-A9FC-B088E0736F3A}"/>
+          </ac:spMkLst>
+        </pc:spChg>
+        <pc:spChg chg="mod">
+          <ac:chgData name="Jesse Robles" userId="c21645ff62eb64b3" providerId="LiveId" clId="{D24BB185-FD59-4052-83DA-89C2B3528CA0}" dt="2022-04-26T20:58:37.928" v="814" actId="1076"/>
+          <ac:spMkLst>
+            <pc:docMk/>
+            <pc:sldMk cId="404040298" sldId="261"/>
+            <ac:spMk id="18" creationId="{88133C58-052D-4585-823B-31740DB45AF4}"/>
           </ac:spMkLst>
         </pc:spChg>
         <pc:spChg chg="add del mod">
@@ -176,6 +192,14 @@
             <pc:docMk/>
             <pc:sldMk cId="404040298" sldId="261"/>
             <ac:spMk id="28" creationId="{ABD4802E-FA7B-4980-8FC5-8EBF317695CF}"/>
+          </ac:spMkLst>
+        </pc:spChg>
+        <pc:spChg chg="add del">
+          <ac:chgData name="Jesse Robles" userId="c21645ff62eb64b3" providerId="LiveId" clId="{D24BB185-FD59-4052-83DA-89C2B3528CA0}" dt="2022-04-26T21:08:14.081" v="853" actId="22"/>
+          <ac:spMkLst>
+            <pc:docMk/>
+            <pc:sldMk cId="404040298" sldId="261"/>
+            <ac:spMk id="30" creationId="{94FEE0A6-C553-4E55-862D-AE05819D9334}"/>
           </ac:spMkLst>
         </pc:spChg>
         <pc:spChg chg="add del mod">
@@ -194,6 +218,14 @@
             <ac:spMk id="31" creationId="{A3F6428D-1FA6-42BA-BAEA-3577E1620F6B}"/>
           </ac:spMkLst>
         </pc:spChg>
+        <pc:spChg chg="add mod">
+          <ac:chgData name="Jesse Robles" userId="c21645ff62eb64b3" providerId="LiveId" clId="{D24BB185-FD59-4052-83DA-89C2B3528CA0}" dt="2022-04-26T21:09:01.402" v="864"/>
+          <ac:spMkLst>
+            <pc:docMk/>
+            <pc:sldMk cId="404040298" sldId="261"/>
+            <ac:spMk id="34" creationId="{5B71A6F8-BAB6-4AC8-8F0F-96029CE81E37}"/>
+          </ac:spMkLst>
+        </pc:spChg>
         <pc:spChg chg="mod">
           <ac:chgData name="Jesse Robles" userId="c21645ff62eb64b3" providerId="LiveId" clId="{D24BB185-FD59-4052-83DA-89C2B3528CA0}" dt="2022-04-25T23:23:45.974" v="279" actId="207"/>
           <ac:spMkLst>
@@ -203,7 +235,7 @@
           </ac:spMkLst>
         </pc:spChg>
         <pc:spChg chg="mod">
-          <ac:chgData name="Jesse Robles" userId="c21645ff62eb64b3" providerId="LiveId" clId="{D24BB185-FD59-4052-83DA-89C2B3528CA0}" dt="2022-04-25T23:58:45.840" v="630" actId="20577"/>
+          <ac:chgData name="Jesse Robles" userId="c21645ff62eb64b3" providerId="LiveId" clId="{D24BB185-FD59-4052-83DA-89C2B3528CA0}" dt="2022-04-26T21:08:55.899" v="863" actId="20577"/>
           <ac:spMkLst>
             <pc:docMk/>
             <pc:sldMk cId="404040298" sldId="261"/>
@@ -211,7 +243,7 @@
           </ac:spMkLst>
         </pc:spChg>
         <pc:spChg chg="mod">
-          <ac:chgData name="Jesse Robles" userId="c21645ff62eb64b3" providerId="LiveId" clId="{D24BB185-FD59-4052-83DA-89C2B3528CA0}" dt="2022-04-25T23:26:30.528" v="284"/>
+          <ac:chgData name="Jesse Robles" userId="c21645ff62eb64b3" providerId="LiveId" clId="{D24BB185-FD59-4052-83DA-89C2B3528CA0}" dt="2022-04-26T21:08:26.357" v="857"/>
           <ac:spMkLst>
             <pc:docMk/>
             <pc:sldMk cId="404040298" sldId="261"/>
@@ -219,7 +251,7 @@
           </ac:spMkLst>
         </pc:spChg>
         <pc:spChg chg="mod">
-          <ac:chgData name="Jesse Robles" userId="c21645ff62eb64b3" providerId="LiveId" clId="{D24BB185-FD59-4052-83DA-89C2B3528CA0}" dt="2022-04-26T00:03:47.210" v="711" actId="20577"/>
+          <ac:chgData name="Jesse Robles" userId="c21645ff62eb64b3" providerId="LiveId" clId="{D24BB185-FD59-4052-83DA-89C2B3528CA0}" dt="2022-04-26T20:59:50.240" v="818"/>
           <ac:spMkLst>
             <pc:docMk/>
             <pc:sldMk cId="404040298" sldId="261"/>
@@ -235,7 +267,7 @@
           </ac:spMkLst>
         </pc:spChg>
         <pc:spChg chg="mod">
-          <ac:chgData name="Jesse Robles" userId="c21645ff62eb64b3" providerId="LiveId" clId="{D24BB185-FD59-4052-83DA-89C2B3528CA0}" dt="2022-04-25T23:08:25.362" v="142"/>
+          <ac:chgData name="Jesse Robles" userId="c21645ff62eb64b3" providerId="LiveId" clId="{D24BB185-FD59-4052-83DA-89C2B3528CA0}" dt="2022-04-26T20:58:43.890" v="815" actId="1076"/>
           <ac:spMkLst>
             <pc:docMk/>
             <pc:sldMk cId="404040298" sldId="261"/>
@@ -243,7 +275,15 @@
           </ac:spMkLst>
         </pc:spChg>
         <pc:graphicFrameChg chg="add mod modGraphic">
-          <ac:chgData name="Jesse Robles" userId="c21645ff62eb64b3" providerId="LiveId" clId="{D24BB185-FD59-4052-83DA-89C2B3528CA0}" dt="2022-04-25T23:45:20.990" v="455" actId="20577"/>
+          <ac:chgData name="Jesse Robles" userId="c21645ff62eb64b3" providerId="LiveId" clId="{D24BB185-FD59-4052-83DA-89C2B3528CA0}" dt="2022-04-26T21:07:59.140" v="849" actId="255"/>
+          <ac:graphicFrameMkLst>
+            <pc:docMk/>
+            <pc:sldMk cId="404040298" sldId="261"/>
+            <ac:graphicFrameMk id="3" creationId="{78ADF8C8-CB2A-4A5B-9083-536B127C56A5}"/>
+          </ac:graphicFrameMkLst>
+        </pc:graphicFrameChg>
+        <pc:graphicFrameChg chg="add del mod modGraphic">
+          <ac:chgData name="Jesse Robles" userId="c21645ff62eb64b3" providerId="LiveId" clId="{D24BB185-FD59-4052-83DA-89C2B3528CA0}" dt="2022-04-26T21:07:19.086" v="844" actId="478"/>
           <ac:graphicFrameMkLst>
             <pc:docMk/>
             <pc:sldMk cId="404040298" sldId="261"/>
@@ -258,36 +298,60 @@
             <ac:graphicFrameMk id="20" creationId="{D43B9101-3A3F-4D4F-B82B-A8C18CC0EAC5}"/>
           </ac:graphicFrameMkLst>
         </pc:graphicFrameChg>
-        <pc:graphicFrameChg chg="add mod">
-          <ac:chgData name="Jesse Robles" userId="c21645ff62eb64b3" providerId="LiveId" clId="{D24BB185-FD59-4052-83DA-89C2B3528CA0}" dt="2022-04-25T23:44:17.741" v="450" actId="255"/>
+        <pc:graphicFrameChg chg="add del mod">
+          <ac:chgData name="Jesse Robles" userId="c21645ff62eb64b3" providerId="LiveId" clId="{D24BB185-FD59-4052-83DA-89C2B3528CA0}" dt="2022-04-26T20:12:07.231" v="712" actId="478"/>
           <ac:graphicFrameMkLst>
             <pc:docMk/>
             <pc:sldMk cId="404040298" sldId="261"/>
             <ac:graphicFrameMk id="21" creationId="{D43B9101-3A3F-4D4F-B82B-A8C18CC0EAC5}"/>
           </ac:graphicFrameMkLst>
         </pc:graphicFrameChg>
-        <pc:graphicFrameChg chg="add mod">
-          <ac:chgData name="Jesse Robles" userId="c21645ff62eb64b3" providerId="LiveId" clId="{D24BB185-FD59-4052-83DA-89C2B3528CA0}" dt="2022-04-25T23:43:45.402" v="446" actId="255"/>
+        <pc:graphicFrameChg chg="add del mod">
+          <ac:chgData name="Jesse Robles" userId="c21645ff62eb64b3" providerId="LiveId" clId="{D24BB185-FD59-4052-83DA-89C2B3528CA0}" dt="2022-04-26T20:12:10.958" v="713" actId="478"/>
           <ac:graphicFrameMkLst>
             <pc:docMk/>
             <pc:sldMk cId="404040298" sldId="261"/>
             <ac:graphicFrameMk id="22" creationId="{EEBFFAE6-04B3-4985-A3E4-0872ECDE3771}"/>
           </ac:graphicFrameMkLst>
         </pc:graphicFrameChg>
+        <pc:graphicFrameChg chg="add mod">
+          <ac:chgData name="Jesse Robles" userId="c21645ff62eb64b3" providerId="LiveId" clId="{D24BB185-FD59-4052-83DA-89C2B3528CA0}" dt="2022-04-26T21:00:34.406" v="840" actId="1036"/>
+          <ac:graphicFrameMkLst>
+            <pc:docMk/>
+            <pc:sldMk cId="404040298" sldId="261"/>
+            <ac:graphicFrameMk id="25" creationId="{D43B9101-3A3F-4D4F-B82B-A8C18CC0EAC5}"/>
+          </ac:graphicFrameMkLst>
+        </pc:graphicFrameChg>
+        <pc:graphicFrameChg chg="add mod">
+          <ac:chgData name="Jesse Robles" userId="c21645ff62eb64b3" providerId="LiveId" clId="{D24BB185-FD59-4052-83DA-89C2B3528CA0}" dt="2022-04-26T21:00:34.406" v="840" actId="1036"/>
+          <ac:graphicFrameMkLst>
+            <pc:docMk/>
+            <pc:sldMk cId="404040298" sldId="261"/>
+            <ac:graphicFrameMk id="26" creationId="{EEBFFAE6-04B3-4985-A3E4-0872ECDE3771}"/>
+          </ac:graphicFrameMkLst>
+        </pc:graphicFrameChg>
         <pc:picChg chg="add mod">
-          <ac:chgData name="Jesse Robles" userId="c21645ff62eb64b3" providerId="LiveId" clId="{D24BB185-FD59-4052-83DA-89C2B3528CA0}" dt="2022-04-25T23:45:48.402" v="476" actId="1037"/>
+          <ac:chgData name="Jesse Robles" userId="c21645ff62eb64b3" providerId="LiveId" clId="{D24BB185-FD59-4052-83DA-89C2B3528CA0}" dt="2022-04-26T21:01:03.279" v="841" actId="1076"/>
           <ac:picMkLst>
             <pc:docMk/>
             <pc:sldMk cId="404040298" sldId="261"/>
             <ac:picMk id="6" creationId="{BFA1EEE7-3650-4D5D-8B3E-3F21BB2B4C06}"/>
           </ac:picMkLst>
         </pc:picChg>
-        <pc:picChg chg="add mod">
-          <ac:chgData name="Jesse Robles" userId="c21645ff62eb64b3" providerId="LiveId" clId="{D24BB185-FD59-4052-83DA-89C2B3528CA0}" dt="2022-04-25T23:45:48.402" v="476" actId="1037"/>
+        <pc:picChg chg="add del mod">
+          <ac:chgData name="Jesse Robles" userId="c21645ff62eb64b3" providerId="LiveId" clId="{D24BB185-FD59-4052-83DA-89C2B3528CA0}" dt="2022-04-26T20:57:17.369" v="737" actId="478"/>
           <ac:picMkLst>
             <pc:docMk/>
             <pc:sldMk cId="404040298" sldId="261"/>
             <ac:picMk id="8" creationId="{D302815F-4812-4E94-9C2F-A19422DFB384}"/>
+          </ac:picMkLst>
+        </pc:picChg>
+        <pc:picChg chg="add mod">
+          <ac:chgData name="Jesse Robles" userId="c21645ff62eb64b3" providerId="LiveId" clId="{D24BB185-FD59-4052-83DA-89C2B3528CA0}" dt="2022-04-26T20:57:23.512" v="739" actId="1076"/>
+          <ac:picMkLst>
+            <pc:docMk/>
+            <pc:sldMk cId="404040298" sldId="261"/>
+            <ac:picMk id="27" creationId="{E7EA5477-349E-4E23-84C3-BE23A66AAC4D}"/>
           </ac:picMkLst>
         </pc:picChg>
       </pc:sldChg>
@@ -317,7 +381,7 @@
           <a:lstStyle/>
           <a:p>
             <a:pPr>
-              <a:defRPr sz="2400" b="1" i="0" u="none" strike="noStrike" kern="1200" baseline="0">
+              <a:defRPr sz="1862" b="1" i="0" u="none" strike="noStrike" kern="1200" spc="0" baseline="0">
                 <a:solidFill>
                   <a:schemeClr val="tx1">
                     <a:lumMod val="65000"/>
@@ -330,7 +394,7 @@
               </a:defRPr>
             </a:pPr>
             <a:r>
-              <a:rPr lang="en-US" sz="2400"/>
+              <a:rPr lang="en-US" b="1"/>
               <a:t>Query Intent Classification Metrics (Overall Average)</a:t>
             </a:r>
           </a:p>
@@ -349,7 +413,7 @@
         <a:lstStyle/>
         <a:p>
           <a:pPr>
-            <a:defRPr sz="2400" b="1" i="0" u="none" strike="noStrike" kern="1200" baseline="0">
+            <a:defRPr sz="1862" b="1" i="0" u="none" strike="noStrike" kern="1200" spc="0" baseline="0">
               <a:solidFill>
                 <a:schemeClr val="tx1">
                   <a:lumMod val="65000"/>
@@ -387,53 +451,13 @@
             </c:strRef>
           </c:tx>
           <c:spPr>
-            <a:gradFill rotWithShape="1">
-              <a:gsLst>
-                <a:gs pos="0">
-                  <a:schemeClr val="accent1">
-                    <a:satMod val="103000"/>
-                    <a:lumMod val="102000"/>
-                    <a:tint val="94000"/>
-                  </a:schemeClr>
-                </a:gs>
-                <a:gs pos="50000">
-                  <a:schemeClr val="accent1">
-                    <a:satMod val="110000"/>
-                    <a:lumMod val="100000"/>
-                    <a:shade val="100000"/>
-                  </a:schemeClr>
-                </a:gs>
-                <a:gs pos="100000">
-                  <a:schemeClr val="accent1">
-                    <a:lumMod val="99000"/>
-                    <a:satMod val="120000"/>
-                    <a:shade val="78000"/>
-                  </a:schemeClr>
-                </a:gs>
-              </a:gsLst>
-              <a:lin ang="5400000" scaled="0"/>
-            </a:gradFill>
+            <a:solidFill>
+              <a:schemeClr val="accent1"/>
+            </a:solidFill>
             <a:ln>
               <a:noFill/>
             </a:ln>
-            <a:effectLst>
-              <a:outerShdw blurRad="57150" dist="19050" dir="5400000" algn="ctr" rotWithShape="0">
-                <a:srgbClr val="000000">
-                  <a:alpha val="63000"/>
-                </a:srgbClr>
-              </a:outerShdw>
-            </a:effectLst>
-            <a:scene3d>
-              <a:camera prst="orthographicFront">
-                <a:rot lat="0" lon="0" rev="0"/>
-              </a:camera>
-              <a:lightRig rig="threePt" dir="t">
-                <a:rot lat="0" lon="0" rev="1200000"/>
-              </a:lightRig>
-            </a:scene3d>
-            <a:sp3d>
-              <a:bevelT w="63500" h="25400"/>
-            </a:sp3d>
+            <a:effectLst/>
           </c:spPr>
           <c:invertIfNegative val="0"/>
           <c:cat>
@@ -479,7 +503,7 @@
           </c:val>
           <c:extLst>
             <c:ext xmlns:c16="http://schemas.microsoft.com/office/drawing/2014/chart" uri="{C3380CC4-5D6E-409C-BE32-E72D297353CC}">
-              <c16:uniqueId val="{00000000-824D-4290-9230-A2C249C588BA}"/>
+              <c16:uniqueId val="{00000000-C89C-44E4-A59B-76086A1BA625}"/>
             </c:ext>
           </c:extLst>
         </c:ser>
@@ -498,53 +522,13 @@
             </c:strRef>
           </c:tx>
           <c:spPr>
-            <a:gradFill rotWithShape="1">
-              <a:gsLst>
-                <a:gs pos="0">
-                  <a:schemeClr val="accent2">
-                    <a:satMod val="103000"/>
-                    <a:lumMod val="102000"/>
-                    <a:tint val="94000"/>
-                  </a:schemeClr>
-                </a:gs>
-                <a:gs pos="50000">
-                  <a:schemeClr val="accent2">
-                    <a:satMod val="110000"/>
-                    <a:lumMod val="100000"/>
-                    <a:shade val="100000"/>
-                  </a:schemeClr>
-                </a:gs>
-                <a:gs pos="100000">
-                  <a:schemeClr val="accent2">
-                    <a:lumMod val="99000"/>
-                    <a:satMod val="120000"/>
-                    <a:shade val="78000"/>
-                  </a:schemeClr>
-                </a:gs>
-              </a:gsLst>
-              <a:lin ang="5400000" scaled="0"/>
-            </a:gradFill>
+            <a:solidFill>
+              <a:schemeClr val="accent2"/>
+            </a:solidFill>
             <a:ln>
               <a:noFill/>
             </a:ln>
-            <a:effectLst>
-              <a:outerShdw blurRad="57150" dist="19050" dir="5400000" algn="ctr" rotWithShape="0">
-                <a:srgbClr val="000000">
-                  <a:alpha val="63000"/>
-                </a:srgbClr>
-              </a:outerShdw>
-            </a:effectLst>
-            <a:scene3d>
-              <a:camera prst="orthographicFront">
-                <a:rot lat="0" lon="0" rev="0"/>
-              </a:camera>
-              <a:lightRig rig="threePt" dir="t">
-                <a:rot lat="0" lon="0" rev="1200000"/>
-              </a:lightRig>
-            </a:scene3d>
-            <a:sp3d>
-              <a:bevelT w="63500" h="25400"/>
-            </a:sp3d>
+            <a:effectLst/>
           </c:spPr>
           <c:invertIfNegative val="0"/>
           <c:cat>
@@ -590,7 +574,58 @@
           </c:val>
           <c:extLst>
             <c:ext xmlns:c16="http://schemas.microsoft.com/office/drawing/2014/chart" uri="{C3380CC4-5D6E-409C-BE32-E72D297353CC}">
-              <c16:uniqueId val="{00000001-824D-4290-9230-A2C249C588BA}"/>
+              <c16:uniqueId val="{00000001-C89C-44E4-A59B-76086A1BA625}"/>
+            </c:ext>
+          </c:extLst>
+        </c:ser>
+        <c:ser>
+          <c:idx val="2"/>
+          <c:order val="2"/>
+          <c:tx>
+            <c:strRef>
+              <c:f>'[Comparison Summary.xlsx]Overall Results'!$A$5</c:f>
+              <c:strCache>
+                <c:ptCount val="1"/>
+                <c:pt idx="0">
+                  <c:v>DIET (w/ Language Model)</c:v>
+                </c:pt>
+              </c:strCache>
+            </c:strRef>
+          </c:tx>
+          <c:spPr>
+            <a:solidFill>
+              <a:schemeClr val="accent3"/>
+            </a:solidFill>
+            <a:ln>
+              <a:noFill/>
+            </a:ln>
+            <a:effectLst/>
+          </c:spPr>
+          <c:invertIfNegative val="0"/>
+          <c:val>
+            <c:numRef>
+              <c:f>'[Comparison Summary.xlsx]Overall Results'!$B$5:$E$5</c:f>
+              <c:numCache>
+                <c:formatCode>General</c:formatCode>
+                <c:ptCount val="4"/>
+                <c:pt idx="0">
+                  <c:v>0.94714561472421899</c:v>
+                </c:pt>
+                <c:pt idx="1">
+                  <c:v>0.94430100259096506</c:v>
+                </c:pt>
+                <c:pt idx="2">
+                  <c:v>0.94376114116774301</c:v>
+                </c:pt>
+                <c:pt idx="3">
+                  <c:v>0.94430100259096506</c:v>
+                </c:pt>
+              </c:numCache>
+            </c:numRef>
+          </c:val>
+          <c:extLst>
+            <c:ext xmlns:c16="http://schemas.microsoft.com/office/drawing/2014/chart" uri="{C3380CC4-5D6E-409C-BE32-E72D297353CC}">
+              <c16:uniqueId val="{00000002-C89C-44E4-A59B-76086A1BA625}"/>
             </c:ext>
           </c:extLst>
         </c:ser>
@@ -602,8 +637,8 @@
           <c:showPercent val="0"/>
           <c:showBubbleSize val="0"/>
         </c:dLbls>
-        <c:gapWidth val="100"/>
-        <c:overlap val="-24"/>
+        <c:gapWidth val="219"/>
+        <c:overlap val="-27"/>
         <c:axId val="1465931551"/>
         <c:axId val="1465934047"/>
       </c:barChart>
@@ -620,7 +655,7 @@
         <c:tickLblPos val="nextTo"/>
         <c:spPr>
           <a:noFill/>
-          <a:ln w="12700" cap="flat" cmpd="sng" algn="ctr">
+          <a:ln w="9525" cap="flat" cmpd="sng" algn="ctr">
             <a:solidFill>
               <a:schemeClr val="tx1">
                 <a:lumMod val="15000"/>
@@ -636,7 +671,7 @@
           <a:lstStyle/>
           <a:p>
             <a:pPr>
-              <a:defRPr sz="1800" b="0" i="0" u="none" strike="noStrike" kern="1200" baseline="0">
+              <a:defRPr sz="1197" b="0" i="0" u="none" strike="noStrike" kern="1200" baseline="0">
                 <a:solidFill>
                   <a:schemeClr val="tx1">
                     <a:lumMod val="65000"/>
@@ -697,7 +732,7 @@
           <a:lstStyle/>
           <a:p>
             <a:pPr>
-              <a:defRPr sz="1800" b="0" i="0" u="none" strike="noStrike" kern="1200" baseline="0">
+              <a:defRPr sz="1197" b="0" i="0" u="none" strike="noStrike" kern="1200" baseline="0">
                 <a:solidFill>
                   <a:schemeClr val="tx1">
                     <a:lumMod val="65000"/>
@@ -739,7 +774,7 @@
         <a:lstStyle/>
         <a:p>
           <a:pPr>
-            <a:defRPr sz="1800" b="0" i="0" u="none" strike="noStrike" kern="1200" baseline="0">
+            <a:defRPr sz="1197" b="0" i="0" u="none" strike="noStrike" kern="1200" baseline="0">
               <a:solidFill>
                 <a:schemeClr val="tx1">
                   <a:lumMod val="65000"/>
@@ -810,7 +845,7 @@
           <a:lstStyle/>
           <a:p>
             <a:pPr>
-              <a:defRPr sz="2400" b="1" i="0" u="none" strike="noStrike" kern="1200" baseline="0">
+              <a:defRPr sz="1862" b="1" i="0" u="none" strike="noStrike" kern="1200" spc="0" baseline="0">
                 <a:solidFill>
                   <a:schemeClr val="tx1">
                     <a:lumMod val="65000"/>
@@ -823,7 +858,7 @@
               </a:defRPr>
             </a:pPr>
             <a:r>
-              <a:rPr lang="en-US" sz="2400"/>
+              <a:rPr lang="en-US" b="1"/>
               <a:t>NER Metrics (Overall Average)</a:t>
             </a:r>
           </a:p>
@@ -842,7 +877,7 @@
         <a:lstStyle/>
         <a:p>
           <a:pPr>
-            <a:defRPr sz="2400" b="1" i="0" u="none" strike="noStrike" kern="1200" baseline="0">
+            <a:defRPr sz="1862" b="1" i="0" u="none" strike="noStrike" kern="1200" spc="0" baseline="0">
               <a:solidFill>
                 <a:schemeClr val="tx1">
                   <a:lumMod val="65000"/>
@@ -870,7 +905,7 @@
           <c:order val="0"/>
           <c:tx>
             <c:strRef>
-              <c:f>'Overall Results'!$A$8</c:f>
+              <c:f>'[Comparison Summary.xlsx]Overall Results'!$A$9</c:f>
               <c:strCache>
                 <c:ptCount val="1"/>
                 <c:pt idx="0">
@@ -880,58 +915,18 @@
             </c:strRef>
           </c:tx>
           <c:spPr>
-            <a:gradFill rotWithShape="1">
-              <a:gsLst>
-                <a:gs pos="0">
-                  <a:schemeClr val="accent1">
-                    <a:satMod val="103000"/>
-                    <a:lumMod val="102000"/>
-                    <a:tint val="94000"/>
-                  </a:schemeClr>
-                </a:gs>
-                <a:gs pos="50000">
-                  <a:schemeClr val="accent1">
-                    <a:satMod val="110000"/>
-                    <a:lumMod val="100000"/>
-                    <a:shade val="100000"/>
-                  </a:schemeClr>
-                </a:gs>
-                <a:gs pos="100000">
-                  <a:schemeClr val="accent1">
-                    <a:lumMod val="99000"/>
-                    <a:satMod val="120000"/>
-                    <a:shade val="78000"/>
-                  </a:schemeClr>
-                </a:gs>
-              </a:gsLst>
-              <a:lin ang="5400000" scaled="0"/>
-            </a:gradFill>
+            <a:solidFill>
+              <a:schemeClr val="accent1"/>
+            </a:solidFill>
             <a:ln>
               <a:noFill/>
             </a:ln>
-            <a:effectLst>
-              <a:outerShdw blurRad="57150" dist="19050" dir="5400000" algn="ctr" rotWithShape="0">
-                <a:srgbClr val="000000">
-                  <a:alpha val="63000"/>
-                </a:srgbClr>
-              </a:outerShdw>
-            </a:effectLst>
-            <a:scene3d>
-              <a:camera prst="orthographicFront">
-                <a:rot lat="0" lon="0" rev="0"/>
-              </a:camera>
-              <a:lightRig rig="threePt" dir="t">
-                <a:rot lat="0" lon="0" rev="1200000"/>
-              </a:lightRig>
-            </a:scene3d>
-            <a:sp3d>
-              <a:bevelT w="63500" h="25400"/>
-            </a:sp3d>
+            <a:effectLst/>
           </c:spPr>
           <c:invertIfNegative val="0"/>
           <c:cat>
             <c:strRef>
-              <c:f>'Overall Results'!$B$7:$E$7</c:f>
+              <c:f>'[Comparison Summary.xlsx]Overall Results'!$B$8:$E$8</c:f>
               <c:strCache>
                 <c:ptCount val="4"/>
                 <c:pt idx="0">
@@ -951,7 +946,7 @@
           </c:cat>
           <c:val>
             <c:numRef>
-              <c:f>'Overall Results'!$B$8:$E$8</c:f>
+              <c:f>'[Comparison Summary.xlsx]Overall Results'!$B$9:$E$9</c:f>
               <c:numCache>
                 <c:formatCode>General</c:formatCode>
                 <c:ptCount val="4"/>
@@ -972,7 +967,7 @@
           </c:val>
           <c:extLst>
             <c:ext xmlns:c16="http://schemas.microsoft.com/office/drawing/2014/chart" uri="{C3380CC4-5D6E-409C-BE32-E72D297353CC}">
-              <c16:uniqueId val="{00000000-AFA9-4B03-9583-FF077502AD92}"/>
+              <c16:uniqueId val="{00000000-E2F5-4429-9663-14CEBD70A7D0}"/>
             </c:ext>
           </c:extLst>
         </c:ser>
@@ -981,7 +976,7 @@
           <c:order val="1"/>
           <c:tx>
             <c:strRef>
-              <c:f>'Overall Results'!$A$9</c:f>
+              <c:f>'[Comparison Summary.xlsx]Overall Results'!$A$10</c:f>
               <c:strCache>
                 <c:ptCount val="1"/>
                 <c:pt idx="0">
@@ -991,58 +986,18 @@
             </c:strRef>
           </c:tx>
           <c:spPr>
-            <a:gradFill rotWithShape="1">
-              <a:gsLst>
-                <a:gs pos="0">
-                  <a:schemeClr val="accent2">
-                    <a:satMod val="103000"/>
-                    <a:lumMod val="102000"/>
-                    <a:tint val="94000"/>
-                  </a:schemeClr>
-                </a:gs>
-                <a:gs pos="50000">
-                  <a:schemeClr val="accent2">
-                    <a:satMod val="110000"/>
-                    <a:lumMod val="100000"/>
-                    <a:shade val="100000"/>
-                  </a:schemeClr>
-                </a:gs>
-                <a:gs pos="100000">
-                  <a:schemeClr val="accent2">
-                    <a:lumMod val="99000"/>
-                    <a:satMod val="120000"/>
-                    <a:shade val="78000"/>
-                  </a:schemeClr>
-                </a:gs>
-              </a:gsLst>
-              <a:lin ang="5400000" scaled="0"/>
-            </a:gradFill>
+            <a:solidFill>
+              <a:schemeClr val="accent2"/>
+            </a:solidFill>
             <a:ln>
               <a:noFill/>
             </a:ln>
-            <a:effectLst>
-              <a:outerShdw blurRad="57150" dist="19050" dir="5400000" algn="ctr" rotWithShape="0">
-                <a:srgbClr val="000000">
-                  <a:alpha val="63000"/>
-                </a:srgbClr>
-              </a:outerShdw>
-            </a:effectLst>
-            <a:scene3d>
-              <a:camera prst="orthographicFront">
-                <a:rot lat="0" lon="0" rev="0"/>
-              </a:camera>
-              <a:lightRig rig="threePt" dir="t">
-                <a:rot lat="0" lon="0" rev="1200000"/>
-              </a:lightRig>
-            </a:scene3d>
-            <a:sp3d>
-              <a:bevelT w="63500" h="25400"/>
-            </a:sp3d>
+            <a:effectLst/>
           </c:spPr>
           <c:invertIfNegative val="0"/>
           <c:cat>
             <c:strRef>
-              <c:f>'Overall Results'!$B$7:$E$7</c:f>
+              <c:f>'[Comparison Summary.xlsx]Overall Results'!$B$8:$E$8</c:f>
               <c:strCache>
                 <c:ptCount val="4"/>
                 <c:pt idx="0">
@@ -1062,7 +1017,7 @@
           </c:cat>
           <c:val>
             <c:numRef>
-              <c:f>'Overall Results'!$B$9:$E$9</c:f>
+              <c:f>'[Comparison Summary.xlsx]Overall Results'!$B$10:$E$10</c:f>
               <c:numCache>
                 <c:formatCode>General</c:formatCode>
                 <c:ptCount val="4"/>
@@ -1083,7 +1038,58 @@
           </c:val>
           <c:extLst>
             <c:ext xmlns:c16="http://schemas.microsoft.com/office/drawing/2014/chart" uri="{C3380CC4-5D6E-409C-BE32-E72D297353CC}">
-              <c16:uniqueId val="{00000001-AFA9-4B03-9583-FF077502AD92}"/>
+              <c16:uniqueId val="{00000001-E2F5-4429-9663-14CEBD70A7D0}"/>
+            </c:ext>
+          </c:extLst>
+        </c:ser>
+        <c:ser>
+          <c:idx val="2"/>
+          <c:order val="2"/>
+          <c:tx>
+            <c:strRef>
+              <c:f>'[Comparison Summary.xlsx]Overall Results'!$A$11</c:f>
+              <c:strCache>
+                <c:ptCount val="1"/>
+                <c:pt idx="0">
+                  <c:v>DIET (w/ Language Model)</c:v>
+                </c:pt>
+              </c:strCache>
+            </c:strRef>
+          </c:tx>
+          <c:spPr>
+            <a:solidFill>
+              <a:schemeClr val="accent3"/>
+            </a:solidFill>
+            <a:ln>
+              <a:noFill/>
+            </a:ln>
+            <a:effectLst/>
+          </c:spPr>
+          <c:invertIfNegative val="0"/>
+          <c:val>
+            <c:numRef>
+              <c:f>'[Comparison Summary.xlsx]Overall Results'!$B$11:$E$11</c:f>
+              <c:numCache>
+                <c:formatCode>General</c:formatCode>
+                <c:ptCount val="4"/>
+                <c:pt idx="0">
+                  <c:v>0.74145193430853995</c:v>
+                </c:pt>
+                <c:pt idx="1">
+                  <c:v>0.82302375359277136</c:v>
+                </c:pt>
+                <c:pt idx="2">
+                  <c:v>0.77909612623889168</c:v>
+                </c:pt>
+                <c:pt idx="3">
+                  <c:v>0.90291057712991607</c:v>
+                </c:pt>
+              </c:numCache>
+            </c:numRef>
+          </c:val>
+          <c:extLst>
+            <c:ext xmlns:c16="http://schemas.microsoft.com/office/drawing/2014/chart" uri="{C3380CC4-5D6E-409C-BE32-E72D297353CC}">
+              <c16:uniqueId val="{00000002-E2F5-4429-9663-14CEBD70A7D0}"/>
             </c:ext>
           </c:extLst>
         </c:ser>
@@ -1095,8 +1101,8 @@
           <c:showPercent val="0"/>
           <c:showBubbleSize val="0"/>
         </c:dLbls>
-        <c:gapWidth val="100"/>
-        <c:overlap val="-24"/>
+        <c:gapWidth val="219"/>
+        <c:overlap val="-27"/>
         <c:axId val="1069701279"/>
         <c:axId val="1069699199"/>
       </c:barChart>
@@ -1113,7 +1119,7 @@
         <c:tickLblPos val="nextTo"/>
         <c:spPr>
           <a:noFill/>
-          <a:ln w="12700" cap="flat" cmpd="sng" algn="ctr">
+          <a:ln w="9525" cap="flat" cmpd="sng" algn="ctr">
             <a:solidFill>
               <a:schemeClr val="tx1">
                 <a:lumMod val="15000"/>
@@ -1129,7 +1135,7 @@
           <a:lstStyle/>
           <a:p>
             <a:pPr>
-              <a:defRPr sz="1800" b="0" i="0" u="none" strike="noStrike" kern="1200" baseline="0">
+              <a:defRPr sz="1197" b="0" i="0" u="none" strike="noStrike" kern="1200" baseline="0">
                 <a:solidFill>
                   <a:schemeClr val="tx1">
                     <a:lumMod val="65000"/>
@@ -1189,7 +1195,7 @@
           <a:lstStyle/>
           <a:p>
             <a:pPr>
-              <a:defRPr sz="1800" b="0" i="0" u="none" strike="noStrike" kern="1200" baseline="0">
+              <a:defRPr sz="1197" b="0" i="0" u="none" strike="noStrike" kern="1200" baseline="0">
                 <a:solidFill>
                   <a:schemeClr val="tx1">
                     <a:lumMod val="65000"/>
@@ -1231,7 +1237,7 @@
         <a:lstStyle/>
         <a:p>
           <a:pPr>
-            <a:defRPr sz="2000" b="0" i="0" u="none" strike="noStrike" kern="1200" baseline="0">
+            <a:defRPr sz="1197" b="0" i="0" u="none" strike="noStrike" kern="1200" baseline="0">
               <a:solidFill>
                 <a:schemeClr val="tx1">
                   <a:lumMod val="65000"/>
@@ -1362,7 +1368,7 @@
 </file>
 
 <file path=ppt/charts/style1.xml><?xml version="1.0" encoding="utf-8"?>
-<cs:chartStyle xmlns:cs="http://schemas.microsoft.com/office/drawing/2012/chartStyle" xmlns:a="http://schemas.openxmlformats.org/drawingml/2006/main" id="340">
+<cs:chartStyle xmlns:cs="http://schemas.microsoft.com/office/drawing/2012/chartStyle" xmlns:a="http://schemas.openxmlformats.org/drawingml/2006/main" id="201">
   <cs:axisTitle>
     <cs:lnRef idx="0"/>
     <cs:fillRef idx="0"/>
@@ -1373,7 +1379,7 @@
         <a:lumOff val="35000"/>
       </a:schemeClr>
     </cs:fontRef>
-    <cs:defRPr sz="900" kern="1200"/>
+    <cs:defRPr sz="1330" kern="1200"/>
   </cs:axisTitle>
   <cs:categoryAxis>
     <cs:lnRef idx="0"/>
@@ -1386,7 +1392,7 @@
       </a:schemeClr>
     </cs:fontRef>
     <cs:spPr>
-      <a:ln w="12700" cap="flat" cmpd="sng" algn="ctr">
+      <a:ln w="9525" cap="flat" cmpd="sng" algn="ctr">
         <a:solidFill>
           <a:schemeClr val="tx1">
             <a:lumMod val="15000"/>
@@ -1396,14 +1402,14 @@
         <a:round/>
       </a:ln>
     </cs:spPr>
-    <cs:defRPr sz="900" kern="1200"/>
+    <cs:defRPr sz="1197" kern="1200"/>
   </cs:categoryAxis>
   <cs:chartArea mods="allowNoFillOverride allowNoLineOverride">
     <cs:lnRef idx="0"/>
     <cs:fillRef idx="0"/>
     <cs:effectRef idx="0"/>
     <cs:fontRef idx="minor">
-      <a:schemeClr val="tx2"/>
+      <a:schemeClr val="tx1"/>
     </cs:fontRef>
     <cs:spPr>
       <a:solidFill>
@@ -1419,7 +1425,7 @@
         <a:round/>
       </a:ln>
     </cs:spPr>
-    <cs:defRPr sz="900" kern="1200"/>
+    <cs:defRPr sz="1330" kern="1200"/>
   </cs:chartArea>
   <cs:dataLabel>
     <cs:lnRef idx="0"/>
@@ -1431,7 +1437,7 @@
         <a:lumOff val="25000"/>
       </a:schemeClr>
     </cs:fontRef>
-    <cs:defRPr sz="900" kern="1200"/>
+    <cs:defRPr sz="1197" kern="1200"/>
   </cs:dataLabel>
   <cs:dataLabelCallout>
     <cs:lnRef idx="0"/>
@@ -1456,42 +1462,42 @@
         </a:solidFill>
       </a:ln>
     </cs:spPr>
-    <cs:defRPr sz="900" kern="1200"/>
+    <cs:defRPr sz="1197" kern="1200"/>
     <cs:bodyPr rot="0" spcFirstLastPara="1" vertOverflow="clip" horzOverflow="clip" vert="horz" wrap="square" lIns="36576" tIns="18288" rIns="36576" bIns="18288" anchor="ctr" anchorCtr="1">
       <a:spAutoFit/>
     </cs:bodyPr>
   </cs:dataLabelCallout>
   <cs:dataPoint>
     <cs:lnRef idx="0"/>
-    <cs:fillRef idx="3">
+    <cs:fillRef idx="1">
       <cs:styleClr val="auto"/>
     </cs:fillRef>
-    <cs:effectRef idx="3"/>
+    <cs:effectRef idx="0"/>
     <cs:fontRef idx="minor">
-      <a:schemeClr val="lt1"/>
+      <a:schemeClr val="tx1"/>
     </cs:fontRef>
   </cs:dataPoint>
   <cs:dataPoint3D>
     <cs:lnRef idx="0"/>
-    <cs:fillRef idx="3">
+    <cs:fillRef idx="1">
       <cs:styleClr val="auto"/>
     </cs:fillRef>
-    <cs:effectRef idx="3"/>
+    <cs:effectRef idx="0"/>
     <cs:fontRef idx="minor">
-      <a:schemeClr val="lt1"/>
+      <a:schemeClr val="tx1"/>
     </cs:fontRef>
   </cs:dataPoint3D>
   <cs:dataPointLine>
     <cs:lnRef idx="0">
       <cs:styleClr val="auto"/>
     </cs:lnRef>
-    <cs:fillRef idx="3"/>
-    <cs:effectRef idx="3"/>
+    <cs:fillRef idx="1"/>
+    <cs:effectRef idx="0"/>
     <cs:fontRef idx="minor">
-      <a:schemeClr val="lt1"/>
+      <a:schemeClr val="tx1"/>
     </cs:fontRef>
     <cs:spPr>
-      <a:ln w="34925" cap="rnd">
+      <a:ln w="28575" cap="rnd">
         <a:solidFill>
           <a:schemeClr val="phClr"/>
         </a:solidFill>
@@ -1503,31 +1509,30 @@
     <cs:lnRef idx="0">
       <cs:styleClr val="auto"/>
     </cs:lnRef>
-    <cs:fillRef idx="3">
+    <cs:fillRef idx="1">
       <cs:styleClr val="auto"/>
     </cs:fillRef>
-    <cs:effectRef idx="3"/>
+    <cs:effectRef idx="0"/>
     <cs:fontRef idx="minor">
-      <a:schemeClr val="lt1"/>
+      <a:schemeClr val="tx1"/>
     </cs:fontRef>
     <cs:spPr>
       <a:ln w="9525">
         <a:solidFill>
           <a:schemeClr val="phClr"/>
         </a:solidFill>
-        <a:round/>
       </a:ln>
     </cs:spPr>
   </cs:dataPointMarker>
-  <cs:dataPointMarkerLayout symbol="circle" size="6"/>
+  <cs:dataPointMarkerLayout symbol="circle" size="5"/>
   <cs:dataPointWireframe>
     <cs:lnRef idx="0">
       <cs:styleClr val="auto"/>
     </cs:lnRef>
-    <cs:fillRef idx="3"/>
-    <cs:effectRef idx="3"/>
+    <cs:fillRef idx="1"/>
+    <cs:effectRef idx="0"/>
     <cs:fontRef idx="minor">
-      <a:schemeClr val="lt1"/>
+      <a:schemeClr val="tx1"/>
     </cs:fontRef>
     <cs:spPr>
       <a:ln w="9525" cap="rnd">
@@ -1560,7 +1565,7 @@
         <a:round/>
       </a:ln>
     </cs:spPr>
-    <cs:defRPr sz="900" kern="1200"/>
+    <cs:defRPr sz="1197" kern="1200"/>
   </cs:dataTable>
   <cs:downBar>
     <cs:lnRef idx="0"/>
@@ -1629,8 +1634,14 @@
     <cs:fillRef idx="0"/>
     <cs:effectRef idx="0"/>
     <cs:fontRef idx="minor">
-      <a:schemeClr val="lt1"/>
+      <a:schemeClr val="tx1"/>
     </cs:fontRef>
+    <cs:spPr>
+      <a:noFill/>
+      <a:ln>
+        <a:noFill/>
+      </a:ln>
+    </cs:spPr>
   </cs:floor>
   <cs:gridlineMajor>
     <cs:lnRef idx="0"/>
@@ -1718,22 +1729,22 @@
         <a:lumOff val="35000"/>
       </a:schemeClr>
     </cs:fontRef>
-    <cs:defRPr sz="900" kern="1200"/>
+    <cs:defRPr sz="1197" kern="1200"/>
   </cs:legend>
-  <cs:plotArea>
+  <cs:plotArea mods="allowNoFillOverride allowNoLineOverride">
     <cs:lnRef idx="0"/>
     <cs:fillRef idx="0"/>
     <cs:effectRef idx="0"/>
     <cs:fontRef idx="minor">
-      <a:schemeClr val="lt1"/>
+      <a:schemeClr val="tx1"/>
     </cs:fontRef>
   </cs:plotArea>
-  <cs:plotArea3D>
+  <cs:plotArea3D mods="allowNoFillOverride allowNoLineOverride">
     <cs:lnRef idx="0"/>
     <cs:fillRef idx="0"/>
     <cs:effectRef idx="0"/>
     <cs:fontRef idx="minor">
-      <a:schemeClr val="lt1"/>
+      <a:schemeClr val="tx1"/>
     </cs:fontRef>
   </cs:plotArea3D>
   <cs:seriesAxis>
@@ -1746,18 +1757,7 @@
         <a:lumOff val="35000"/>
       </a:schemeClr>
     </cs:fontRef>
-    <cs:spPr>
-      <a:ln w="12700" cap="flat" cmpd="sng" algn="ctr">
-        <a:solidFill>
-          <a:schemeClr val="tx1">
-            <a:lumMod val="15000"/>
-            <a:lumOff val="85000"/>
-          </a:schemeClr>
-        </a:solidFill>
-        <a:round/>
-      </a:ln>
-    </cs:spPr>
-    <cs:defRPr sz="900" kern="1200"/>
+    <cs:defRPr sz="1197" kern="1200"/>
   </cs:seriesAxis>
   <cs:seriesLine>
     <cs:lnRef idx="0"/>
@@ -1788,7 +1788,7 @@
         <a:lumOff val="35000"/>
       </a:schemeClr>
     </cs:fontRef>
-    <cs:defRPr sz="1600" b="1" kern="1200" baseline="0"/>
+    <cs:defRPr sz="1862" b="0" kern="1200" spc="0" baseline="0"/>
   </cs:title>
   <cs:trendline>
     <cs:lnRef idx="0">
@@ -1797,13 +1797,14 @@
     <cs:fillRef idx="0"/>
     <cs:effectRef idx="0"/>
     <cs:fontRef idx="minor">
-      <a:schemeClr val="lt1"/>
+      <a:schemeClr val="tx1"/>
     </cs:fontRef>
     <cs:spPr>
       <a:ln w="19050" cap="rnd">
         <a:solidFill>
           <a:schemeClr val="phClr"/>
         </a:solidFill>
+        <a:prstDash val="sysDot"/>
       </a:ln>
     </cs:spPr>
   </cs:trendline>
@@ -1817,7 +1818,7 @@
         <a:lumOff val="35000"/>
       </a:schemeClr>
     </cs:fontRef>
-    <cs:defRPr sz="900" kern="1200"/>
+    <cs:defRPr sz="1197" kern="1200"/>
   </cs:trendlineLabel>
   <cs:upBar>
     <cs:lnRef idx="0"/>
@@ -1850,21 +1851,27 @@
         <a:lumOff val="35000"/>
       </a:schemeClr>
     </cs:fontRef>
-    <cs:defRPr sz="900" kern="1200"/>
+    <cs:defRPr sz="1197" kern="1200"/>
   </cs:valueAxis>
   <cs:wall>
     <cs:lnRef idx="0"/>
     <cs:fillRef idx="0"/>
     <cs:effectRef idx="0"/>
     <cs:fontRef idx="minor">
-      <a:schemeClr val="lt1"/>
+      <a:schemeClr val="tx1"/>
     </cs:fontRef>
+    <cs:spPr>
+      <a:noFill/>
+      <a:ln>
+        <a:noFill/>
+      </a:ln>
+    </cs:spPr>
   </cs:wall>
 </cs:chartStyle>
 </file>
 
 <file path=ppt/charts/style2.xml><?xml version="1.0" encoding="utf-8"?>
-<cs:chartStyle xmlns:cs="http://schemas.microsoft.com/office/drawing/2012/chartStyle" xmlns:a="http://schemas.openxmlformats.org/drawingml/2006/main" id="340">
+<cs:chartStyle xmlns:cs="http://schemas.microsoft.com/office/drawing/2012/chartStyle" xmlns:a="http://schemas.openxmlformats.org/drawingml/2006/main" id="201">
   <cs:axisTitle>
     <cs:lnRef idx="0"/>
     <cs:fillRef idx="0"/>
@@ -1875,7 +1882,7 @@
         <a:lumOff val="35000"/>
       </a:schemeClr>
     </cs:fontRef>
-    <cs:defRPr sz="900" kern="1200"/>
+    <cs:defRPr sz="1330" kern="1200"/>
   </cs:axisTitle>
   <cs:categoryAxis>
     <cs:lnRef idx="0"/>
@@ -1888,7 +1895,7 @@
       </a:schemeClr>
     </cs:fontRef>
     <cs:spPr>
-      <a:ln w="12700" cap="flat" cmpd="sng" algn="ctr">
+      <a:ln w="9525" cap="flat" cmpd="sng" algn="ctr">
         <a:solidFill>
           <a:schemeClr val="tx1">
             <a:lumMod val="15000"/>
@@ -1898,14 +1905,14 @@
         <a:round/>
       </a:ln>
     </cs:spPr>
-    <cs:defRPr sz="900" kern="1200"/>
+    <cs:defRPr sz="1197" kern="1200"/>
   </cs:categoryAxis>
   <cs:chartArea mods="allowNoFillOverride allowNoLineOverride">
     <cs:lnRef idx="0"/>
     <cs:fillRef idx="0"/>
     <cs:effectRef idx="0"/>
     <cs:fontRef idx="minor">
-      <a:schemeClr val="tx2"/>
+      <a:schemeClr val="tx1"/>
     </cs:fontRef>
     <cs:spPr>
       <a:solidFill>
@@ -1921,7 +1928,7 @@
         <a:round/>
       </a:ln>
     </cs:spPr>
-    <cs:defRPr sz="900" kern="1200"/>
+    <cs:defRPr sz="1330" kern="1200"/>
   </cs:chartArea>
   <cs:dataLabel>
     <cs:lnRef idx="0"/>
@@ -1933,7 +1940,7 @@
         <a:lumOff val="25000"/>
       </a:schemeClr>
     </cs:fontRef>
-    <cs:defRPr sz="900" kern="1200"/>
+    <cs:defRPr sz="1197" kern="1200"/>
   </cs:dataLabel>
   <cs:dataLabelCallout>
     <cs:lnRef idx="0"/>
@@ -1958,42 +1965,42 @@
         </a:solidFill>
       </a:ln>
     </cs:spPr>
-    <cs:defRPr sz="900" kern="1200"/>
+    <cs:defRPr sz="1197" kern="1200"/>
     <cs:bodyPr rot="0" spcFirstLastPara="1" vertOverflow="clip" horzOverflow="clip" vert="horz" wrap="square" lIns="36576" tIns="18288" rIns="36576" bIns="18288" anchor="ctr" anchorCtr="1">
       <a:spAutoFit/>
     </cs:bodyPr>
   </cs:dataLabelCallout>
   <cs:dataPoint>
     <cs:lnRef idx="0"/>
-    <cs:fillRef idx="3">
+    <cs:fillRef idx="1">
       <cs:styleClr val="auto"/>
     </cs:fillRef>
-    <cs:effectRef idx="3"/>
+    <cs:effectRef idx="0"/>
     <cs:fontRef idx="minor">
-      <a:schemeClr val="lt1"/>
+      <a:schemeClr val="tx1"/>
     </cs:fontRef>
   </cs:dataPoint>
   <cs:dataPoint3D>
     <cs:lnRef idx="0"/>
-    <cs:fillRef idx="3">
+    <cs:fillRef idx="1">
       <cs:styleClr val="auto"/>
     </cs:fillRef>
-    <cs:effectRef idx="3"/>
+    <cs:effectRef idx="0"/>
     <cs:fontRef idx="minor">
-      <a:schemeClr val="lt1"/>
+      <a:schemeClr val="tx1"/>
     </cs:fontRef>
   </cs:dataPoint3D>
   <cs:dataPointLine>
     <cs:lnRef idx="0">
       <cs:styleClr val="auto"/>
     </cs:lnRef>
-    <cs:fillRef idx="3"/>
-    <cs:effectRef idx="3"/>
+    <cs:fillRef idx="1"/>
+    <cs:effectRef idx="0"/>
     <cs:fontRef idx="minor">
-      <a:schemeClr val="lt1"/>
+      <a:schemeClr val="tx1"/>
     </cs:fontRef>
     <cs:spPr>
-      <a:ln w="34925" cap="rnd">
+      <a:ln w="28575" cap="rnd">
         <a:solidFill>
           <a:schemeClr val="phClr"/>
         </a:solidFill>
@@ -2005,31 +2012,30 @@
     <cs:lnRef idx="0">
       <cs:styleClr val="auto"/>
     </cs:lnRef>
-    <cs:fillRef idx="3">
+    <cs:fillRef idx="1">
       <cs:styleClr val="auto"/>
     </cs:fillRef>
-    <cs:effectRef idx="3"/>
+    <cs:effectRef idx="0"/>
     <cs:fontRef idx="minor">
-      <a:schemeClr val="lt1"/>
+      <a:schemeClr val="tx1"/>
     </cs:fontRef>
     <cs:spPr>
       <a:ln w="9525">
         <a:solidFill>
           <a:schemeClr val="phClr"/>
         </a:solidFill>
-        <a:round/>
       </a:ln>
     </cs:spPr>
   </cs:dataPointMarker>
-  <cs:dataPointMarkerLayout symbol="circle" size="6"/>
+  <cs:dataPointMarkerLayout symbol="circle" size="5"/>
   <cs:dataPointWireframe>
     <cs:lnRef idx="0">
       <cs:styleClr val="auto"/>
     </cs:lnRef>
-    <cs:fillRef idx="3"/>
-    <cs:effectRef idx="3"/>
+    <cs:fillRef idx="1"/>
+    <cs:effectRef idx="0"/>
     <cs:fontRef idx="minor">
-      <a:schemeClr val="lt1"/>
+      <a:schemeClr val="tx1"/>
     </cs:fontRef>
     <cs:spPr>
       <a:ln w="9525" cap="rnd">
@@ -2062,7 +2068,7 @@
         <a:round/>
       </a:ln>
     </cs:spPr>
-    <cs:defRPr sz="900" kern="1200"/>
+    <cs:defRPr sz="1197" kern="1200"/>
   </cs:dataTable>
   <cs:downBar>
     <cs:lnRef idx="0"/>
@@ -2131,8 +2137,14 @@
     <cs:fillRef idx="0"/>
     <cs:effectRef idx="0"/>
     <cs:fontRef idx="minor">
-      <a:schemeClr val="lt1"/>
+      <a:schemeClr val="tx1"/>
     </cs:fontRef>
+    <cs:spPr>
+      <a:noFill/>
+      <a:ln>
+        <a:noFill/>
+      </a:ln>
+    </cs:spPr>
   </cs:floor>
   <cs:gridlineMajor>
     <cs:lnRef idx="0"/>
@@ -2220,22 +2232,22 @@
         <a:lumOff val="35000"/>
       </a:schemeClr>
     </cs:fontRef>
-    <cs:defRPr sz="900" kern="1200"/>
+    <cs:defRPr sz="1197" kern="1200"/>
   </cs:legend>
-  <cs:plotArea>
+  <cs:plotArea mods="allowNoFillOverride allowNoLineOverride">
     <cs:lnRef idx="0"/>
     <cs:fillRef idx="0"/>
     <cs:effectRef idx="0"/>
     <cs:fontRef idx="minor">
-      <a:schemeClr val="lt1"/>
+      <a:schemeClr val="tx1"/>
     </cs:fontRef>
   </cs:plotArea>
-  <cs:plotArea3D>
+  <cs:plotArea3D mods="allowNoFillOverride allowNoLineOverride">
     <cs:lnRef idx="0"/>
     <cs:fillRef idx="0"/>
     <cs:effectRef idx="0"/>
     <cs:fontRef idx="minor">
-      <a:schemeClr val="lt1"/>
+      <a:schemeClr val="tx1"/>
     </cs:fontRef>
   </cs:plotArea3D>
   <cs:seriesAxis>
@@ -2248,18 +2260,7 @@
         <a:lumOff val="35000"/>
       </a:schemeClr>
     </cs:fontRef>
-    <cs:spPr>
-      <a:ln w="12700" cap="flat" cmpd="sng" algn="ctr">
-        <a:solidFill>
-          <a:schemeClr val="tx1">
-            <a:lumMod val="15000"/>
-            <a:lumOff val="85000"/>
-          </a:schemeClr>
-        </a:solidFill>
-        <a:round/>
-      </a:ln>
-    </cs:spPr>
-    <cs:defRPr sz="900" kern="1200"/>
+    <cs:defRPr sz="1197" kern="1200"/>
   </cs:seriesAxis>
   <cs:seriesLine>
     <cs:lnRef idx="0"/>
@@ -2290,7 +2291,7 @@
         <a:lumOff val="35000"/>
       </a:schemeClr>
     </cs:fontRef>
-    <cs:defRPr sz="1600" b="1" kern="1200" baseline="0"/>
+    <cs:defRPr sz="1862" b="0" kern="1200" spc="0" baseline="0"/>
   </cs:title>
   <cs:trendline>
     <cs:lnRef idx="0">
@@ -2299,13 +2300,14 @@
     <cs:fillRef idx="0"/>
     <cs:effectRef idx="0"/>
     <cs:fontRef idx="minor">
-      <a:schemeClr val="lt1"/>
+      <a:schemeClr val="tx1"/>
     </cs:fontRef>
     <cs:spPr>
       <a:ln w="19050" cap="rnd">
         <a:solidFill>
           <a:schemeClr val="phClr"/>
         </a:solidFill>
+        <a:prstDash val="sysDot"/>
       </a:ln>
     </cs:spPr>
   </cs:trendline>
@@ -2319,7 +2321,7 @@
         <a:lumOff val="35000"/>
       </a:schemeClr>
     </cs:fontRef>
-    <cs:defRPr sz="900" kern="1200"/>
+    <cs:defRPr sz="1197" kern="1200"/>
   </cs:trendlineLabel>
   <cs:upBar>
     <cs:lnRef idx="0"/>
@@ -2352,15 +2354,21 @@
         <a:lumOff val="35000"/>
       </a:schemeClr>
     </cs:fontRef>
-    <cs:defRPr sz="900" kern="1200"/>
+    <cs:defRPr sz="1197" kern="1200"/>
   </cs:valueAxis>
   <cs:wall>
     <cs:lnRef idx="0"/>
     <cs:fillRef idx="0"/>
     <cs:effectRef idx="0"/>
     <cs:fontRef idx="minor">
-      <a:schemeClr val="lt1"/>
+      <a:schemeClr val="tx1"/>
     </cs:fontRef>
+    <cs:spPr>
+      <a:noFill/>
+      <a:ln>
+        <a:noFill/>
+      </a:ln>
+    </cs:spPr>
   </cs:wall>
 </cs:chartStyle>
 </file>
@@ -2544,7 +2552,7 @@
           <a:p>
             <a:fld id="{2280919C-9BF4-2E48-B1DA-A899560EBF1A}" type="datetimeFigureOut">
               <a:rPr lang="en-US" smtClean="0"/>
-              <a:t>4/25/2022</a:t>
+              <a:t>4/26/2022</a:t>
             </a:fld>
             <a:endParaRPr lang="en-US"/>
           </a:p>
@@ -2782,7 +2790,7 @@
           <a:p>
             <a:fld id="{2280919C-9BF4-2E48-B1DA-A899560EBF1A}" type="datetimeFigureOut">
               <a:rPr lang="en-US" smtClean="0"/>
-              <a:t>4/25/2022</a:t>
+              <a:t>4/26/2022</a:t>
             </a:fld>
             <a:endParaRPr lang="en-US"/>
           </a:p>
@@ -2960,7 +2968,7 @@
           <a:p>
             <a:fld id="{2280919C-9BF4-2E48-B1DA-A899560EBF1A}" type="datetimeFigureOut">
               <a:rPr lang="en-US" smtClean="0"/>
-              <a:t>4/25/2022</a:t>
+              <a:t>4/26/2022</a:t>
             </a:fld>
             <a:endParaRPr lang="en-US"/>
           </a:p>
@@ -3128,7 +3136,7 @@
           <a:p>
             <a:fld id="{2280919C-9BF4-2E48-B1DA-A899560EBF1A}" type="datetimeFigureOut">
               <a:rPr lang="en-US" smtClean="0"/>
-              <a:t>4/25/2022</a:t>
+              <a:t>4/26/2022</a:t>
             </a:fld>
             <a:endParaRPr lang="en-US"/>
           </a:p>
@@ -3373,7 +3381,7 @@
           <a:p>
             <a:fld id="{2280919C-9BF4-2E48-B1DA-A899560EBF1A}" type="datetimeFigureOut">
               <a:rPr lang="en-US" smtClean="0"/>
-              <a:t>4/25/2022</a:t>
+              <a:t>4/26/2022</a:t>
             </a:fld>
             <a:endParaRPr lang="en-US"/>
           </a:p>
@@ -3658,7 +3666,7 @@
           <a:p>
             <a:fld id="{2280919C-9BF4-2E48-B1DA-A899560EBF1A}" type="datetimeFigureOut">
               <a:rPr lang="en-US" smtClean="0"/>
-              <a:t>4/25/2022</a:t>
+              <a:t>4/26/2022</a:t>
             </a:fld>
             <a:endParaRPr lang="en-US"/>
           </a:p>
@@ -4082,7 +4090,7 @@
           <a:p>
             <a:fld id="{2280919C-9BF4-2E48-B1DA-A899560EBF1A}" type="datetimeFigureOut">
               <a:rPr lang="en-US" smtClean="0"/>
-              <a:t>4/25/2022</a:t>
+              <a:t>4/26/2022</a:t>
             </a:fld>
             <a:endParaRPr lang="en-US"/>
           </a:p>
@@ -4199,7 +4207,7 @@
           <a:p>
             <a:fld id="{2280919C-9BF4-2E48-B1DA-A899560EBF1A}" type="datetimeFigureOut">
               <a:rPr lang="en-US" smtClean="0"/>
-              <a:t>4/25/2022</a:t>
+              <a:t>4/26/2022</a:t>
             </a:fld>
             <a:endParaRPr lang="en-US"/>
           </a:p>
@@ -4294,7 +4302,7 @@
           <a:p>
             <a:fld id="{2280919C-9BF4-2E48-B1DA-A899560EBF1A}" type="datetimeFigureOut">
               <a:rPr lang="en-US" smtClean="0"/>
-              <a:t>4/25/2022</a:t>
+              <a:t>4/26/2022</a:t>
             </a:fld>
             <a:endParaRPr lang="en-US"/>
           </a:p>
@@ -4569,7 +4577,7 @@
           <a:p>
             <a:fld id="{2280919C-9BF4-2E48-B1DA-A899560EBF1A}" type="datetimeFigureOut">
               <a:rPr lang="en-US" smtClean="0"/>
-              <a:t>4/25/2022</a:t>
+              <a:t>4/26/2022</a:t>
             </a:fld>
             <a:endParaRPr lang="en-US"/>
           </a:p>
@@ -4821,7 +4829,7 @@
           <a:p>
             <a:fld id="{2280919C-9BF4-2E48-B1DA-A899560EBF1A}" type="datetimeFigureOut">
               <a:rPr lang="en-US" smtClean="0"/>
-              <a:t>4/25/2022</a:t>
+              <a:t>4/26/2022</a:t>
             </a:fld>
             <a:endParaRPr lang="en-US"/>
           </a:p>
@@ -5032,7 +5040,7 @@
           <a:p>
             <a:fld id="{2280919C-9BF4-2E48-B1DA-A899560EBF1A}" type="datetimeFigureOut">
               <a:rPr lang="en-US" smtClean="0"/>
-              <a:t>4/25/2022</a:t>
+              <a:t>4/26/2022</a:t>
             </a:fld>
             <a:endParaRPr lang="en-US"/>
           </a:p>
@@ -5562,8 +5570,8 @@
         </p:nvSpPr>
         <p:spPr bwMode="auto">
           <a:xfrm>
-            <a:off x="731520" y="7125252"/>
-            <a:ext cx="10058400" cy="10831132"/>
+            <a:off x="731520" y="6684645"/>
+            <a:ext cx="10058400" cy="11779837"/>
           </a:xfrm>
           <a:prstGeom prst="roundRect">
             <a:avLst>
@@ -5604,8 +5612,8 @@
         </p:nvSpPr>
         <p:spPr bwMode="auto">
           <a:xfrm>
-            <a:off x="1062257" y="8265705"/>
-            <a:ext cx="9144000" cy="8633133"/>
+            <a:off x="1062256" y="7473998"/>
+            <a:ext cx="9144000" cy="10849124"/>
           </a:xfrm>
           <a:prstGeom prst="rect">
             <a:avLst/>
@@ -5755,7 +5763,7 @@
                 <a:ea typeface="Open Sans" panose="020B0606030504020204" pitchFamily="34" charset="0"/>
                 <a:cs typeface="Open Sans" panose="020B0606030504020204" pitchFamily="34" charset="0"/>
               </a:rPr>
-              <a:t>User expectations regarding their interactions with search systems and dialog systems (e.g., chatbots, Siri, Cortana) have significantly increased in the last decades beyond simple keyword matching and rule-based responses. A main driver for this has been large corporations such as Google, Amazon, and Microsoft’s significant investment in research and development of machine learning algorithms and hardware. This has led to the development of embedding techniques and language models, followed by the development of the Transformer architecture which further pushed the state of the art in natural language understanding. Notable among these is the Bidirectional Encoder Representations from Transformers (BERT) model. These models are trained on general corpora of text data (e.g., new articles, Wikipedia) and can be fine-tuned to specific use cases to achieve better performance. This architecture has also been adapted to more domain specific applications such as search and conversational AI, such as the Rasa Dual Intent and Entity Transformer (DIET). This project compares the out-of-the-box performance of BERT and DIET for both query intent classification and Named Entity Recognition tasks on six datasets. The results on these datasets show that model performance is comparable, although BERT slightly outperformed DIET. However, the DIET architecture provides the added benefit of a single model for both tasks and a significantly smaller resulting model size..</a:t>
+              <a:t>User expectations regarding their interactions with search systems and dialog systems (e.g., chatbots, Siri, Cortana) have significantly increased in the last decades beyond simple keyword matching and rule-based responses. A main driver for this has been large corporations such as Google, Amazon, and Microsoft’s significant investment in research and development of machine learning algorithms and hardware. This has led to the development of embedding techniques and language models, followed by the development of the Transformer architecture which further pushed the state of the art in natural language understanding. Notable among these is the Bidirectional Encoder Representations from Transformers (BERT) model. These models are trained on general corpora of text data (e.g., new articles, Wikipedia) and can be fine-tuned to specific use cases to achieve better performance. This architecture has also been adapted to more domain specific applications such as search and conversational AI, such as the Rasa Dual Intent and Entity Transformer (DIET). This project compares the out-of-the-box performance of BERT, DIET, and DIET with a language model for both query intent classification and Named Entity Recognition (NER) tasks on six datasets. The results on these datasets show that model performance is very close for all three, although BERT slightly outperformed both DIET models in NER. For query intent classification, DIET with a language model and BERT each outperformed the other on 3 of the datasets, but BERT had higher overall averages in the evaluation metrics. The DIET model without language model also outperformed BERT on one of the datasets. Additionally, the DIET architecture provides the added benefit of a single model for both tasks and a significantly smaller resulting model size, making it a compelling choice overall.</a:t>
             </a:r>
           </a:p>
         </p:txBody>
@@ -6158,7 +6166,7 @@
         <p:spPr bwMode="auto">
           <a:xfrm>
             <a:off x="11521440" y="8000232"/>
-            <a:ext cx="10058400" cy="22298412"/>
+            <a:ext cx="10058400" cy="25622399"/>
           </a:xfrm>
           <a:prstGeom prst="rect">
             <a:avLst/>
@@ -6411,23 +6419,7 @@
                 <a:ea typeface="Open Sans" panose="020B0606030504020204" pitchFamily="34" charset="0"/>
                 <a:cs typeface="Open Sans" panose="020B0606030504020204" pitchFamily="34" charset="0"/>
               </a:rPr>
-              <a:t>Since the Rasa DIET model performs both query intent classification and named entity recognition, two BERT models were trained on each of the datasets that contained both intents and entities. Although there </a:t>
-            </a:r>
-            <a:r>
-              <a:rPr lang="en-US" sz="2400">
-                <a:latin typeface="Titillium Web" panose="00000500000000000000" pitchFamily="2" charset="0"/>
-                <a:ea typeface="Open Sans" panose="020B0606030504020204" pitchFamily="34" charset="0"/>
-                <a:cs typeface="Open Sans" panose="020B0606030504020204" pitchFamily="34" charset="0"/>
-              </a:rPr>
-              <a:t>are ways </a:t>
-            </a:r>
-            <a:r>
-              <a:rPr lang="en-US" sz="2400" dirty="0">
-                <a:latin typeface="Titillium Web" panose="00000500000000000000" pitchFamily="2" charset="0"/>
-                <a:ea typeface="Open Sans" panose="020B0606030504020204" pitchFamily="34" charset="0"/>
-                <a:cs typeface="Open Sans" panose="020B0606030504020204" pitchFamily="34" charset="0"/>
-              </a:rPr>
-              <a:t>to use the </a:t>
+              <a:t>Since the Rasa DIET model performs both query intent classification and named entity recognition, two BERT models were trained on each of the datasets that contained both intents and entities. Although there are ways (such as the one described here) to use the </a:t>
             </a:r>
             <a:r>
               <a:rPr lang="en-US" sz="2400" dirty="0" err="1">
@@ -6460,6 +6452,16 @@
                 <a:ea typeface="Open Sans" panose="020B0606030504020204" pitchFamily="34" charset="0"/>
                 <a:cs typeface="Open Sans" panose="020B0606030504020204" pitchFamily="34" charset="0"/>
               </a:rPr>
+              <a:t>BERT</a:t>
+            </a:r>
+          </a:p>
+          <a:p>
+            <a:r>
+              <a:rPr lang="en-US" sz="2400" dirty="0">
+                <a:latin typeface="Titillium Web" panose="00000500000000000000" pitchFamily="2" charset="0"/>
+                <a:ea typeface="Open Sans" panose="020B0606030504020204" pitchFamily="34" charset="0"/>
+                <a:cs typeface="Open Sans" panose="020B0606030504020204" pitchFamily="34" charset="0"/>
+              </a:rPr>
               <a:t>In order to reduce model size and training time, the </a:t>
             </a:r>
             <a:r>
@@ -6492,8 +6494,58 @@
                 <a:ea typeface="Open Sans" panose="020B0606030504020204" pitchFamily="34" charset="0"/>
                 <a:cs typeface="Open Sans" panose="020B0606030504020204" pitchFamily="34" charset="0"/>
               </a:rPr>
-              <a:t> documentation. Training time on the BERT model ranged from 1-5 minutes on a 1080TI GPU. For the DIET models, the model was trained on 100 epochs with the other parameters set with default values. In terms of training time, the DIET models take longer because of the larger number of epochs. These epochs are necessary because the models are trained from scratch. The training times for DIET ranged from 2 to 15 minutes when trained on a 1080TI GPU. The ATIS dataset had to be trained on CPU for the DIET model because it caused the GPU to run out of memory. This is likely the result of the number of entity types and amount of entities present in that dataset. The difference in model sizes is also notable. The average size of the DIET models is approximately 86MB, while the BERT models are all approximately 235MB each. This might be an important consideration for limited resource environments such as mobile or edge devices.</a:t>
-            </a:r>
+              <a:t> documentation. Training time on the BERT model ranged from 1-5 minutes on a 1080TI GPU. </a:t>
+            </a:r>
+          </a:p>
+          <a:p>
+            <a:endParaRPr lang="en-US" sz="2400" dirty="0">
+              <a:latin typeface="Titillium Web" panose="00000500000000000000" pitchFamily="2" charset="0"/>
+              <a:ea typeface="Open Sans" panose="020B0606030504020204" pitchFamily="34" charset="0"/>
+              <a:cs typeface="Open Sans" panose="020B0606030504020204" pitchFamily="34" charset="0"/>
+            </a:endParaRPr>
+          </a:p>
+          <a:p>
+            <a:r>
+              <a:rPr lang="en-US" sz="2400" dirty="0">
+                <a:latin typeface="Titillium Web" panose="00000500000000000000" pitchFamily="2" charset="0"/>
+                <a:ea typeface="Open Sans" panose="020B0606030504020204" pitchFamily="34" charset="0"/>
+                <a:cs typeface="Open Sans" panose="020B0606030504020204" pitchFamily="34" charset="0"/>
+              </a:rPr>
+              <a:t>DIET</a:t>
+            </a:r>
+          </a:p>
+          <a:p>
+            <a:r>
+              <a:rPr lang="en-US" sz="2400" dirty="0">
+                <a:latin typeface="Titillium Web" panose="00000500000000000000" pitchFamily="2" charset="0"/>
+                <a:ea typeface="Open Sans" panose="020B0606030504020204" pitchFamily="34" charset="0"/>
+                <a:cs typeface="Open Sans" panose="020B0606030504020204" pitchFamily="34" charset="0"/>
+              </a:rPr>
+              <a:t>For the DIET models, each model was trained on 100 epochs with the other parameters set with default values. For each dataset, a default DIET model was trained, as well as a model that included a </a:t>
+            </a:r>
+            <a:r>
+              <a:rPr lang="en-US" sz="2400" dirty="0" err="1">
+                <a:latin typeface="Titillium Web" panose="00000500000000000000" pitchFamily="2" charset="0"/>
+                <a:ea typeface="Open Sans" panose="020B0606030504020204" pitchFamily="34" charset="0"/>
+                <a:cs typeface="Open Sans" panose="020B0606030504020204" pitchFamily="34" charset="0"/>
+              </a:rPr>
+              <a:t>ConverTFeaturizer</a:t>
+            </a:r>
+            <a:r>
+              <a:rPr lang="en-US" sz="2400" dirty="0">
+                <a:latin typeface="Titillium Web" panose="00000500000000000000" pitchFamily="2" charset="0"/>
+                <a:ea typeface="Open Sans" panose="020B0606030504020204" pitchFamily="34" charset="0"/>
+                <a:cs typeface="Open Sans" panose="020B0606030504020204" pitchFamily="34" charset="0"/>
+              </a:rPr>
+              <a:t>, which uses a pre-trained language model to convert the input text into embeddings before inputting them into the model. This was shown in the paper to improve performance. In terms of training time, the DIET models take longer because of the larger number of epochs. These epochs are necessary because the models are trained from scratch. To verify that 100 epochs was enough, the HWU64 dataset was also used to train the DIET model for 200 epochs to see if it improved model performance, but no notable improvement was observed. The training times for diet ranged from 2 to 15 minutes when trained on a 1080TI GPU. The ATIS dataset had to be trained on CPU for the DIET model because it caused the GPU to run out of memory. This is likely the result of the number of entity types and number of entities present in that dataset.</a:t>
+            </a:r>
+          </a:p>
+          <a:p>
+            <a:endParaRPr lang="en-US" sz="2400" dirty="0">
+              <a:latin typeface="Titillium Web" panose="00000500000000000000" pitchFamily="2" charset="0"/>
+              <a:ea typeface="Open Sans" panose="020B0606030504020204" pitchFamily="34" charset="0"/>
+              <a:cs typeface="Open Sans" panose="020B0606030504020204" pitchFamily="34" charset="0"/>
+            </a:endParaRPr>
           </a:p>
           <a:p>
             <a:endParaRPr lang="en-US" sz="2400" dirty="0">
@@ -6593,7 +6645,7 @@
         <p:spPr bwMode="auto">
           <a:xfrm>
             <a:off x="22311361" y="8000232"/>
-            <a:ext cx="10058400" cy="4570482"/>
+            <a:ext cx="10058400" cy="5309146"/>
           </a:xfrm>
           <a:prstGeom prst="rect">
             <a:avLst/>
@@ -6743,7 +6795,7 @@
                 <a:ea typeface="Open Sans" panose="020B0606030504020204" pitchFamily="34" charset="0"/>
                 <a:cs typeface="Open Sans" panose="020B0606030504020204" pitchFamily="34" charset="0"/>
               </a:rPr>
-              <a:t>Below are two charts showing the precision, recall, F1 score and accuracy of each model in intent classification and named entity recognition. The </a:t>
+              <a:t>Below are two charts showing the precision, recall, F1 score and accuracy of each model in intent classification and named entity recognition, where applicable. The </a:t>
             </a:r>
             <a:r>
               <a:rPr lang="en-US" sz="2400" dirty="0" err="1">
@@ -6775,7 +6827,7 @@
                 <a:ea typeface="Open Sans" panose="020B0606030504020204" pitchFamily="34" charset="0"/>
                 <a:cs typeface="Open Sans" panose="020B0606030504020204" pitchFamily="34" charset="0"/>
               </a:rPr>
-              <a:t> classification report was used on the query intent evaluation. On these datasets, the models were generally comparable to each other. For query intent classification, the BERT model slightly outperformed the DIET model on 5 of the 6 datasets on all metrics but F1 score. The HWU64 dataset was also used to train the DIET model for 200 epochs to see if it improved model performance, but no notable improvement was observed. Further fine-tuning of the rasa model might close the gap between the models, but it is notable that the model performs almost as well as BERT with a significantly smaller dataset than even what </a:t>
+              <a:t> classification report was used on the query intent evaluation. On these datasets, the models were generally comparable to each other. For query intent classification, the BERT model slightly outperformed the default DIET model on 5 of the 6 datasets on all metrics but F1 score. The DIET with language model outperformed BERT on BANKING77, CLINC150, and HWU64. Further fine-tuning of the rasa model might close the gap between the models, but it is notable that the model performs almost as well as BERT with a significantly smaller dataset than even what </a:t>
             </a:r>
             <a:r>
               <a:rPr lang="en-US" sz="2400" dirty="0" err="1">
@@ -6791,7 +6843,7 @@
                 <a:ea typeface="Open Sans" panose="020B0606030504020204" pitchFamily="34" charset="0"/>
                 <a:cs typeface="Open Sans" panose="020B0606030504020204" pitchFamily="34" charset="0"/>
               </a:rPr>
-              <a:t> is trained on.</a:t>
+              <a:t> is trained on. Additional data regarding the performance on each dataset is available in the Appendix, and on performance for specific intents and entity types is available in the results folder of the GitHub repository.</a:t>
             </a:r>
           </a:p>
         </p:txBody>
@@ -7116,7 +7168,7 @@
                 <a:ea typeface="Open Sans" panose="020B0606030504020204" pitchFamily="34" charset="0"/>
                 <a:cs typeface="Open Sans" panose="020B0606030504020204" pitchFamily="34" charset="0"/>
               </a:rPr>
-              <a:t>Some recent research indicates that for specific domains where the language style differs from the data used to train BERT, training a transformer architecture from scratch can approach the performance of these larger architectures, some instances outperforming them. This project is based on one of the papers (Bunk, et al. 2020) reviewed, which showed that training a custom model, named the Dual Intent and Entity Transformer (DIET) from scratch outperforms BERT with fine tuning on intent classification and entity recognition. However, this was after what appears to be some fine tuning on the DIET model. The goal of this project is to compare the out-of-the box performance of each of these models from a practitioner’s perspective. Thus, part of this project was to identify some of the datasets that were used in that paper (SNIPS, ATIS) to train and compare these two models. The BERT model used was trained using the </a:t>
+              <a:t>Some recent research indicates that for specific domains where the language style differs from the data used to train BERT, training a transformer architecture from scratch can approach the performance of these larger architectures, some instances outperforming them. This project is based on one of the papers (Bunk, et al. 2020) reviewed, which showed that training a custom model, named the Dual Intent and Entity Transformer (DIET) from scratch outperforms BERT with fine tuning on intent classification and entity recognition. The goal of this project is to compare the out-of-the box performance of each of these models from a practitioner’s perspective. Thus, part of this project was to identify some of the datasets that were used in that paper (SNIPS, ATIS) to train and compare these two models. The BERT model used was trained using the </a:t>
             </a:r>
             <a:r>
               <a:rPr lang="en-US" sz="2400" dirty="0" err="1">
@@ -7150,7 +7202,7 @@
                 <a:ea typeface="Open Sans" panose="020B0606030504020204" pitchFamily="34" charset="0"/>
                 <a:cs typeface="Open Sans" panose="020B0606030504020204" pitchFamily="34" charset="0"/>
               </a:rPr>
-              <a:t> python conversational AI library.</a:t>
+              <a:t> python conversational AI library. Below is a graphical representation of the DIET architecture:</a:t>
             </a:r>
           </a:p>
         </p:txBody>
@@ -7171,7 +7223,7 @@
         </p:nvSpPr>
         <p:spPr bwMode="auto">
           <a:xfrm>
-            <a:off x="1062257" y="7479216"/>
+            <a:off x="1062257" y="6783440"/>
             <a:ext cx="9144000" cy="784225"/>
           </a:xfrm>
           <a:prstGeom prst="rect">
@@ -7193,7 +7245,7 @@
           <a:p>
             <a:pPr defTabSz="4703763"/>
             <a:r>
-              <a:rPr lang="en-US" sz="3600">
+              <a:rPr lang="en-US" sz="3600" dirty="0">
                 <a:solidFill>
                   <a:srgbClr val="235078"/>
                 </a:solidFill>
@@ -7219,7 +7271,7 @@
         <p:spPr>
           <a:xfrm>
             <a:off x="33157855" y="8073317"/>
-            <a:ext cx="9857035" cy="7848302"/>
+            <a:ext cx="9857035" cy="8217634"/>
           </a:xfrm>
           <a:prstGeom prst="rect">
             <a:avLst/>
@@ -7242,21 +7294,8 @@
                 <a:ea typeface="Open Sans" panose="020B0606030504020204" pitchFamily="34" charset="0"/>
                 <a:cs typeface="Open Sans" panose="020B0606030504020204" pitchFamily="34" charset="0"/>
               </a:rPr>
-              <a:t>This project demonstrated that the BERT and DIET models provide comparable results out-of-the-box on the six datasets reviewed. BERT tends to outperform DIET, which might be the result of more semantic information being available within the model itself that can help with understanding unseen examples. However, it should be noted that these models were trained with mostly default hyperparameters and minimal tuning. The DIET performance is quite admirable given the fact that it is trained on a relatively small dataset compared to BERT. Additionally, it provides a very compelling performance to model size ratio. It is also important to note that the authors of (Bunk, et al. 2020) are Rasa employees, and the results of that work might be biased towards that company’s product. The model presented was their best performing model </a:t>
-            </a:r>
-            <a:r>
-              <a:rPr lang="en-US" sz="2400">
-                <a:latin typeface="Titillium Web" panose="00000500000000000000" pitchFamily="2" charset="0"/>
-                <a:ea typeface="Open Sans" panose="020B0606030504020204" pitchFamily="34" charset="0"/>
-                <a:cs typeface="Open Sans" panose="020B0606030504020204" pitchFamily="34" charset="0"/>
-              </a:rPr>
-              <a:t>and included </a:t>
-            </a:r>
-            <a:endParaRPr lang="en-US" sz="2400" dirty="0">
-              <a:latin typeface="Titillium Web" panose="00000500000000000000" pitchFamily="2" charset="0"/>
-              <a:ea typeface="Open Sans" panose="020B0606030504020204" pitchFamily="34" charset="0"/>
-              <a:cs typeface="Open Sans" panose="020B0606030504020204" pitchFamily="34" charset="0"/>
-            </a:endParaRPr>
+              <a:t>This project demonstrated that the BERT and DIET models provide comparable results out-of-the-box on the six datasets reviewed. BERT tends to outperform DIET in NER, which might be the result of more semantic information being available within the model itself that can help with understanding unseen examples. The DIET models showed promising results, particularly when adding a language model to it. Doing so managed to either approach or surpass the performance of BERT on query intent classification. However, it should be noted that these models were trained with mostly default hyperparameters and minimal tuning. The DIET performance is quite admirable given the fact that it is trained on a relatively small dataset compared to BERT. Additionally, it provides a very compelling performance to model size ratio. It is also important to note that the authors of (Bunk, et al. 2020) are Rasa employees, and the results of that work might be biased towards that company’s product.</a:t>
+            </a:r>
           </a:p>
           <a:p>
             <a:endParaRPr lang="en-US" sz="2400" dirty="0">
@@ -7288,7 +7327,7 @@
                 <a:ea typeface="Open Sans" panose="020B0606030504020204" pitchFamily="34" charset="0"/>
                 <a:cs typeface="Open Sans" panose="020B0606030504020204" pitchFamily="34" charset="0"/>
               </a:rPr>
-              <a:t> model to perform sequence and token classification (i.e., NER), train the model on this dataset and compare the performance of the models. Furthermore, additional fine tuning of the DIET model would be interesting to see whether it can close the gap with BERT. Furthermore, training the models on additional datasets and comparing the results would also be enlightening.</a:t>
+              <a:t> model to perform sequence and token classification (i.e., NER), train the model on this dataset and compare the performance of the models. Furthermore, additional fine tuning of the DIET model would be interesting to see whether it can close the gap with BERT on NER. Furthermore, training the models on additional datasets and comparing the results would also be enlightening.</a:t>
             </a:r>
           </a:p>
         </p:txBody>
@@ -7646,64 +7685,6 @@
           </a:extLst>
         </p:spPr>
       </p:pic>
-      <p:graphicFrame>
-        <p:nvGraphicFramePr>
-          <p:cNvPr id="21" name="Chart 20">
-            <a:extLst>
-              <a:ext uri="{FF2B5EF4-FFF2-40B4-BE49-F238E27FC236}">
-                <a16:creationId xmlns:a16="http://schemas.microsoft.com/office/drawing/2014/main" id="{D43B9101-3A3F-4D4F-B82B-A8C18CC0EAC5}"/>
-              </a:ext>
-            </a:extLst>
-          </p:cNvPr>
-          <p:cNvGraphicFramePr>
-            <a:graphicFrameLocks/>
-          </p:cNvGraphicFramePr>
-          <p:nvPr>
-            <p:extLst>
-              <p:ext uri="{D42A27DB-BD31-4B8C-83A1-F6EECF244321}">
-                <p14:modId xmlns:p14="http://schemas.microsoft.com/office/powerpoint/2010/main" val="352741185"/>
-              </p:ext>
-            </p:extLst>
-          </p:nvPr>
-        </p:nvGraphicFramePr>
-        <p:xfrm>
-          <a:off x="22311361" y="12925047"/>
-          <a:ext cx="10789918" cy="5604469"/>
-        </p:xfrm>
-        <a:graphic>
-          <a:graphicData uri="http://schemas.openxmlformats.org/drawingml/2006/chart">
-            <c:chart xmlns:c="http://schemas.openxmlformats.org/drawingml/2006/chart" xmlns:r="http://schemas.openxmlformats.org/officeDocument/2006/relationships" r:id="rId6"/>
-          </a:graphicData>
-        </a:graphic>
-      </p:graphicFrame>
-      <p:graphicFrame>
-        <p:nvGraphicFramePr>
-          <p:cNvPr id="22" name="Chart 21">
-            <a:extLst>
-              <a:ext uri="{FF2B5EF4-FFF2-40B4-BE49-F238E27FC236}">
-                <a16:creationId xmlns:a16="http://schemas.microsoft.com/office/drawing/2014/main" id="{EEBFFAE6-04B3-4985-A3E4-0872ECDE3771}"/>
-              </a:ext>
-            </a:extLst>
-          </p:cNvPr>
-          <p:cNvGraphicFramePr/>
-          <p:nvPr>
-            <p:extLst>
-              <p:ext uri="{D42A27DB-BD31-4B8C-83A1-F6EECF244321}">
-                <p14:modId xmlns:p14="http://schemas.microsoft.com/office/powerpoint/2010/main" val="3152420045"/>
-              </p:ext>
-            </p:extLst>
-          </p:nvPr>
-        </p:nvGraphicFramePr>
-        <p:xfrm>
-          <a:off x="22311360" y="18673072"/>
-          <a:ext cx="10789917" cy="6127181"/>
-        </p:xfrm>
-        <a:graphic>
-          <a:graphicData uri="http://schemas.openxmlformats.org/drawingml/2006/chart">
-            <c:chart xmlns:c="http://schemas.openxmlformats.org/drawingml/2006/chart" xmlns:r="http://schemas.openxmlformats.org/officeDocument/2006/relationships" r:id="rId7"/>
-          </a:graphicData>
-        </a:graphic>
-      </p:graphicFrame>
       <p:pic>
         <p:nvPicPr>
           <p:cNvPr id="6" name="Graphic 5">
@@ -7719,10 +7700,10 @@
           <p:nvPr/>
         </p:nvPicPr>
         <p:blipFill>
-          <a:blip r:embed="rId8">
+          <a:blip r:embed="rId6">
             <a:extLst>
               <a:ext uri="{96DAC541-7B7A-43D3-8B79-37D633B846F1}">
-                <asvg:svgBlip xmlns:asvg="http://schemas.microsoft.com/office/drawing/2016/SVG/main" r:embed="rId9"/>
+                <asvg:svgBlip xmlns:asvg="http://schemas.microsoft.com/office/drawing/2016/SVG/main" r:embed="rId7"/>
               </a:ext>
             </a:extLst>
           </a:blip>
@@ -7732,7 +7713,7 @@
         </p:blipFill>
         <p:spPr>
           <a:xfrm>
-            <a:off x="1388973" y="26673730"/>
+            <a:off x="38029796" y="19058687"/>
             <a:ext cx="1588152" cy="1471130"/>
           </a:xfrm>
           <a:prstGeom prst="rect">
@@ -7740,12 +7721,72 @@
           </a:prstGeom>
         </p:spPr>
       </p:pic>
+      <p:graphicFrame>
+        <p:nvGraphicFramePr>
+          <p:cNvPr id="25" name="Chart 24">
+            <a:extLst>
+              <a:ext uri="{FF2B5EF4-FFF2-40B4-BE49-F238E27FC236}">
+                <a16:creationId xmlns:a16="http://schemas.microsoft.com/office/drawing/2014/main" id="{D43B9101-3A3F-4D4F-B82B-A8C18CC0EAC5}"/>
+              </a:ext>
+            </a:extLst>
+          </p:cNvPr>
+          <p:cNvGraphicFramePr>
+            <a:graphicFrameLocks/>
+          </p:cNvGraphicFramePr>
+          <p:nvPr>
+            <p:extLst>
+              <p:ext uri="{D42A27DB-BD31-4B8C-83A1-F6EECF244321}">
+                <p14:modId xmlns:p14="http://schemas.microsoft.com/office/powerpoint/2010/main" val="4236695377"/>
+              </p:ext>
+            </p:extLst>
+          </p:nvPr>
+        </p:nvGraphicFramePr>
+        <p:xfrm>
+          <a:off x="22311360" y="13370814"/>
+          <a:ext cx="9857035" cy="5958802"/>
+        </p:xfrm>
+        <a:graphic>
+          <a:graphicData uri="http://schemas.openxmlformats.org/drawingml/2006/chart">
+            <c:chart xmlns:c="http://schemas.openxmlformats.org/drawingml/2006/chart" xmlns:r="http://schemas.openxmlformats.org/officeDocument/2006/relationships" r:id="rId8"/>
+          </a:graphicData>
+        </a:graphic>
+      </p:graphicFrame>
+      <p:graphicFrame>
+        <p:nvGraphicFramePr>
+          <p:cNvPr id="26" name="Chart 25">
+            <a:extLst>
+              <a:ext uri="{FF2B5EF4-FFF2-40B4-BE49-F238E27FC236}">
+                <a16:creationId xmlns:a16="http://schemas.microsoft.com/office/drawing/2014/main" id="{EEBFFAE6-04B3-4985-A3E4-0872ECDE3771}"/>
+              </a:ext>
+            </a:extLst>
+          </p:cNvPr>
+          <p:cNvGraphicFramePr>
+            <a:graphicFrameLocks/>
+          </p:cNvGraphicFramePr>
+          <p:nvPr>
+            <p:extLst>
+              <p:ext uri="{D42A27DB-BD31-4B8C-83A1-F6EECF244321}">
+                <p14:modId xmlns:p14="http://schemas.microsoft.com/office/powerpoint/2010/main" val="2248945030"/>
+              </p:ext>
+            </p:extLst>
+          </p:nvPr>
+        </p:nvGraphicFramePr>
+        <p:xfrm>
+          <a:off x="22311361" y="19422295"/>
+          <a:ext cx="9857034" cy="5958802"/>
+        </p:xfrm>
+        <a:graphic>
+          <a:graphicData uri="http://schemas.openxmlformats.org/drawingml/2006/chart">
+            <c:chart xmlns:c="http://schemas.openxmlformats.org/drawingml/2006/chart" xmlns:r="http://schemas.openxmlformats.org/officeDocument/2006/relationships" r:id="rId9"/>
+          </a:graphicData>
+        </a:graphic>
+      </p:graphicFrame>
       <p:pic>
         <p:nvPicPr>
-          <p:cNvPr id="8" name="Picture 7" descr="Icon&#10;&#10;Description automatically generated">
+          <p:cNvPr id="27" name="Picture 26" descr="A screenshot of a computer&#10;&#10;Description automatically generated with medium confidence">
             <a:extLst>
               <a:ext uri="{FF2B5EF4-FFF2-40B4-BE49-F238E27FC236}">
-                <a16:creationId xmlns:a16="http://schemas.microsoft.com/office/drawing/2014/main" id="{D302815F-4812-4E94-9C2F-A19422DFB384}"/>
+                <a16:creationId xmlns:a16="http://schemas.microsoft.com/office/drawing/2014/main" id="{E7EA5477-349E-4E23-84C3-BE23A66AAC4D}"/>
               </a:ext>
             </a:extLst>
           </p:cNvPr>
@@ -7755,27 +7796,38 @@
           <p:nvPr/>
         </p:nvPicPr>
         <p:blipFill>
-          <a:blip r:embed="rId10"/>
+          <a:blip r:embed="rId10" cstate="print">
+            <a:extLst>
+              <a:ext uri="{28A0092B-C50C-407E-A947-70E740481C1C}">
+                <a14:useLocalDpi xmlns:a14="http://schemas.microsoft.com/office/drawing/2010/main" val="0"/>
+              </a:ext>
+            </a:extLst>
+          </a:blip>
+          <a:srcRect/>
           <a:stretch>
             <a:fillRect/>
           </a:stretch>
         </p:blipFill>
-        <p:spPr>
+        <p:spPr bwMode="auto">
           <a:xfrm>
-            <a:off x="5582920" y="26736043"/>
-            <a:ext cx="3981450" cy="1945951"/>
+            <a:off x="1218635" y="25173753"/>
+            <a:ext cx="8534965" cy="4926078"/>
           </a:xfrm>
           <a:prstGeom prst="rect">
             <a:avLst/>
           </a:prstGeom>
+          <a:noFill/>
+          <a:ln>
+            <a:noFill/>
+          </a:ln>
         </p:spPr>
       </p:pic>
       <p:graphicFrame>
         <p:nvGraphicFramePr>
-          <p:cNvPr id="9" name="Table 8">
+          <p:cNvPr id="3" name="Table 2">
             <a:extLst>
               <a:ext uri="{FF2B5EF4-FFF2-40B4-BE49-F238E27FC236}">
-                <a16:creationId xmlns:a16="http://schemas.microsoft.com/office/drawing/2014/main" id="{EC4C7FF2-80D3-4BDF-84FD-6C30D46E414B}"/>
+                <a16:creationId xmlns:a16="http://schemas.microsoft.com/office/drawing/2014/main" id="{78ADF8C8-CB2A-4A5B-9083-536B127C56A5}"/>
               </a:ext>
             </a:extLst>
           </p:cNvPr>
@@ -7785,14 +7837,14 @@
           <p:nvPr>
             <p:extLst>
               <p:ext uri="{D42A27DB-BD31-4B8C-83A1-F6EECF244321}">
-                <p14:modId xmlns:p14="http://schemas.microsoft.com/office/powerpoint/2010/main" val="2703947763"/>
+                <p14:modId xmlns:p14="http://schemas.microsoft.com/office/powerpoint/2010/main" val="1394080085"/>
               </p:ext>
             </p:extLst>
           </p:nvPr>
         </p:nvGraphicFramePr>
         <p:xfrm>
-          <a:off x="22311361" y="25642131"/>
-          <a:ext cx="9323070" cy="4457700"/>
+          <a:off x="22311361" y="25448448"/>
+          <a:ext cx="9857034" cy="3691908"/>
         </p:xfrm>
         <a:graphic>
           <a:graphicData uri="http://schemas.openxmlformats.org/drawingml/2006/table">
@@ -7801,43 +7853,43 @@
                 <a:tableStyleId>{5C22544A-7EE6-4342-B048-85BDC9FD1C3A}</a:tableStyleId>
               </a:tblPr>
               <a:tblGrid>
-                <a:gridCol w="1864614">
+                <a:gridCol w="3834598">
                   <a:extLst>
                     <a:ext uri="{9D8B030D-6E8A-4147-A177-3AD203B41FA5}">
-                      <a16:colId xmlns:a16="http://schemas.microsoft.com/office/drawing/2014/main" val="3726431048"/>
+                      <a16:colId xmlns:a16="http://schemas.microsoft.com/office/drawing/2014/main" val="2021058155"/>
                     </a:ext>
                   </a:extLst>
                 </a:gridCol>
-                <a:gridCol w="1864614">
+                <a:gridCol w="1505609">
                   <a:extLst>
                     <a:ext uri="{9D8B030D-6E8A-4147-A177-3AD203B41FA5}">
-                      <a16:colId xmlns:a16="http://schemas.microsoft.com/office/drawing/2014/main" val="3586047524"/>
+                      <a16:colId xmlns:a16="http://schemas.microsoft.com/office/drawing/2014/main" val="3297896181"/>
                     </a:ext>
                   </a:extLst>
                 </a:gridCol>
-                <a:gridCol w="1864614">
+                <a:gridCol w="1505609">
                   <a:extLst>
                     <a:ext uri="{9D8B030D-6E8A-4147-A177-3AD203B41FA5}">
-                      <a16:colId xmlns:a16="http://schemas.microsoft.com/office/drawing/2014/main" val="3329891462"/>
+                      <a16:colId xmlns:a16="http://schemas.microsoft.com/office/drawing/2014/main" val="4072135556"/>
                     </a:ext>
                   </a:extLst>
                 </a:gridCol>
-                <a:gridCol w="1864614">
+                <a:gridCol w="1505609">
                   <a:extLst>
                     <a:ext uri="{9D8B030D-6E8A-4147-A177-3AD203B41FA5}">
-                      <a16:colId xmlns:a16="http://schemas.microsoft.com/office/drawing/2014/main" val="3983423330"/>
+                      <a16:colId xmlns:a16="http://schemas.microsoft.com/office/drawing/2014/main" val="4244543481"/>
                     </a:ext>
                   </a:extLst>
                 </a:gridCol>
-                <a:gridCol w="1864614">
+                <a:gridCol w="1505609">
                   <a:extLst>
                     <a:ext uri="{9D8B030D-6E8A-4147-A177-3AD203B41FA5}">
-                      <a16:colId xmlns:a16="http://schemas.microsoft.com/office/drawing/2014/main" val="4020348358"/>
+                      <a16:colId xmlns:a16="http://schemas.microsoft.com/office/drawing/2014/main" val="2075078348"/>
                     </a:ext>
                   </a:extLst>
                 </a:gridCol>
               </a:tblGrid>
-              <a:tr h="429300">
+              <a:tr h="335628">
                 <a:tc gridSpan="5">
                   <a:txBody>
                     <a:bodyPr/>
@@ -7845,12 +7897,12 @@
                     <a:p>
                       <a:pPr algn="ctr" fontAlgn="b"/>
                       <a:r>
-                        <a:rPr lang="en-US" sz="3200" b="1" u="none" strike="noStrike" dirty="0">
+                        <a:rPr lang="en-US" sz="1800" u="none" strike="noStrike">
                           <a:effectLst/>
                         </a:rPr>
-                        <a:t>Task: Intent Classification</a:t>
+                        <a:t>Intent Classification</a:t>
                       </a:r>
-                      <a:endParaRPr lang="en-US" sz="3200" b="1" i="0" u="none" strike="noStrike" dirty="0">
+                      <a:endParaRPr lang="en-US" sz="1800" b="1" i="0" u="none" strike="noStrike">
                         <a:solidFill>
                           <a:srgbClr val="000000"/>
                         </a:solidFill>
@@ -7903,384 +7955,24 @@
                 </a:tc>
                 <a:extLst>
                   <a:ext uri="{0D108BD9-81ED-4DB2-BD59-A6C34878D82A}">
-                    <a16:rowId xmlns:a16="http://schemas.microsoft.com/office/drawing/2014/main" val="3063117759"/>
+                    <a16:rowId xmlns:a16="http://schemas.microsoft.com/office/drawing/2014/main" val="2180429030"/>
                   </a:ext>
                 </a:extLst>
               </a:tr>
-              <a:tr h="429300">
+              <a:tr h="335628">
                 <a:tc>
                   <a:txBody>
                     <a:bodyPr/>
                     <a:lstStyle/>
                     <a:p>
-                      <a:pPr algn="ctr" fontAlgn="b"/>
+                      <a:pPr algn="l" fontAlgn="b"/>
                       <a:r>
-                        <a:rPr lang="en-US" sz="3200" u="none" strike="noStrike" dirty="0">
+                        <a:rPr lang="en-US" sz="1800" u="none" strike="noStrike">
                           <a:effectLst/>
                         </a:rPr>
                         <a:t>Model</a:t>
                       </a:r>
-                      <a:endParaRPr lang="en-US" sz="3200" b="1" i="0" u="none" strike="noStrike" dirty="0">
-                        <a:solidFill>
-                          <a:srgbClr val="000000"/>
-                        </a:solidFill>
-                        <a:effectLst/>
-                        <a:latin typeface="Calibri" panose="020F0502020204030204" pitchFamily="34" charset="0"/>
-                      </a:endParaRPr>
-                    </a:p>
-                  </a:txBody>
-                  <a:tcPr marL="7620" marR="7620" marT="7620" marB="0" anchor="b"/>
-                </a:tc>
-                <a:tc>
-                  <a:txBody>
-                    <a:bodyPr/>
-                    <a:lstStyle/>
-                    <a:p>
-                      <a:pPr algn="ctr" fontAlgn="b"/>
-                      <a:r>
-                        <a:rPr lang="en-US" sz="3200" u="none" strike="noStrike" dirty="0">
-                          <a:effectLst/>
-                        </a:rPr>
-                        <a:t>Precision</a:t>
-                      </a:r>
-                      <a:endParaRPr lang="en-US" sz="3200" b="1" i="0" u="none" strike="noStrike" dirty="0">
-                        <a:solidFill>
-                          <a:srgbClr val="000000"/>
-                        </a:solidFill>
-                        <a:effectLst/>
-                        <a:latin typeface="Calibri" panose="020F0502020204030204" pitchFamily="34" charset="0"/>
-                      </a:endParaRPr>
-                    </a:p>
-                  </a:txBody>
-                  <a:tcPr marL="7620" marR="7620" marT="7620" marB="0" anchor="b"/>
-                </a:tc>
-                <a:tc>
-                  <a:txBody>
-                    <a:bodyPr/>
-                    <a:lstStyle/>
-                    <a:p>
-                      <a:pPr algn="ctr" fontAlgn="b"/>
-                      <a:r>
-                        <a:rPr lang="en-US" sz="3200" u="none" strike="noStrike" dirty="0">
-                          <a:effectLst/>
-                        </a:rPr>
-                        <a:t>Recall</a:t>
-                      </a:r>
-                      <a:endParaRPr lang="en-US" sz="3200" b="1" i="0" u="none" strike="noStrike" dirty="0">
-                        <a:solidFill>
-                          <a:srgbClr val="000000"/>
-                        </a:solidFill>
-                        <a:effectLst/>
-                        <a:latin typeface="Calibri" panose="020F0502020204030204" pitchFamily="34" charset="0"/>
-                      </a:endParaRPr>
-                    </a:p>
-                  </a:txBody>
-                  <a:tcPr marL="7620" marR="7620" marT="7620" marB="0" anchor="b"/>
-                </a:tc>
-                <a:tc>
-                  <a:txBody>
-                    <a:bodyPr/>
-                    <a:lstStyle/>
-                    <a:p>
-                      <a:pPr algn="ctr" fontAlgn="b"/>
-                      <a:r>
-                        <a:rPr lang="en-US" sz="3200" u="none" strike="noStrike" dirty="0">
-                          <a:effectLst/>
-                        </a:rPr>
-                        <a:t>F1-Score</a:t>
-                      </a:r>
-                      <a:endParaRPr lang="en-US" sz="3200" b="1" i="0" u="none" strike="noStrike" dirty="0">
-                        <a:solidFill>
-                          <a:srgbClr val="000000"/>
-                        </a:solidFill>
-                        <a:effectLst/>
-                        <a:latin typeface="Calibri" panose="020F0502020204030204" pitchFamily="34" charset="0"/>
-                      </a:endParaRPr>
-                    </a:p>
-                  </a:txBody>
-                  <a:tcPr marL="7620" marR="7620" marT="7620" marB="0" anchor="b"/>
-                </a:tc>
-                <a:tc>
-                  <a:txBody>
-                    <a:bodyPr/>
-                    <a:lstStyle/>
-                    <a:p>
-                      <a:pPr algn="ctr" fontAlgn="b"/>
-                      <a:r>
-                        <a:rPr lang="en-US" sz="3200" u="none" strike="noStrike" dirty="0">
-                          <a:effectLst/>
-                        </a:rPr>
-                        <a:t>Accuracy</a:t>
-                      </a:r>
-                      <a:endParaRPr lang="en-US" sz="3200" b="1" i="0" u="none" strike="noStrike" dirty="0">
-                        <a:solidFill>
-                          <a:srgbClr val="000000"/>
-                        </a:solidFill>
-                        <a:effectLst/>
-                        <a:latin typeface="Calibri" panose="020F0502020204030204" pitchFamily="34" charset="0"/>
-                      </a:endParaRPr>
-                    </a:p>
-                  </a:txBody>
-                  <a:tcPr marL="7620" marR="7620" marT="7620" marB="0" anchor="b"/>
-                </a:tc>
-                <a:extLst>
-                  <a:ext uri="{0D108BD9-81ED-4DB2-BD59-A6C34878D82A}">
-                    <a16:rowId xmlns:a16="http://schemas.microsoft.com/office/drawing/2014/main" val="3286189234"/>
-                  </a:ext>
-                </a:extLst>
-              </a:tr>
-              <a:tr h="429300">
-                <a:tc>
-                  <a:txBody>
-                    <a:bodyPr/>
-                    <a:lstStyle/>
-                    <a:p>
-                      <a:pPr algn="ctr" fontAlgn="b"/>
-                      <a:r>
-                        <a:rPr lang="en-US" sz="3200" u="none" strike="noStrike" dirty="0">
-                          <a:effectLst/>
-                        </a:rPr>
-                        <a:t>BERT</a:t>
-                      </a:r>
-                      <a:endParaRPr lang="en-US" sz="3200" b="0" i="0" u="none" strike="noStrike" dirty="0">
-                        <a:solidFill>
-                          <a:srgbClr val="000000"/>
-                        </a:solidFill>
-                        <a:effectLst/>
-                        <a:latin typeface="Calibri" panose="020F0502020204030204" pitchFamily="34" charset="0"/>
-                      </a:endParaRPr>
-                    </a:p>
-                  </a:txBody>
-                  <a:tcPr marL="7620" marR="7620" marT="7620" marB="0" anchor="b"/>
-                </a:tc>
-                <a:tc>
-                  <a:txBody>
-                    <a:bodyPr/>
-                    <a:lstStyle/>
-                    <a:p>
-                      <a:pPr algn="ctr" fontAlgn="b"/>
-                      <a:r>
-                        <a:rPr lang="en-US" sz="3200" u="none" strike="noStrike" dirty="0">
-                          <a:effectLst/>
-                        </a:rPr>
-                        <a:t>0.953135</a:t>
-                      </a:r>
-                      <a:endParaRPr lang="en-US" sz="3200" b="0" i="0" u="none" strike="noStrike" dirty="0">
-                        <a:solidFill>
-                          <a:srgbClr val="000000"/>
-                        </a:solidFill>
-                        <a:effectLst/>
-                        <a:latin typeface="Calibri" panose="020F0502020204030204" pitchFamily="34" charset="0"/>
-                      </a:endParaRPr>
-                    </a:p>
-                  </a:txBody>
-                  <a:tcPr marL="7620" marR="7620" marT="7620" marB="0" anchor="b"/>
-                </a:tc>
-                <a:tc>
-                  <a:txBody>
-                    <a:bodyPr/>
-                    <a:lstStyle/>
-                    <a:p>
-                      <a:pPr algn="ctr" fontAlgn="b"/>
-                      <a:r>
-                        <a:rPr lang="en-US" sz="3200" u="none" strike="noStrike" dirty="0">
-                          <a:effectLst/>
-                        </a:rPr>
-                        <a:t>0.952023</a:t>
-                      </a:r>
-                      <a:endParaRPr lang="en-US" sz="3200" b="0" i="0" u="none" strike="noStrike" dirty="0">
-                        <a:solidFill>
-                          <a:srgbClr val="000000"/>
-                        </a:solidFill>
-                        <a:effectLst/>
-                        <a:latin typeface="Calibri" panose="020F0502020204030204" pitchFamily="34" charset="0"/>
-                      </a:endParaRPr>
-                    </a:p>
-                  </a:txBody>
-                  <a:tcPr marL="7620" marR="7620" marT="7620" marB="0" anchor="b"/>
-                </a:tc>
-                <a:tc>
-                  <a:txBody>
-                    <a:bodyPr/>
-                    <a:lstStyle/>
-                    <a:p>
-                      <a:pPr algn="ctr" fontAlgn="b"/>
-                      <a:r>
-                        <a:rPr lang="en-US" sz="3200" u="none" strike="noStrike">
-                          <a:effectLst/>
-                        </a:rPr>
-                        <a:t>0.898755</a:t>
-                      </a:r>
-                      <a:endParaRPr lang="en-US" sz="3200" b="0" i="0" u="none" strike="noStrike">
-                        <a:solidFill>
-                          <a:srgbClr val="000000"/>
-                        </a:solidFill>
-                        <a:effectLst/>
-                        <a:latin typeface="Calibri" panose="020F0502020204030204" pitchFamily="34" charset="0"/>
-                      </a:endParaRPr>
-                    </a:p>
-                  </a:txBody>
-                  <a:tcPr marL="7620" marR="7620" marT="7620" marB="0" anchor="b"/>
-                </a:tc>
-                <a:tc>
-                  <a:txBody>
-                    <a:bodyPr/>
-                    <a:lstStyle/>
-                    <a:p>
-                      <a:pPr algn="ctr" fontAlgn="b"/>
-                      <a:r>
-                        <a:rPr lang="en-US" sz="3200" u="none" strike="noStrike">
-                          <a:effectLst/>
-                        </a:rPr>
-                        <a:t>0.952023</a:t>
-                      </a:r>
-                      <a:endParaRPr lang="en-US" sz="3200" b="0" i="0" u="none" strike="noStrike">
-                        <a:solidFill>
-                          <a:srgbClr val="000000"/>
-                        </a:solidFill>
-                        <a:effectLst/>
-                        <a:latin typeface="Calibri" panose="020F0502020204030204" pitchFamily="34" charset="0"/>
-                      </a:endParaRPr>
-                    </a:p>
-                  </a:txBody>
-                  <a:tcPr marL="7620" marR="7620" marT="7620" marB="0" anchor="b"/>
-                </a:tc>
-                <a:extLst>
-                  <a:ext uri="{0D108BD9-81ED-4DB2-BD59-A6C34878D82A}">
-                    <a16:rowId xmlns:a16="http://schemas.microsoft.com/office/drawing/2014/main" val="3482741982"/>
-                  </a:ext>
-                </a:extLst>
-              </a:tr>
-              <a:tr h="429300">
-                <a:tc>
-                  <a:txBody>
-                    <a:bodyPr/>
-                    <a:lstStyle/>
-                    <a:p>
-                      <a:pPr algn="ctr" fontAlgn="b"/>
-                      <a:r>
-                        <a:rPr lang="en-US" sz="3200" u="none" strike="noStrike">
-                          <a:effectLst/>
-                        </a:rPr>
-                        <a:t>DIET</a:t>
-                      </a:r>
-                      <a:endParaRPr lang="en-US" sz="3200" b="0" i="0" u="none" strike="noStrike">
-                        <a:solidFill>
-                          <a:srgbClr val="000000"/>
-                        </a:solidFill>
-                        <a:effectLst/>
-                        <a:latin typeface="Calibri" panose="020F0502020204030204" pitchFamily="34" charset="0"/>
-                      </a:endParaRPr>
-                    </a:p>
-                  </a:txBody>
-                  <a:tcPr marL="7620" marR="7620" marT="7620" marB="0" anchor="b"/>
-                </a:tc>
-                <a:tc>
-                  <a:txBody>
-                    <a:bodyPr/>
-                    <a:lstStyle/>
-                    <a:p>
-                      <a:pPr algn="ctr" fontAlgn="b"/>
-                      <a:r>
-                        <a:rPr lang="en-US" sz="3200" u="none" strike="noStrike">
-                          <a:effectLst/>
-                        </a:rPr>
-                        <a:t>0.941358</a:t>
-                      </a:r>
-                      <a:endParaRPr lang="en-US" sz="3200" b="0" i="0" u="none" strike="noStrike">
-                        <a:solidFill>
-                          <a:srgbClr val="000000"/>
-                        </a:solidFill>
-                        <a:effectLst/>
-                        <a:latin typeface="Calibri" panose="020F0502020204030204" pitchFamily="34" charset="0"/>
-                      </a:endParaRPr>
-                    </a:p>
-                  </a:txBody>
-                  <a:tcPr marL="7620" marR="7620" marT="7620" marB="0" anchor="b"/>
-                </a:tc>
-                <a:tc>
-                  <a:txBody>
-                    <a:bodyPr/>
-                    <a:lstStyle/>
-                    <a:p>
-                      <a:pPr algn="ctr" fontAlgn="b"/>
-                      <a:r>
-                        <a:rPr lang="en-US" sz="3200" u="none" strike="noStrike">
-                          <a:effectLst/>
-                        </a:rPr>
-                        <a:t>0.937397</a:t>
-                      </a:r>
-                      <a:endParaRPr lang="en-US" sz="3200" b="0" i="0" u="none" strike="noStrike">
-                        <a:solidFill>
-                          <a:srgbClr val="000000"/>
-                        </a:solidFill>
-                        <a:effectLst/>
-                        <a:latin typeface="Calibri" panose="020F0502020204030204" pitchFamily="34" charset="0"/>
-                      </a:endParaRPr>
-                    </a:p>
-                  </a:txBody>
-                  <a:tcPr marL="7620" marR="7620" marT="7620" marB="0" anchor="b"/>
-                </a:tc>
-                <a:tc>
-                  <a:txBody>
-                    <a:bodyPr/>
-                    <a:lstStyle/>
-                    <a:p>
-                      <a:pPr algn="ctr" fontAlgn="b"/>
-                      <a:r>
-                        <a:rPr lang="en-US" sz="3200" u="none" strike="noStrike">
-                          <a:effectLst/>
-                        </a:rPr>
-                        <a:t>0.936648</a:t>
-                      </a:r>
-                      <a:endParaRPr lang="en-US" sz="3200" b="0" i="0" u="none" strike="noStrike">
-                        <a:solidFill>
-                          <a:srgbClr val="000000"/>
-                        </a:solidFill>
-                        <a:effectLst/>
-                        <a:latin typeface="Calibri" panose="020F0502020204030204" pitchFamily="34" charset="0"/>
-                      </a:endParaRPr>
-                    </a:p>
-                  </a:txBody>
-                  <a:tcPr marL="7620" marR="7620" marT="7620" marB="0" anchor="b"/>
-                </a:tc>
-                <a:tc>
-                  <a:txBody>
-                    <a:bodyPr/>
-                    <a:lstStyle/>
-                    <a:p>
-                      <a:pPr algn="ctr" fontAlgn="b"/>
-                      <a:r>
-                        <a:rPr lang="en-US" sz="3200" u="none" strike="noStrike" dirty="0">
-                          <a:effectLst/>
-                        </a:rPr>
-                        <a:t>0.937397</a:t>
-                      </a:r>
-                      <a:endParaRPr lang="en-US" sz="3200" b="0" i="0" u="none" strike="noStrike" dirty="0">
-                        <a:solidFill>
-                          <a:srgbClr val="000000"/>
-                        </a:solidFill>
-                        <a:effectLst/>
-                        <a:latin typeface="Calibri" panose="020F0502020204030204" pitchFamily="34" charset="0"/>
-                      </a:endParaRPr>
-                    </a:p>
-                  </a:txBody>
-                  <a:tcPr marL="7620" marR="7620" marT="7620" marB="0" anchor="b"/>
-                </a:tc>
-                <a:extLst>
-                  <a:ext uri="{0D108BD9-81ED-4DB2-BD59-A6C34878D82A}">
-                    <a16:rowId xmlns:a16="http://schemas.microsoft.com/office/drawing/2014/main" val="1559199717"/>
-                  </a:ext>
-                </a:extLst>
-              </a:tr>
-              <a:tr h="429300">
-                <a:tc>
-                  <a:txBody>
-                    <a:bodyPr/>
-                    <a:lstStyle/>
-                    <a:p>
-                      <a:pPr algn="ctr" fontAlgn="b"/>
-                      <a:endParaRPr lang="en-US" sz="3200" b="0" i="0" u="none" strike="noStrike" dirty="0">
+                      <a:endParaRPr lang="en-US" sz="1800" b="1" i="0" u="none" strike="noStrike">
                         <a:solidFill>
                           <a:srgbClr val="000000"/>
                         </a:solidFill>
@@ -8297,7 +7989,13 @@
                     <a:lstStyle/>
                     <a:p>
                       <a:pPr algn="l" fontAlgn="b"/>
-                      <a:endParaRPr lang="en-US" sz="3200" b="0" i="0" u="none" strike="noStrike">
+                      <a:r>
+                        <a:rPr lang="en-US" sz="1800" u="none" strike="noStrike">
+                          <a:effectLst/>
+                        </a:rPr>
+                        <a:t>precision</a:t>
+                      </a:r>
+                      <a:endParaRPr lang="en-US" sz="1800" b="1" i="0" u="none" strike="noStrike">
                         <a:solidFill>
                           <a:srgbClr val="000000"/>
                         </a:solidFill>
@@ -8314,7 +8012,13 @@
                     <a:lstStyle/>
                     <a:p>
                       <a:pPr algn="l" fontAlgn="b"/>
-                      <a:endParaRPr lang="en-US" sz="3200" b="0" i="0" u="none" strike="noStrike">
+                      <a:r>
+                        <a:rPr lang="en-US" sz="1800" u="none" strike="noStrike">
+                          <a:effectLst/>
+                        </a:rPr>
+                        <a:t>recall</a:t>
+                      </a:r>
+                      <a:endParaRPr lang="en-US" sz="1800" b="1" i="0" u="none" strike="noStrike">
                         <a:solidFill>
                           <a:srgbClr val="000000"/>
                         </a:solidFill>
@@ -8331,7 +8035,13 @@
                     <a:lstStyle/>
                     <a:p>
                       <a:pPr algn="l" fontAlgn="b"/>
-                      <a:endParaRPr lang="en-US" sz="3200" b="0" i="0" u="none" strike="noStrike">
+                      <a:r>
+                        <a:rPr lang="en-US" sz="1800" u="none" strike="noStrike">
+                          <a:effectLst/>
+                        </a:rPr>
+                        <a:t>f1-score</a:t>
+                      </a:r>
+                      <a:endParaRPr lang="en-US" sz="1800" b="1" i="0" u="none" strike="noStrike">
                         <a:solidFill>
                           <a:srgbClr val="000000"/>
                         </a:solidFill>
@@ -8348,7 +8058,13 @@
                     <a:lstStyle/>
                     <a:p>
                       <a:pPr algn="l" fontAlgn="b"/>
-                      <a:endParaRPr lang="en-US" sz="3200" b="0" i="0" u="none" strike="noStrike" dirty="0">
+                      <a:r>
+                        <a:rPr lang="en-US" sz="1800" u="none" strike="noStrike">
+                          <a:effectLst/>
+                        </a:rPr>
+                        <a:t>accuracy</a:t>
+                      </a:r>
+                      <a:endParaRPr lang="en-US" sz="1800" b="1" i="0" u="none" strike="noStrike">
                         <a:solidFill>
                           <a:srgbClr val="000000"/>
                         </a:solidFill>
@@ -8361,11 +8077,469 @@
                 </a:tc>
                 <a:extLst>
                   <a:ext uri="{0D108BD9-81ED-4DB2-BD59-A6C34878D82A}">
-                    <a16:rowId xmlns:a16="http://schemas.microsoft.com/office/drawing/2014/main" val="386324510"/>
+                    <a16:rowId xmlns:a16="http://schemas.microsoft.com/office/drawing/2014/main" val="119282249"/>
                   </a:ext>
                 </a:extLst>
               </a:tr>
-              <a:tr h="429300">
+              <a:tr h="335628">
+                <a:tc>
+                  <a:txBody>
+                    <a:bodyPr/>
+                    <a:lstStyle/>
+                    <a:p>
+                      <a:pPr algn="l" fontAlgn="b"/>
+                      <a:r>
+                        <a:rPr lang="en-US" sz="1800" u="none" strike="noStrike">
+                          <a:effectLst/>
+                        </a:rPr>
+                        <a:t>BERT</a:t>
+                      </a:r>
+                      <a:endParaRPr lang="en-US" sz="1800" b="0" i="0" u="none" strike="noStrike">
+                        <a:solidFill>
+                          <a:srgbClr val="000000"/>
+                        </a:solidFill>
+                        <a:effectLst/>
+                        <a:latin typeface="Calibri" panose="020F0502020204030204" pitchFamily="34" charset="0"/>
+                      </a:endParaRPr>
+                    </a:p>
+                  </a:txBody>
+                  <a:tcPr marL="7620" marR="7620" marT="7620" marB="0" anchor="b"/>
+                </a:tc>
+                <a:tc>
+                  <a:txBody>
+                    <a:bodyPr/>
+                    <a:lstStyle/>
+                    <a:p>
+                      <a:pPr algn="r" fontAlgn="b"/>
+                      <a:r>
+                        <a:rPr lang="en-US" sz="1800" u="none" strike="noStrike">
+                          <a:effectLst/>
+                        </a:rPr>
+                        <a:t>0.953135</a:t>
+                      </a:r>
+                      <a:endParaRPr lang="en-US" sz="1800" b="0" i="0" u="none" strike="noStrike">
+                        <a:solidFill>
+                          <a:srgbClr val="000000"/>
+                        </a:solidFill>
+                        <a:effectLst/>
+                        <a:latin typeface="Calibri" panose="020F0502020204030204" pitchFamily="34" charset="0"/>
+                      </a:endParaRPr>
+                    </a:p>
+                  </a:txBody>
+                  <a:tcPr marL="7620" marR="7620" marT="7620" marB="0" anchor="b"/>
+                </a:tc>
+                <a:tc>
+                  <a:txBody>
+                    <a:bodyPr/>
+                    <a:lstStyle/>
+                    <a:p>
+                      <a:pPr algn="r" fontAlgn="b"/>
+                      <a:r>
+                        <a:rPr lang="en-US" sz="1800" u="none" strike="noStrike">
+                          <a:effectLst/>
+                        </a:rPr>
+                        <a:t>0.952023</a:t>
+                      </a:r>
+                      <a:endParaRPr lang="en-US" sz="1800" b="0" i="0" u="none" strike="noStrike">
+                        <a:solidFill>
+                          <a:srgbClr val="000000"/>
+                        </a:solidFill>
+                        <a:effectLst/>
+                        <a:latin typeface="Calibri" panose="020F0502020204030204" pitchFamily="34" charset="0"/>
+                      </a:endParaRPr>
+                    </a:p>
+                  </a:txBody>
+                  <a:tcPr marL="7620" marR="7620" marT="7620" marB="0" anchor="b"/>
+                </a:tc>
+                <a:tc>
+                  <a:txBody>
+                    <a:bodyPr/>
+                    <a:lstStyle/>
+                    <a:p>
+                      <a:pPr algn="r" fontAlgn="b"/>
+                      <a:r>
+                        <a:rPr lang="en-US" sz="1800" u="none" strike="noStrike">
+                          <a:effectLst/>
+                        </a:rPr>
+                        <a:t>0.898755</a:t>
+                      </a:r>
+                      <a:endParaRPr lang="en-US" sz="1800" b="0" i="0" u="none" strike="noStrike">
+                        <a:solidFill>
+                          <a:srgbClr val="000000"/>
+                        </a:solidFill>
+                        <a:effectLst/>
+                        <a:latin typeface="Calibri" panose="020F0502020204030204" pitchFamily="34" charset="0"/>
+                      </a:endParaRPr>
+                    </a:p>
+                  </a:txBody>
+                  <a:tcPr marL="7620" marR="7620" marT="7620" marB="0" anchor="b"/>
+                </a:tc>
+                <a:tc>
+                  <a:txBody>
+                    <a:bodyPr/>
+                    <a:lstStyle/>
+                    <a:p>
+                      <a:pPr algn="r" fontAlgn="b"/>
+                      <a:r>
+                        <a:rPr lang="en-US" sz="1800" u="none" strike="noStrike">
+                          <a:effectLst/>
+                        </a:rPr>
+                        <a:t>0.952023</a:t>
+                      </a:r>
+                      <a:endParaRPr lang="en-US" sz="1800" b="0" i="0" u="none" strike="noStrike">
+                        <a:solidFill>
+                          <a:srgbClr val="000000"/>
+                        </a:solidFill>
+                        <a:effectLst/>
+                        <a:latin typeface="Calibri" panose="020F0502020204030204" pitchFamily="34" charset="0"/>
+                      </a:endParaRPr>
+                    </a:p>
+                  </a:txBody>
+                  <a:tcPr marL="7620" marR="7620" marT="7620" marB="0" anchor="b"/>
+                </a:tc>
+                <a:extLst>
+                  <a:ext uri="{0D108BD9-81ED-4DB2-BD59-A6C34878D82A}">
+                    <a16:rowId xmlns:a16="http://schemas.microsoft.com/office/drawing/2014/main" val="874481480"/>
+                  </a:ext>
+                </a:extLst>
+              </a:tr>
+              <a:tr h="335628">
+                <a:tc>
+                  <a:txBody>
+                    <a:bodyPr/>
+                    <a:lstStyle/>
+                    <a:p>
+                      <a:pPr algn="l" fontAlgn="b"/>
+                      <a:r>
+                        <a:rPr lang="en-US" sz="1800" u="none" strike="noStrike">
+                          <a:effectLst/>
+                        </a:rPr>
+                        <a:t>DIET</a:t>
+                      </a:r>
+                      <a:endParaRPr lang="en-US" sz="1800" b="0" i="0" u="none" strike="noStrike">
+                        <a:solidFill>
+                          <a:srgbClr val="000000"/>
+                        </a:solidFill>
+                        <a:effectLst/>
+                        <a:latin typeface="Calibri" panose="020F0502020204030204" pitchFamily="34" charset="0"/>
+                      </a:endParaRPr>
+                    </a:p>
+                  </a:txBody>
+                  <a:tcPr marL="7620" marR="7620" marT="7620" marB="0" anchor="b"/>
+                </a:tc>
+                <a:tc>
+                  <a:txBody>
+                    <a:bodyPr/>
+                    <a:lstStyle/>
+                    <a:p>
+                      <a:pPr algn="r" fontAlgn="b"/>
+                      <a:r>
+                        <a:rPr lang="en-US" sz="1800" u="none" strike="noStrike">
+                          <a:effectLst/>
+                        </a:rPr>
+                        <a:t>0.941358</a:t>
+                      </a:r>
+                      <a:endParaRPr lang="en-US" sz="1800" b="0" i="0" u="none" strike="noStrike">
+                        <a:solidFill>
+                          <a:srgbClr val="000000"/>
+                        </a:solidFill>
+                        <a:effectLst/>
+                        <a:latin typeface="Calibri" panose="020F0502020204030204" pitchFamily="34" charset="0"/>
+                      </a:endParaRPr>
+                    </a:p>
+                  </a:txBody>
+                  <a:tcPr marL="7620" marR="7620" marT="7620" marB="0" anchor="b"/>
+                </a:tc>
+                <a:tc>
+                  <a:txBody>
+                    <a:bodyPr/>
+                    <a:lstStyle/>
+                    <a:p>
+                      <a:pPr algn="r" fontAlgn="b"/>
+                      <a:r>
+                        <a:rPr lang="en-US" sz="1800" u="none" strike="noStrike">
+                          <a:effectLst/>
+                        </a:rPr>
+                        <a:t>0.937397</a:t>
+                      </a:r>
+                      <a:endParaRPr lang="en-US" sz="1800" b="0" i="0" u="none" strike="noStrike">
+                        <a:solidFill>
+                          <a:srgbClr val="000000"/>
+                        </a:solidFill>
+                        <a:effectLst/>
+                        <a:latin typeface="Calibri" panose="020F0502020204030204" pitchFamily="34" charset="0"/>
+                      </a:endParaRPr>
+                    </a:p>
+                  </a:txBody>
+                  <a:tcPr marL="7620" marR="7620" marT="7620" marB="0" anchor="b"/>
+                </a:tc>
+                <a:tc>
+                  <a:txBody>
+                    <a:bodyPr/>
+                    <a:lstStyle/>
+                    <a:p>
+                      <a:pPr algn="r" fontAlgn="b"/>
+                      <a:r>
+                        <a:rPr lang="en-US" sz="1800" u="none" strike="noStrike">
+                          <a:effectLst/>
+                        </a:rPr>
+                        <a:t>0.936648</a:t>
+                      </a:r>
+                      <a:endParaRPr lang="en-US" sz="1800" b="0" i="0" u="none" strike="noStrike">
+                        <a:solidFill>
+                          <a:srgbClr val="000000"/>
+                        </a:solidFill>
+                        <a:effectLst/>
+                        <a:latin typeface="Calibri" panose="020F0502020204030204" pitchFamily="34" charset="0"/>
+                      </a:endParaRPr>
+                    </a:p>
+                  </a:txBody>
+                  <a:tcPr marL="7620" marR="7620" marT="7620" marB="0" anchor="b"/>
+                </a:tc>
+                <a:tc>
+                  <a:txBody>
+                    <a:bodyPr/>
+                    <a:lstStyle/>
+                    <a:p>
+                      <a:pPr algn="r" fontAlgn="b"/>
+                      <a:r>
+                        <a:rPr lang="en-US" sz="1800" u="none" strike="noStrike">
+                          <a:effectLst/>
+                        </a:rPr>
+                        <a:t>0.937397</a:t>
+                      </a:r>
+                      <a:endParaRPr lang="en-US" sz="1800" b="0" i="0" u="none" strike="noStrike">
+                        <a:solidFill>
+                          <a:srgbClr val="000000"/>
+                        </a:solidFill>
+                        <a:effectLst/>
+                        <a:latin typeface="Calibri" panose="020F0502020204030204" pitchFamily="34" charset="0"/>
+                      </a:endParaRPr>
+                    </a:p>
+                  </a:txBody>
+                  <a:tcPr marL="7620" marR="7620" marT="7620" marB="0" anchor="b"/>
+                </a:tc>
+                <a:extLst>
+                  <a:ext uri="{0D108BD9-81ED-4DB2-BD59-A6C34878D82A}">
+                    <a16:rowId xmlns:a16="http://schemas.microsoft.com/office/drawing/2014/main" val="2769722239"/>
+                  </a:ext>
+                </a:extLst>
+              </a:tr>
+              <a:tr h="335628">
+                <a:tc>
+                  <a:txBody>
+                    <a:bodyPr/>
+                    <a:lstStyle/>
+                    <a:p>
+                      <a:pPr algn="l" fontAlgn="b"/>
+                      <a:r>
+                        <a:rPr lang="en-US" sz="1800" u="none" strike="noStrike">
+                          <a:effectLst/>
+                        </a:rPr>
+                        <a:t>DIET (w/ Language Model)</a:t>
+                      </a:r>
+                      <a:endParaRPr lang="en-US" sz="1800" b="0" i="0" u="none" strike="noStrike">
+                        <a:solidFill>
+                          <a:srgbClr val="000000"/>
+                        </a:solidFill>
+                        <a:effectLst/>
+                        <a:latin typeface="Calibri" panose="020F0502020204030204" pitchFamily="34" charset="0"/>
+                      </a:endParaRPr>
+                    </a:p>
+                  </a:txBody>
+                  <a:tcPr marL="7620" marR="7620" marT="7620" marB="0" anchor="b"/>
+                </a:tc>
+                <a:tc>
+                  <a:txBody>
+                    <a:bodyPr/>
+                    <a:lstStyle/>
+                    <a:p>
+                      <a:pPr algn="r" fontAlgn="b"/>
+                      <a:r>
+                        <a:rPr lang="en-US" sz="1800" u="none" strike="noStrike">
+                          <a:effectLst/>
+                        </a:rPr>
+                        <a:t>0.947146</a:t>
+                      </a:r>
+                      <a:endParaRPr lang="en-US" sz="1800" b="0" i="0" u="none" strike="noStrike">
+                        <a:solidFill>
+                          <a:srgbClr val="000000"/>
+                        </a:solidFill>
+                        <a:effectLst/>
+                        <a:latin typeface="Calibri" panose="020F0502020204030204" pitchFamily="34" charset="0"/>
+                      </a:endParaRPr>
+                    </a:p>
+                  </a:txBody>
+                  <a:tcPr marL="7620" marR="7620" marT="7620" marB="0" anchor="b"/>
+                </a:tc>
+                <a:tc>
+                  <a:txBody>
+                    <a:bodyPr/>
+                    <a:lstStyle/>
+                    <a:p>
+                      <a:pPr algn="r" fontAlgn="b"/>
+                      <a:r>
+                        <a:rPr lang="en-US" sz="1800" u="none" strike="noStrike">
+                          <a:effectLst/>
+                        </a:rPr>
+                        <a:t>0.944301</a:t>
+                      </a:r>
+                      <a:endParaRPr lang="en-US" sz="1800" b="0" i="0" u="none" strike="noStrike">
+                        <a:solidFill>
+                          <a:srgbClr val="000000"/>
+                        </a:solidFill>
+                        <a:effectLst/>
+                        <a:latin typeface="Calibri" panose="020F0502020204030204" pitchFamily="34" charset="0"/>
+                      </a:endParaRPr>
+                    </a:p>
+                  </a:txBody>
+                  <a:tcPr marL="7620" marR="7620" marT="7620" marB="0" anchor="b"/>
+                </a:tc>
+                <a:tc>
+                  <a:txBody>
+                    <a:bodyPr/>
+                    <a:lstStyle/>
+                    <a:p>
+                      <a:pPr algn="r" fontAlgn="b"/>
+                      <a:r>
+                        <a:rPr lang="en-US" sz="1800" u="none" strike="noStrike">
+                          <a:effectLst/>
+                        </a:rPr>
+                        <a:t>0.943761</a:t>
+                      </a:r>
+                      <a:endParaRPr lang="en-US" sz="1800" b="0" i="0" u="none" strike="noStrike">
+                        <a:solidFill>
+                          <a:srgbClr val="000000"/>
+                        </a:solidFill>
+                        <a:effectLst/>
+                        <a:latin typeface="Calibri" panose="020F0502020204030204" pitchFamily="34" charset="0"/>
+                      </a:endParaRPr>
+                    </a:p>
+                  </a:txBody>
+                  <a:tcPr marL="7620" marR="7620" marT="7620" marB="0" anchor="b"/>
+                </a:tc>
+                <a:tc>
+                  <a:txBody>
+                    <a:bodyPr/>
+                    <a:lstStyle/>
+                    <a:p>
+                      <a:pPr algn="r" fontAlgn="b"/>
+                      <a:r>
+                        <a:rPr lang="en-US" sz="1800" u="none" strike="noStrike">
+                          <a:effectLst/>
+                        </a:rPr>
+                        <a:t>0.944301</a:t>
+                      </a:r>
+                      <a:endParaRPr lang="en-US" sz="1800" b="0" i="0" u="none" strike="noStrike">
+                        <a:solidFill>
+                          <a:srgbClr val="000000"/>
+                        </a:solidFill>
+                        <a:effectLst/>
+                        <a:latin typeface="Calibri" panose="020F0502020204030204" pitchFamily="34" charset="0"/>
+                      </a:endParaRPr>
+                    </a:p>
+                  </a:txBody>
+                  <a:tcPr marL="7620" marR="7620" marT="7620" marB="0" anchor="b"/>
+                </a:tc>
+                <a:extLst>
+                  <a:ext uri="{0D108BD9-81ED-4DB2-BD59-A6C34878D82A}">
+                    <a16:rowId xmlns:a16="http://schemas.microsoft.com/office/drawing/2014/main" val="3992919697"/>
+                  </a:ext>
+                </a:extLst>
+              </a:tr>
+              <a:tr h="335628">
+                <a:tc>
+                  <a:txBody>
+                    <a:bodyPr/>
+                    <a:lstStyle/>
+                    <a:p>
+                      <a:pPr algn="l" fontAlgn="b"/>
+                      <a:endParaRPr lang="en-US" sz="1800" b="0" i="0" u="none" strike="noStrike">
+                        <a:solidFill>
+                          <a:srgbClr val="000000"/>
+                        </a:solidFill>
+                        <a:effectLst/>
+                        <a:latin typeface="Calibri" panose="020F0502020204030204" pitchFamily="34" charset="0"/>
+                      </a:endParaRPr>
+                    </a:p>
+                  </a:txBody>
+                  <a:tcPr marL="7620" marR="7620" marT="7620" marB="0" anchor="b"/>
+                </a:tc>
+                <a:tc>
+                  <a:txBody>
+                    <a:bodyPr/>
+                    <a:lstStyle/>
+                    <a:p>
+                      <a:pPr algn="l" fontAlgn="b"/>
+                      <a:endParaRPr lang="en-US" sz="1800" b="0" i="0" u="none" strike="noStrike">
+                        <a:solidFill>
+                          <a:srgbClr val="000000"/>
+                        </a:solidFill>
+                        <a:effectLst/>
+                        <a:latin typeface="Calibri" panose="020F0502020204030204" pitchFamily="34" charset="0"/>
+                      </a:endParaRPr>
+                    </a:p>
+                  </a:txBody>
+                  <a:tcPr marL="7620" marR="7620" marT="7620" marB="0" anchor="b"/>
+                </a:tc>
+                <a:tc>
+                  <a:txBody>
+                    <a:bodyPr/>
+                    <a:lstStyle/>
+                    <a:p>
+                      <a:pPr algn="l" fontAlgn="b"/>
+                      <a:endParaRPr lang="en-US" sz="1800" b="0" i="0" u="none" strike="noStrike">
+                        <a:solidFill>
+                          <a:srgbClr val="000000"/>
+                        </a:solidFill>
+                        <a:effectLst/>
+                        <a:latin typeface="Calibri" panose="020F0502020204030204" pitchFamily="34" charset="0"/>
+                      </a:endParaRPr>
+                    </a:p>
+                  </a:txBody>
+                  <a:tcPr marL="7620" marR="7620" marT="7620" marB="0" anchor="b"/>
+                </a:tc>
+                <a:tc>
+                  <a:txBody>
+                    <a:bodyPr/>
+                    <a:lstStyle/>
+                    <a:p>
+                      <a:pPr algn="l" fontAlgn="b"/>
+                      <a:endParaRPr lang="en-US" sz="1800" b="0" i="0" u="none" strike="noStrike">
+                        <a:solidFill>
+                          <a:srgbClr val="000000"/>
+                        </a:solidFill>
+                        <a:effectLst/>
+                        <a:latin typeface="Calibri" panose="020F0502020204030204" pitchFamily="34" charset="0"/>
+                      </a:endParaRPr>
+                    </a:p>
+                  </a:txBody>
+                  <a:tcPr marL="7620" marR="7620" marT="7620" marB="0" anchor="b"/>
+                </a:tc>
+                <a:tc>
+                  <a:txBody>
+                    <a:bodyPr/>
+                    <a:lstStyle/>
+                    <a:p>
+                      <a:pPr algn="l" fontAlgn="b"/>
+                      <a:endParaRPr lang="en-US" sz="1800" b="0" i="0" u="none" strike="noStrike">
+                        <a:solidFill>
+                          <a:srgbClr val="000000"/>
+                        </a:solidFill>
+                        <a:effectLst/>
+                        <a:latin typeface="Calibri" panose="020F0502020204030204" pitchFamily="34" charset="0"/>
+                      </a:endParaRPr>
+                    </a:p>
+                  </a:txBody>
+                  <a:tcPr marL="7620" marR="7620" marT="7620" marB="0" anchor="b"/>
+                </a:tc>
+                <a:extLst>
+                  <a:ext uri="{0D108BD9-81ED-4DB2-BD59-A6C34878D82A}">
+                    <a16:rowId xmlns:a16="http://schemas.microsoft.com/office/drawing/2014/main" val="1216324269"/>
+                  </a:ext>
+                </a:extLst>
+              </a:tr>
+              <a:tr h="335628">
                 <a:tc gridSpan="5">
                   <a:txBody>
                     <a:bodyPr/>
@@ -8373,12 +8547,12 @@
                     <a:p>
                       <a:pPr algn="ctr" fontAlgn="b"/>
                       <a:r>
-                        <a:rPr lang="en-US" sz="3200" b="1" u="none" strike="noStrike" dirty="0">
+                        <a:rPr lang="en-US" sz="1800" u="none" strike="noStrike">
                           <a:effectLst/>
                         </a:rPr>
-                        <a:t>Task: NER</a:t>
+                        <a:t>NER</a:t>
                       </a:r>
-                      <a:endParaRPr lang="en-US" sz="3200" b="1" i="0" u="none" strike="noStrike" dirty="0">
+                      <a:endParaRPr lang="en-US" sz="1800" b="1" i="0" u="none" strike="noStrike">
                         <a:solidFill>
                           <a:srgbClr val="000000"/>
                         </a:solidFill>
@@ -8431,24 +8605,24 @@
                 </a:tc>
                 <a:extLst>
                   <a:ext uri="{0D108BD9-81ED-4DB2-BD59-A6C34878D82A}">
-                    <a16:rowId xmlns:a16="http://schemas.microsoft.com/office/drawing/2014/main" val="1000205364"/>
+                    <a16:rowId xmlns:a16="http://schemas.microsoft.com/office/drawing/2014/main" val="20710756"/>
                   </a:ext>
                 </a:extLst>
               </a:tr>
-              <a:tr h="429300">
+              <a:tr h="335628">
                 <a:tc>
                   <a:txBody>
                     <a:bodyPr/>
                     <a:lstStyle/>
                     <a:p>
-                      <a:pPr algn="ctr" fontAlgn="b"/>
+                      <a:pPr algn="l" fontAlgn="b"/>
                       <a:r>
-                        <a:rPr lang="en-US" sz="3200" u="none" strike="noStrike" dirty="0">
+                        <a:rPr lang="en-US" sz="1800" u="none" strike="noStrike">
                           <a:effectLst/>
                         </a:rPr>
                         <a:t>Model</a:t>
                       </a:r>
-                      <a:endParaRPr lang="en-US" sz="3200" b="1" i="0" u="none" strike="noStrike" dirty="0">
+                      <a:endParaRPr lang="en-US" sz="1800" b="1" i="0" u="none" strike="noStrike">
                         <a:solidFill>
                           <a:srgbClr val="000000"/>
                         </a:solidFill>
@@ -8464,14 +8638,14 @@
                     <a:bodyPr/>
                     <a:lstStyle/>
                     <a:p>
-                      <a:pPr algn="ctr" fontAlgn="b"/>
+                      <a:pPr algn="l" fontAlgn="b"/>
                       <a:r>
-                        <a:rPr lang="en-US" sz="3200" u="none" strike="noStrike" dirty="0">
+                        <a:rPr lang="en-US" sz="1800" u="none" strike="noStrike">
                           <a:effectLst/>
                         </a:rPr>
-                        <a:t>Precision</a:t>
+                        <a:t>precision</a:t>
                       </a:r>
-                      <a:endParaRPr lang="en-US" sz="3200" b="1" i="0" u="none" strike="noStrike" dirty="0">
+                      <a:endParaRPr lang="en-US" sz="1800" b="1" i="0" u="none" strike="noStrike">
                         <a:solidFill>
                           <a:srgbClr val="000000"/>
                         </a:solidFill>
@@ -8487,14 +8661,14 @@
                     <a:bodyPr/>
                     <a:lstStyle/>
                     <a:p>
-                      <a:pPr algn="ctr" fontAlgn="b"/>
+                      <a:pPr algn="l" fontAlgn="b"/>
                       <a:r>
-                        <a:rPr lang="en-US" sz="3200" u="none" strike="noStrike" dirty="0">
+                        <a:rPr lang="en-US" sz="1800" u="none" strike="noStrike">
                           <a:effectLst/>
                         </a:rPr>
-                        <a:t>Recall</a:t>
+                        <a:t>recall</a:t>
                       </a:r>
-                      <a:endParaRPr lang="en-US" sz="3200" b="1" i="0" u="none" strike="noStrike" dirty="0">
+                      <a:endParaRPr lang="en-US" sz="1800" b="1" i="0" u="none" strike="noStrike">
                         <a:solidFill>
                           <a:srgbClr val="000000"/>
                         </a:solidFill>
@@ -8510,14 +8684,14 @@
                     <a:bodyPr/>
                     <a:lstStyle/>
                     <a:p>
-                      <a:pPr algn="ctr" fontAlgn="b"/>
+                      <a:pPr algn="l" fontAlgn="b"/>
                       <a:r>
-                        <a:rPr lang="en-US" sz="3200" u="none" strike="noStrike" dirty="0">
+                        <a:rPr lang="en-US" sz="1800" u="none" strike="noStrike">
                           <a:effectLst/>
                         </a:rPr>
-                        <a:t>F1-Score</a:t>
+                        <a:t>f1-score</a:t>
                       </a:r>
-                      <a:endParaRPr lang="en-US" sz="3200" b="1" i="0" u="none" strike="noStrike" dirty="0">
+                      <a:endParaRPr lang="en-US" sz="1800" b="1" i="0" u="none" strike="noStrike">
                         <a:solidFill>
                           <a:srgbClr val="000000"/>
                         </a:solidFill>
@@ -8533,14 +8707,14 @@
                     <a:bodyPr/>
                     <a:lstStyle/>
                     <a:p>
-                      <a:pPr algn="ctr" fontAlgn="b"/>
+                      <a:pPr algn="l" fontAlgn="b"/>
                       <a:r>
-                        <a:rPr lang="en-US" sz="3200" u="none" strike="noStrike" dirty="0">
+                        <a:rPr lang="en-US" sz="1800" u="none" strike="noStrike">
                           <a:effectLst/>
                         </a:rPr>
-                        <a:t>Accuracy</a:t>
+                        <a:t>accuracy</a:t>
                       </a:r>
-                      <a:endParaRPr lang="en-US" sz="3200" b="1" i="0" u="none" strike="noStrike" dirty="0">
+                      <a:endParaRPr lang="en-US" sz="1800" b="1" i="0" u="none" strike="noStrike">
                         <a:solidFill>
                           <a:srgbClr val="000000"/>
                         </a:solidFill>
@@ -8553,24 +8727,24 @@
                 </a:tc>
                 <a:extLst>
                   <a:ext uri="{0D108BD9-81ED-4DB2-BD59-A6C34878D82A}">
-                    <a16:rowId xmlns:a16="http://schemas.microsoft.com/office/drawing/2014/main" val="2581081850"/>
+                    <a16:rowId xmlns:a16="http://schemas.microsoft.com/office/drawing/2014/main" val="2620985502"/>
                   </a:ext>
                 </a:extLst>
               </a:tr>
-              <a:tr h="429300">
+              <a:tr h="335628">
                 <a:tc>
                   <a:txBody>
                     <a:bodyPr/>
                     <a:lstStyle/>
                     <a:p>
-                      <a:pPr algn="ctr" fontAlgn="b"/>
+                      <a:pPr algn="l" fontAlgn="b"/>
                       <a:r>
-                        <a:rPr lang="en-US" sz="3200" u="none" strike="noStrike" dirty="0">
+                        <a:rPr lang="en-US" sz="1800" u="none" strike="noStrike">
                           <a:effectLst/>
                         </a:rPr>
                         <a:t>BERT</a:t>
                       </a:r>
-                      <a:endParaRPr lang="en-US" sz="3200" b="0" i="0" u="none" strike="noStrike" dirty="0">
+                      <a:endParaRPr lang="en-US" sz="1800" b="0" i="0" u="none" strike="noStrike">
                         <a:solidFill>
                           <a:srgbClr val="000000"/>
                         </a:solidFill>
@@ -8586,14 +8760,14 @@
                     <a:bodyPr/>
                     <a:lstStyle/>
                     <a:p>
-                      <a:pPr algn="ctr" fontAlgn="b"/>
+                      <a:pPr algn="r" fontAlgn="b"/>
                       <a:r>
-                        <a:rPr lang="en-US" sz="3200" u="none" strike="noStrike" dirty="0">
+                        <a:rPr lang="en-US" sz="1800" u="none" strike="noStrike">
                           <a:effectLst/>
                         </a:rPr>
                         <a:t>0.947154</a:t>
                       </a:r>
-                      <a:endParaRPr lang="en-US" sz="3200" b="0" i="0" u="none" strike="noStrike" dirty="0">
+                      <a:endParaRPr lang="en-US" sz="1800" b="0" i="0" u="none" strike="noStrike">
                         <a:solidFill>
                           <a:srgbClr val="000000"/>
                         </a:solidFill>
@@ -8609,14 +8783,14 @@
                     <a:bodyPr/>
                     <a:lstStyle/>
                     <a:p>
-                      <a:pPr algn="ctr" fontAlgn="b"/>
+                      <a:pPr algn="r" fontAlgn="b"/>
                       <a:r>
-                        <a:rPr lang="en-US" sz="3200" u="none" strike="noStrike">
+                        <a:rPr lang="en-US" sz="1800" u="none" strike="noStrike">
                           <a:effectLst/>
                         </a:rPr>
                         <a:t>0.955963</a:t>
                       </a:r>
-                      <a:endParaRPr lang="en-US" sz="3200" b="0" i="0" u="none" strike="noStrike">
+                      <a:endParaRPr lang="en-US" sz="1800" b="0" i="0" u="none" strike="noStrike">
                         <a:solidFill>
                           <a:srgbClr val="000000"/>
                         </a:solidFill>
@@ -8632,14 +8806,14 @@
                     <a:bodyPr/>
                     <a:lstStyle/>
                     <a:p>
-                      <a:pPr algn="ctr" fontAlgn="b"/>
+                      <a:pPr algn="r" fontAlgn="b"/>
                       <a:r>
-                        <a:rPr lang="en-US" sz="3200" u="none" strike="noStrike">
+                        <a:rPr lang="en-US" sz="1800" u="none" strike="noStrike">
                           <a:effectLst/>
                         </a:rPr>
                         <a:t>0.951536</a:t>
                       </a:r>
-                      <a:endParaRPr lang="en-US" sz="3200" b="0" i="0" u="none" strike="noStrike">
+                      <a:endParaRPr lang="en-US" sz="1800" b="0" i="0" u="none" strike="noStrike">
                         <a:solidFill>
                           <a:srgbClr val="000000"/>
                         </a:solidFill>
@@ -8655,14 +8829,14 @@
                     <a:bodyPr/>
                     <a:lstStyle/>
                     <a:p>
-                      <a:pPr algn="ctr" fontAlgn="b"/>
+                      <a:pPr algn="r" fontAlgn="b"/>
                       <a:r>
-                        <a:rPr lang="en-US" sz="3200" u="none" strike="noStrike" dirty="0">
+                        <a:rPr lang="en-US" sz="1800" u="none" strike="noStrike">
                           <a:effectLst/>
                         </a:rPr>
                         <a:t>0.975778</a:t>
                       </a:r>
-                      <a:endParaRPr lang="en-US" sz="3200" b="0" i="0" u="none" strike="noStrike" dirty="0">
+                      <a:endParaRPr lang="en-US" sz="1800" b="0" i="0" u="none" strike="noStrike">
                         <a:solidFill>
                           <a:srgbClr val="000000"/>
                         </a:solidFill>
@@ -8675,24 +8849,24 @@
                 </a:tc>
                 <a:extLst>
                   <a:ext uri="{0D108BD9-81ED-4DB2-BD59-A6C34878D82A}">
-                    <a16:rowId xmlns:a16="http://schemas.microsoft.com/office/drawing/2014/main" val="375534283"/>
+                    <a16:rowId xmlns:a16="http://schemas.microsoft.com/office/drawing/2014/main" val="1629791484"/>
                   </a:ext>
                 </a:extLst>
               </a:tr>
-              <a:tr h="429300">
+              <a:tr h="335628">
                 <a:tc>
                   <a:txBody>
                     <a:bodyPr/>
                     <a:lstStyle/>
                     <a:p>
-                      <a:pPr algn="ctr" fontAlgn="b"/>
+                      <a:pPr algn="l" fontAlgn="b"/>
                       <a:r>
-                        <a:rPr lang="en-US" sz="3200" u="none" strike="noStrike" dirty="0">
+                        <a:rPr lang="en-US" sz="1800" u="none" strike="noStrike">
                           <a:effectLst/>
                         </a:rPr>
                         <a:t>DIET</a:t>
                       </a:r>
-                      <a:endParaRPr lang="en-US" sz="3200" b="0" i="0" u="none" strike="noStrike" dirty="0">
+                      <a:endParaRPr lang="en-US" sz="1800" b="0" i="0" u="none" strike="noStrike">
                         <a:solidFill>
                           <a:srgbClr val="000000"/>
                         </a:solidFill>
@@ -8708,14 +8882,14 @@
                     <a:bodyPr/>
                     <a:lstStyle/>
                     <a:p>
-                      <a:pPr algn="ctr" fontAlgn="b"/>
+                      <a:pPr algn="r" fontAlgn="b"/>
                       <a:r>
-                        <a:rPr lang="en-US" sz="3200" u="none" strike="noStrike">
+                        <a:rPr lang="en-US" sz="1800" u="none" strike="noStrike">
                           <a:effectLst/>
                         </a:rPr>
                         <a:t>0.741434</a:t>
                       </a:r>
-                      <a:endParaRPr lang="en-US" sz="3200" b="0" i="0" u="none" strike="noStrike">
+                      <a:endParaRPr lang="en-US" sz="1800" b="0" i="0" u="none" strike="noStrike">
                         <a:solidFill>
                           <a:srgbClr val="000000"/>
                         </a:solidFill>
@@ -8731,14 +8905,14 @@
                     <a:bodyPr/>
                     <a:lstStyle/>
                     <a:p>
-                      <a:pPr algn="ctr" fontAlgn="b"/>
+                      <a:pPr algn="r" fontAlgn="b"/>
                       <a:r>
-                        <a:rPr lang="en-US" sz="3200" u="none" strike="noStrike" dirty="0">
+                        <a:rPr lang="en-US" sz="1800" u="none" strike="noStrike">
                           <a:effectLst/>
                         </a:rPr>
                         <a:t>0.819272</a:t>
                       </a:r>
-                      <a:endParaRPr lang="en-US" sz="3200" b="0" i="0" u="none" strike="noStrike" dirty="0">
+                      <a:endParaRPr lang="en-US" sz="1800" b="0" i="0" u="none" strike="noStrike">
                         <a:solidFill>
                           <a:srgbClr val="000000"/>
                         </a:solidFill>
@@ -8754,14 +8928,14 @@
                     <a:bodyPr/>
                     <a:lstStyle/>
                     <a:p>
-                      <a:pPr algn="ctr" fontAlgn="b"/>
+                      <a:pPr algn="r" fontAlgn="b"/>
                       <a:r>
-                        <a:rPr lang="en-US" sz="3200" u="none" strike="noStrike" dirty="0">
+                        <a:rPr lang="en-US" sz="1800" u="none" strike="noStrike">
                           <a:effectLst/>
                         </a:rPr>
                         <a:t>0.777427</a:t>
                       </a:r>
-                      <a:endParaRPr lang="en-US" sz="3200" b="0" i="0" u="none" strike="noStrike" dirty="0">
+                      <a:endParaRPr lang="en-US" sz="1800" b="0" i="0" u="none" strike="noStrike">
                         <a:solidFill>
                           <a:srgbClr val="000000"/>
                         </a:solidFill>
@@ -8777,14 +8951,14 @@
                     <a:bodyPr/>
                     <a:lstStyle/>
                     <a:p>
-                      <a:pPr algn="ctr" fontAlgn="b"/>
+                      <a:pPr algn="r" fontAlgn="b"/>
                       <a:r>
-                        <a:rPr lang="en-US" sz="3200" u="none" strike="noStrike" dirty="0">
+                        <a:rPr lang="en-US" sz="1800" u="none" strike="noStrike">
                           <a:effectLst/>
                         </a:rPr>
                         <a:t>0.900818</a:t>
                       </a:r>
-                      <a:endParaRPr lang="en-US" sz="3200" b="0" i="0" u="none" strike="noStrike" dirty="0">
+                      <a:endParaRPr lang="en-US" sz="1800" b="0" i="0" u="none" strike="noStrike">
                         <a:solidFill>
                           <a:srgbClr val="000000"/>
                         </a:solidFill>
@@ -8797,7 +8971,129 @@
                 </a:tc>
                 <a:extLst>
                   <a:ext uri="{0D108BD9-81ED-4DB2-BD59-A6C34878D82A}">
-                    <a16:rowId xmlns:a16="http://schemas.microsoft.com/office/drawing/2014/main" val="548511896"/>
+                    <a16:rowId xmlns:a16="http://schemas.microsoft.com/office/drawing/2014/main" val="1297836245"/>
+                  </a:ext>
+                </a:extLst>
+              </a:tr>
+              <a:tr h="335628">
+                <a:tc>
+                  <a:txBody>
+                    <a:bodyPr/>
+                    <a:lstStyle/>
+                    <a:p>
+                      <a:pPr algn="l" fontAlgn="b"/>
+                      <a:r>
+                        <a:rPr lang="en-US" sz="1800" u="none" strike="noStrike">
+                          <a:effectLst/>
+                        </a:rPr>
+                        <a:t>DIET (w/ Language Model)</a:t>
+                      </a:r>
+                      <a:endParaRPr lang="en-US" sz="1800" b="0" i="0" u="none" strike="noStrike">
+                        <a:solidFill>
+                          <a:srgbClr val="000000"/>
+                        </a:solidFill>
+                        <a:effectLst/>
+                        <a:latin typeface="Calibri" panose="020F0502020204030204" pitchFamily="34" charset="0"/>
+                      </a:endParaRPr>
+                    </a:p>
+                  </a:txBody>
+                  <a:tcPr marL="7620" marR="7620" marT="7620" marB="0" anchor="b"/>
+                </a:tc>
+                <a:tc>
+                  <a:txBody>
+                    <a:bodyPr/>
+                    <a:lstStyle/>
+                    <a:p>
+                      <a:pPr algn="r" fontAlgn="b"/>
+                      <a:r>
+                        <a:rPr lang="en-US" sz="1800" u="none" strike="noStrike">
+                          <a:effectLst/>
+                        </a:rPr>
+                        <a:t>0.741452</a:t>
+                      </a:r>
+                      <a:endParaRPr lang="en-US" sz="1800" b="0" i="0" u="none" strike="noStrike">
+                        <a:solidFill>
+                          <a:srgbClr val="000000"/>
+                        </a:solidFill>
+                        <a:effectLst/>
+                        <a:latin typeface="Calibri" panose="020F0502020204030204" pitchFamily="34" charset="0"/>
+                      </a:endParaRPr>
+                    </a:p>
+                  </a:txBody>
+                  <a:tcPr marL="7620" marR="7620" marT="7620" marB="0" anchor="b"/>
+                </a:tc>
+                <a:tc>
+                  <a:txBody>
+                    <a:bodyPr/>
+                    <a:lstStyle/>
+                    <a:p>
+                      <a:pPr algn="r" fontAlgn="b"/>
+                      <a:r>
+                        <a:rPr lang="en-US" sz="1800" u="none" strike="noStrike">
+                          <a:effectLst/>
+                        </a:rPr>
+                        <a:t>0.823024</a:t>
+                      </a:r>
+                      <a:endParaRPr lang="en-US" sz="1800" b="0" i="0" u="none" strike="noStrike">
+                        <a:solidFill>
+                          <a:srgbClr val="000000"/>
+                        </a:solidFill>
+                        <a:effectLst/>
+                        <a:latin typeface="Calibri" panose="020F0502020204030204" pitchFamily="34" charset="0"/>
+                      </a:endParaRPr>
+                    </a:p>
+                  </a:txBody>
+                  <a:tcPr marL="7620" marR="7620" marT="7620" marB="0" anchor="b"/>
+                </a:tc>
+                <a:tc>
+                  <a:txBody>
+                    <a:bodyPr/>
+                    <a:lstStyle/>
+                    <a:p>
+                      <a:pPr algn="r" fontAlgn="b"/>
+                      <a:r>
+                        <a:rPr lang="en-US" sz="1800" u="none" strike="noStrike">
+                          <a:effectLst/>
+                        </a:rPr>
+                        <a:t>0.779096</a:t>
+                      </a:r>
+                      <a:endParaRPr lang="en-US" sz="1800" b="0" i="0" u="none" strike="noStrike">
+                        <a:solidFill>
+                          <a:srgbClr val="000000"/>
+                        </a:solidFill>
+                        <a:effectLst/>
+                        <a:latin typeface="Calibri" panose="020F0502020204030204" pitchFamily="34" charset="0"/>
+                      </a:endParaRPr>
+                    </a:p>
+                  </a:txBody>
+                  <a:tcPr marL="7620" marR="7620" marT="7620" marB="0" anchor="b"/>
+                </a:tc>
+                <a:tc>
+                  <a:txBody>
+                    <a:bodyPr/>
+                    <a:lstStyle/>
+                    <a:p>
+                      <a:pPr algn="r" fontAlgn="b"/>
+                      <a:r>
+                        <a:rPr lang="en-US" sz="1800" u="none" strike="noStrike" dirty="0">
+                          <a:effectLst/>
+                        </a:rPr>
+                        <a:t>0.902911</a:t>
+                      </a:r>
+                      <a:endParaRPr lang="en-US" sz="1800" b="0" i="0" u="none" strike="noStrike" dirty="0">
+                        <a:solidFill>
+                          <a:srgbClr val="000000"/>
+                        </a:solidFill>
+                        <a:effectLst/>
+                        <a:latin typeface="Calibri" panose="020F0502020204030204" pitchFamily="34" charset="0"/>
+                      </a:endParaRPr>
+                    </a:p>
+                  </a:txBody>
+                  <a:tcPr marL="7620" marR="7620" marT="7620" marB="0" anchor="b"/>
+                </a:tc>
+                <a:extLst>
+                  <a:ext uri="{0D108BD9-81ED-4DB2-BD59-A6C34878D82A}">
+                    <a16:rowId xmlns:a16="http://schemas.microsoft.com/office/drawing/2014/main" val="4098277427"/>
                   </a:ext>
                 </a:extLst>
               </a:tr>
@@ -8805,6 +9101,201 @@
           </a:graphicData>
         </a:graphic>
       </p:graphicFrame>
+      <p:sp>
+        <p:nvSpPr>
+          <p:cNvPr id="34" name="Text Box 6">
+            <a:extLst>
+              <a:ext uri="{FF2B5EF4-FFF2-40B4-BE49-F238E27FC236}">
+                <a16:creationId xmlns:a16="http://schemas.microsoft.com/office/drawing/2014/main" id="{5B71A6F8-BAB6-4AC8-8F0F-96029CE81E37}"/>
+              </a:ext>
+            </a:extLst>
+          </p:cNvPr>
+          <p:cNvSpPr txBox="1">
+            <a:spLocks noChangeArrowheads="1"/>
+          </p:cNvSpPr>
+          <p:nvPr/>
+        </p:nvSpPr>
+        <p:spPr bwMode="auto">
+          <a:xfrm>
+            <a:off x="22311359" y="29528260"/>
+            <a:ext cx="10058400" cy="1985159"/>
+          </a:xfrm>
+          <a:prstGeom prst="rect">
+            <a:avLst/>
+          </a:prstGeom>
+          <a:noFill/>
+          <a:ln>
+            <a:noFill/>
+          </a:ln>
+          <a:extLst>
+            <a:ext uri="{909E8E84-426E-40DD-AFC4-6F175D3DCCD1}">
+              <a14:hiddenFill xmlns:a14="http://schemas.microsoft.com/office/drawing/2010/main">
+                <a:solidFill>
+                  <a:schemeClr val="accent1"/>
+                </a:solidFill>
+              </a14:hiddenFill>
+            </a:ext>
+            <a:ext uri="{91240B29-F687-4F45-9708-019B960494DF}">
+              <a14:hiddenLine xmlns:a14="http://schemas.microsoft.com/office/drawing/2010/main" w="9525">
+                <a:solidFill>
+                  <a:schemeClr val="tx1"/>
+                </a:solidFill>
+                <a:miter lim="800000"/>
+                <a:headEnd/>
+                <a:tailEnd/>
+              </a14:hiddenLine>
+            </a:ext>
+            <a:ext uri="{AF507438-7753-43E0-B8FC-AC1667EBCBE1}">
+              <a14:hiddenEffects xmlns:a14="http://schemas.microsoft.com/office/drawing/2010/main">
+                <a:effectLst>
+                  <a:outerShdw dist="35921" dir="2700000" algn="ctr" rotWithShape="0">
+                    <a:schemeClr val="bg2"/>
+                  </a:outerShdw>
+                </a:effectLst>
+              </a14:hiddenEffects>
+            </a:ext>
+          </a:extLst>
+        </p:spPr>
+        <p:txBody>
+          <a:bodyPr lIns="137160" tIns="68580" rIns="137160" bIns="68580">
+            <a:spAutoFit/>
+          </a:bodyPr>
+          <a:lstStyle>
+            <a:defPPr>
+              <a:defRPr kern="1200" smtId="4294967295"/>
+            </a:defPPr>
+            <a:lvl1pPr defTabSz="4703763" eaLnBrk="0" hangingPunct="0">
+              <a:defRPr sz="9300">
+                <a:solidFill>
+                  <a:schemeClr val="tx1"/>
+                </a:solidFill>
+                <a:latin typeface="Arial"/>
+              </a:defRPr>
+            </a:lvl1pPr>
+            <a:lvl2pPr marL="742950" indent="-285750" defTabSz="4703763" eaLnBrk="0" hangingPunct="0">
+              <a:defRPr sz="9300">
+                <a:solidFill>
+                  <a:schemeClr val="tx1"/>
+                </a:solidFill>
+                <a:latin typeface="Arial"/>
+              </a:defRPr>
+            </a:lvl2pPr>
+            <a:lvl3pPr marL="1143000" indent="-228600" defTabSz="4703763" eaLnBrk="0" hangingPunct="0">
+              <a:defRPr sz="9300">
+                <a:solidFill>
+                  <a:schemeClr val="tx1"/>
+                </a:solidFill>
+                <a:latin typeface="Arial"/>
+              </a:defRPr>
+            </a:lvl3pPr>
+            <a:lvl4pPr marL="1600200" indent="-228600" defTabSz="4703763" eaLnBrk="0" hangingPunct="0">
+              <a:defRPr sz="9300">
+                <a:solidFill>
+                  <a:schemeClr val="tx1"/>
+                </a:solidFill>
+                <a:latin typeface="Arial"/>
+              </a:defRPr>
+            </a:lvl4pPr>
+            <a:lvl5pPr marL="2057400" indent="-228600" defTabSz="4703763" eaLnBrk="0" hangingPunct="0">
+              <a:defRPr sz="9300">
+                <a:solidFill>
+                  <a:schemeClr val="tx1"/>
+                </a:solidFill>
+                <a:latin typeface="Arial"/>
+              </a:defRPr>
+            </a:lvl5pPr>
+            <a:lvl6pPr marL="2514600" indent="-228600" defTabSz="4703763" eaLnBrk="0" fontAlgn="base" hangingPunct="0">
+              <a:spcBef>
+                <a:spcPct val="0"/>
+              </a:spcBef>
+              <a:spcAft>
+                <a:spcPct val="0"/>
+              </a:spcAft>
+              <a:defRPr sz="9300">
+                <a:solidFill>
+                  <a:schemeClr val="tx1"/>
+                </a:solidFill>
+                <a:latin typeface="Arial"/>
+              </a:defRPr>
+            </a:lvl6pPr>
+            <a:lvl7pPr marL="2971800" indent="-228600" defTabSz="4703763" eaLnBrk="0" fontAlgn="base" hangingPunct="0">
+              <a:spcBef>
+                <a:spcPct val="0"/>
+              </a:spcBef>
+              <a:spcAft>
+                <a:spcPct val="0"/>
+              </a:spcAft>
+              <a:defRPr sz="9300">
+                <a:solidFill>
+                  <a:schemeClr val="tx1"/>
+                </a:solidFill>
+                <a:latin typeface="Arial"/>
+              </a:defRPr>
+            </a:lvl7pPr>
+            <a:lvl8pPr marL="3429000" indent="-228600" defTabSz="4703763" eaLnBrk="0" fontAlgn="base" hangingPunct="0">
+              <a:spcBef>
+                <a:spcPct val="0"/>
+              </a:spcBef>
+              <a:spcAft>
+                <a:spcPct val="0"/>
+              </a:spcAft>
+              <a:defRPr sz="9300">
+                <a:solidFill>
+                  <a:schemeClr val="tx1"/>
+                </a:solidFill>
+                <a:latin typeface="Arial"/>
+              </a:defRPr>
+            </a:lvl8pPr>
+            <a:lvl9pPr marL="3886200" indent="-228600" defTabSz="4703763" eaLnBrk="0" fontAlgn="base" hangingPunct="0">
+              <a:spcBef>
+                <a:spcPct val="0"/>
+              </a:spcBef>
+              <a:spcAft>
+                <a:spcPct val="0"/>
+              </a:spcAft>
+              <a:defRPr sz="9300">
+                <a:solidFill>
+                  <a:schemeClr val="tx1"/>
+                </a:solidFill>
+                <a:latin typeface="Arial"/>
+              </a:defRPr>
+            </a:lvl9pPr>
+          </a:lstStyle>
+          <a:p>
+            <a:r>
+              <a:rPr lang="en-US" sz="2400" dirty="0">
+                <a:latin typeface="Titillium Web" panose="00000500000000000000" pitchFamily="2" charset="0"/>
+                <a:ea typeface="Open Sans" panose="020B0606030504020204" pitchFamily="34" charset="0"/>
+                <a:cs typeface="Open Sans" panose="020B0606030504020204" pitchFamily="34" charset="0"/>
+              </a:rPr>
+              <a:t>Model Size</a:t>
+            </a:r>
+          </a:p>
+          <a:p>
+            <a:r>
+              <a:rPr lang="en-US" sz="2400" dirty="0">
+                <a:latin typeface="Titillium Web" panose="00000500000000000000" pitchFamily="2" charset="0"/>
+                <a:ea typeface="Open Sans" panose="020B0606030504020204" pitchFamily="34" charset="0"/>
+                <a:cs typeface="Open Sans" panose="020B0606030504020204" pitchFamily="34" charset="0"/>
+              </a:rPr>
+              <a:t>The difference in model sizes is also notable. The average size of the DIET models is approximately 86MB, while the BERT models are all approximately 235MB each. </a:t>
+            </a:r>
+            <a:r>
+              <a:rPr lang="en-US" sz="2400">
+                <a:latin typeface="Titillium Web" panose="00000500000000000000" pitchFamily="2" charset="0"/>
+                <a:ea typeface="Open Sans" panose="020B0606030504020204" pitchFamily="34" charset="0"/>
+                <a:cs typeface="Open Sans" panose="020B0606030504020204" pitchFamily="34" charset="0"/>
+              </a:rPr>
+              <a:t>This might be an important consideration for limited resource environments such as mobile or edge devices.</a:t>
+            </a:r>
+            <a:endParaRPr lang="en-US" sz="2400" dirty="0">
+              <a:latin typeface="Titillium Web" panose="00000500000000000000" pitchFamily="2" charset="0"/>
+              <a:ea typeface="Open Sans" panose="020B0606030504020204" pitchFamily="34" charset="0"/>
+              <a:cs typeface="Open Sans" panose="020B0606030504020204" pitchFamily="34" charset="0"/>
+            </a:endParaRPr>
+          </a:p>
+        </p:txBody>
+      </p:sp>
     </p:spTree>
     <p:extLst>
       <p:ext uri="{BB962C8B-B14F-4D97-AF65-F5344CB8AC3E}">

</xml_diff>